<commit_message>
Correction URL du dashboard (AWS)
</commit_message>
<xml_diff>
--- a/projet7.pptx
+++ b/projet7.pptx
@@ -152,7 +152,7 @@
   <pc:docChgLst>
     <pc:chgData name="Christophe Lebrun" userId="303fc86cbab77272" providerId="LiveId" clId="{5CF99517-1F4B-4B47-8D8E-709890DD7C88}"/>
     <pc:docChg chg="undo custSel addSld delSld modSld sldOrd">
-      <pc:chgData name="Christophe Lebrun" userId="303fc86cbab77272" providerId="LiveId" clId="{5CF99517-1F4B-4B47-8D8E-709890DD7C88}" dt="2019-11-25T16:01:43.903" v="3232" actId="1036"/>
+      <pc:chgData name="Christophe Lebrun" userId="303fc86cbab77272" providerId="LiveId" clId="{5CF99517-1F4B-4B47-8D8E-709890DD7C88}" dt="2019-11-26T07:37:41.781" v="3252" actId="1076"/>
       <pc:docMkLst>
         <pc:docMk/>
       </pc:docMkLst>
@@ -914,13 +914,13 @@
         </pc:graphicFrameChg>
       </pc:sldChg>
       <pc:sldChg chg="addSp delSp modSp">
-        <pc:chgData name="Christophe Lebrun" userId="303fc86cbab77272" providerId="LiveId" clId="{5CF99517-1F4B-4B47-8D8E-709890DD7C88}" dt="2019-11-25T15:54:47.500" v="3205" actId="1036"/>
+        <pc:chgData name="Christophe Lebrun" userId="303fc86cbab77272" providerId="LiveId" clId="{5CF99517-1F4B-4B47-8D8E-709890DD7C88}" dt="2019-11-26T07:37:41.781" v="3252" actId="1076"/>
         <pc:sldMkLst>
           <pc:docMk/>
           <pc:sldMk cId="2090096952" sldId="402"/>
         </pc:sldMkLst>
         <pc:spChg chg="add mod ord">
-          <ac:chgData name="Christophe Lebrun" userId="303fc86cbab77272" providerId="LiveId" clId="{5CF99517-1F4B-4B47-8D8E-709890DD7C88}" dt="2019-11-25T15:54:47.500" v="3205" actId="1036"/>
+          <ac:chgData name="Christophe Lebrun" userId="303fc86cbab77272" providerId="LiveId" clId="{5CF99517-1F4B-4B47-8D8E-709890DD7C88}" dt="2019-11-26T07:37:41.781" v="3252" actId="1076"/>
           <ac:spMkLst>
             <pc:docMk/>
             <pc:sldMk cId="2090096952" sldId="402"/>
@@ -952,7 +952,7 @@
           </ac:spMkLst>
         </pc:spChg>
         <pc:picChg chg="add mod">
-          <ac:chgData name="Christophe Lebrun" userId="303fc86cbab77272" providerId="LiveId" clId="{5CF99517-1F4B-4B47-8D8E-709890DD7C88}" dt="2019-11-25T15:53:31.174" v="3178" actId="14100"/>
+          <ac:chgData name="Christophe Lebrun" userId="303fc86cbab77272" providerId="LiveId" clId="{5CF99517-1F4B-4B47-8D8E-709890DD7C88}" dt="2019-11-26T07:37:05.040" v="3236" actId="1076"/>
           <ac:picMkLst>
             <pc:docMk/>
             <pc:sldMk cId="2090096952" sldId="402"/>
@@ -21572,7 +21572,7 @@
           <a:p>
             <a:fld id="{A6994B78-A156-4E76-BB28-39D7E36AE272}" type="datetimeFigureOut">
               <a:rPr lang="fr-FR" smtClean="0"/>
-              <a:t>25/11/2019</a:t>
+              <a:t>26/11/2019</a:t>
             </a:fld>
             <a:endParaRPr lang="fr-FR"/>
           </a:p>
@@ -22093,7 +22093,7 @@
           <a:p>
             <a:fld id="{4A2428F8-4951-4546-B4FA-7B0FACC74B80}" type="datetime1">
               <a:rPr lang="fr-FR" smtClean="0"/>
-              <a:t>25/11/2019</a:t>
+              <a:t>26/11/2019</a:t>
             </a:fld>
             <a:endParaRPr lang="fr-FR"/>
           </a:p>
@@ -22360,7 +22360,7 @@
           <a:p>
             <a:fld id="{ACB6019D-FF65-4B6D-88E7-E32520CD55FC}" type="datetime1">
               <a:rPr lang="fr-FR" smtClean="0"/>
-              <a:t>25/11/2019</a:t>
+              <a:t>26/11/2019</a:t>
             </a:fld>
             <a:endParaRPr lang="fr-FR"/>
           </a:p>
@@ -22591,7 +22591,7 @@
           <a:p>
             <a:fld id="{F801886C-9464-46E7-BC75-B4C59B337121}" type="datetime1">
               <a:rPr lang="fr-FR" smtClean="0"/>
-              <a:t>25/11/2019</a:t>
+              <a:t>26/11/2019</a:t>
             </a:fld>
             <a:endParaRPr lang="fr-FR"/>
           </a:p>
@@ -22901,7 +22901,7 @@
           <a:p>
             <a:fld id="{AB2972D2-6F14-4C24-9E0C-4FF7F34B2768}" type="datetime1">
               <a:rPr lang="fr-FR" smtClean="0"/>
-              <a:t>25/11/2019</a:t>
+              <a:t>26/11/2019</a:t>
             </a:fld>
             <a:endParaRPr lang="fr-FR"/>
           </a:p>
@@ -23374,7 +23374,7 @@
           <a:p>
             <a:fld id="{150DD647-851C-4A6E-99E4-412E2060441D}" type="datetime1">
               <a:rPr lang="fr-FR" smtClean="0"/>
-              <a:t>25/11/2019</a:t>
+              <a:t>26/11/2019</a:t>
             </a:fld>
             <a:endParaRPr lang="fr-FR"/>
           </a:p>
@@ -23921,7 +23921,7 @@
           <a:p>
             <a:fld id="{33781566-4F69-403C-9080-3BFEE2B37491}" type="datetime1">
               <a:rPr lang="fr-FR" smtClean="0"/>
-              <a:t>25/11/2019</a:t>
+              <a:t>26/11/2019</a:t>
             </a:fld>
             <a:endParaRPr lang="fr-FR"/>
           </a:p>
@@ -24695,7 +24695,7 @@
           <a:p>
             <a:fld id="{14D47B0C-B5AB-42EB-BB2D-F19425E95921}" type="datetime1">
               <a:rPr lang="fr-FR" smtClean="0"/>
-              <a:t>25/11/2019</a:t>
+              <a:t>26/11/2019</a:t>
             </a:fld>
             <a:endParaRPr lang="fr-FR"/>
           </a:p>
@@ -24870,7 +24870,7 @@
           <a:p>
             <a:fld id="{C573A1F9-098E-4818-B4BA-05597FCE7433}" type="datetime1">
               <a:rPr lang="fr-FR" smtClean="0"/>
-              <a:t>25/11/2019</a:t>
+              <a:t>26/11/2019</a:t>
             </a:fld>
             <a:endParaRPr lang="fr-FR"/>
           </a:p>
@@ -25093,7 +25093,7 @@
           <a:p>
             <a:fld id="{9B85617F-11C8-46B4-82FC-6C143D8E927D}" type="datetime1">
               <a:rPr lang="fr-FR" smtClean="0"/>
-              <a:t>25/11/2019</a:t>
+              <a:t>26/11/2019</a:t>
             </a:fld>
             <a:endParaRPr lang="fr-FR"/>
           </a:p>
@@ -25334,7 +25334,7 @@
           <a:p>
             <a:fld id="{21493104-0DD6-4188-A408-37748D818DBE}" type="datetime1">
               <a:rPr lang="fr-FR" smtClean="0"/>
-              <a:t>25/11/2019</a:t>
+              <a:t>26/11/2019</a:t>
             </a:fld>
             <a:endParaRPr lang="fr-FR"/>
           </a:p>
@@ -25514,7 +25514,7 @@
           <a:p>
             <a:fld id="{824ACC8D-CADA-4745-885B-C009075ACE07}" type="datetime1">
               <a:rPr lang="fr-FR" smtClean="0"/>
-              <a:t>25/11/2019</a:t>
+              <a:t>26/11/2019</a:t>
             </a:fld>
             <a:endParaRPr lang="fr-FR"/>
           </a:p>
@@ -25684,7 +25684,7 @@
           <a:p>
             <a:fld id="{2468CB63-00AE-4756-B792-32C885852036}" type="datetime1">
               <a:rPr lang="fr-FR" smtClean="0"/>
-              <a:t>25/11/2019</a:t>
+              <a:t>26/11/2019</a:t>
             </a:fld>
             <a:endParaRPr lang="fr-FR"/>
           </a:p>
@@ -25973,7 +25973,7 @@
           <a:p>
             <a:fld id="{F898AE11-0657-4D23-A8AC-E411F594EC7D}" type="datetime1">
               <a:rPr lang="fr-FR" smtClean="0"/>
-              <a:t>25/11/2019</a:t>
+              <a:t>26/11/2019</a:t>
             </a:fld>
             <a:endParaRPr lang="fr-FR"/>
           </a:p>
@@ -26215,7 +26215,7 @@
           <a:p>
             <a:fld id="{5F7B142A-F148-4ADB-A468-FE587DAD07D9}" type="datetime1">
               <a:rPr lang="fr-FR" smtClean="0"/>
-              <a:t>25/11/2019</a:t>
+              <a:t>26/11/2019</a:t>
             </a:fld>
             <a:endParaRPr lang="fr-FR"/>
           </a:p>
@@ -26594,7 +26594,7 @@
           <a:p>
             <a:fld id="{DF19706F-1691-421A-B634-B96F386F7B76}" type="datetime1">
               <a:rPr lang="fr-FR" smtClean="0"/>
-              <a:t>25/11/2019</a:t>
+              <a:t>26/11/2019</a:t>
             </a:fld>
             <a:endParaRPr lang="fr-FR"/>
           </a:p>
@@ -26712,7 +26712,7 @@
           <a:p>
             <a:fld id="{82E02EEA-4114-443B-89FA-6E832FF354CE}" type="datetime1">
               <a:rPr lang="fr-FR" smtClean="0"/>
-              <a:t>25/11/2019</a:t>
+              <a:t>26/11/2019</a:t>
             </a:fld>
             <a:endParaRPr lang="fr-FR"/>
           </a:p>
@@ -26807,7 +26807,7 @@
           <a:p>
             <a:fld id="{5BF41AA7-3BDA-4782-B3C5-401728461EBA}" type="datetime1">
               <a:rPr lang="fr-FR" smtClean="0"/>
-              <a:t>25/11/2019</a:t>
+              <a:t>26/11/2019</a:t>
             </a:fld>
             <a:endParaRPr lang="fr-FR"/>
           </a:p>
@@ -27056,7 +27056,7 @@
           <a:p>
             <a:fld id="{790D4B45-0ED5-401D-87BF-F27E5AD4E8F6}" type="datetime1">
               <a:rPr lang="fr-FR" smtClean="0"/>
-              <a:t>25/11/2019</a:t>
+              <a:t>26/11/2019</a:t>
             </a:fld>
             <a:endParaRPr lang="fr-FR"/>
           </a:p>
@@ -27313,7 +27313,7 @@
           <a:p>
             <a:fld id="{C4BA227D-3211-4923-B058-2465568DA97C}" type="datetime1">
               <a:rPr lang="fr-FR" smtClean="0"/>
-              <a:t>25/11/2019</a:t>
+              <a:t>26/11/2019</a:t>
             </a:fld>
             <a:endParaRPr lang="fr-FR"/>
           </a:p>
@@ -27570,7 +27570,7 @@
           <a:p>
             <a:fld id="{33EC2012-1BFF-4C92-91DA-ED5E44E2DAE6}" type="datetime1">
               <a:rPr lang="fr-FR" smtClean="0"/>
-              <a:t>25/11/2019</a:t>
+              <a:t>26/11/2019</a:t>
             </a:fld>
             <a:endParaRPr lang="fr-FR"/>
           </a:p>
@@ -27801,7 +27801,7 @@
           <a:p>
             <a:fld id="{36D54C82-D4A8-4BCC-BBE6-5333B0B84731}" type="datetime1">
               <a:rPr lang="fr-FR" smtClean="0"/>
-              <a:t>25/11/2019</a:t>
+              <a:t>26/11/2019</a:t>
             </a:fld>
             <a:endParaRPr lang="fr-FR"/>
           </a:p>
@@ -28111,7 +28111,7 @@
           <a:p>
             <a:fld id="{DDD00B7C-7A69-493A-8A97-AE08389BB3D5}" type="datetime1">
               <a:rPr lang="fr-FR" smtClean="0"/>
-              <a:t>25/11/2019</a:t>
+              <a:t>26/11/2019</a:t>
             </a:fld>
             <a:endParaRPr lang="fr-FR"/>
           </a:p>
@@ -28642,7 +28642,7 @@
           <a:p>
             <a:fld id="{10EA4304-F7B0-45DA-9970-108CC9362744}" type="datetime1">
               <a:rPr lang="fr-FR" smtClean="0"/>
-              <a:t>25/11/2019</a:t>
+              <a:t>26/11/2019</a:t>
             </a:fld>
             <a:endParaRPr lang="fr-FR"/>
           </a:p>
@@ -28883,7 +28883,7 @@
           <a:p>
             <a:fld id="{551B583F-2DDE-447D-8CBF-9525FA0FB806}" type="datetime1">
               <a:rPr lang="fr-FR" smtClean="0"/>
-              <a:t>25/11/2019</a:t>
+              <a:t>26/11/2019</a:t>
             </a:fld>
             <a:endParaRPr lang="fr-FR"/>
           </a:p>
@@ -29430,7 +29430,7 @@
           <a:p>
             <a:fld id="{F196D0C2-EC15-4914-BD1C-8DC6D93A7E06}" type="datetime1">
               <a:rPr lang="fr-FR" smtClean="0"/>
-              <a:t>25/11/2019</a:t>
+              <a:t>26/11/2019</a:t>
             </a:fld>
             <a:endParaRPr lang="fr-FR"/>
           </a:p>
@@ -30204,7 +30204,7 @@
           <a:p>
             <a:fld id="{B0F0F71C-CB2D-46DF-BBF5-45A6CF07943D}" type="datetime1">
               <a:rPr lang="fr-FR" smtClean="0"/>
-              <a:t>25/11/2019</a:t>
+              <a:t>26/11/2019</a:t>
             </a:fld>
             <a:endParaRPr lang="fr-FR"/>
           </a:p>
@@ -30379,7 +30379,7 @@
           <a:p>
             <a:fld id="{D8EE97A0-E3EB-454D-B57B-09208F6C2349}" type="datetime1">
               <a:rPr lang="fr-FR" smtClean="0"/>
-              <a:t>25/11/2019</a:t>
+              <a:t>26/11/2019</a:t>
             </a:fld>
             <a:endParaRPr lang="fr-FR"/>
           </a:p>
@@ -30602,7 +30602,7 @@
           <a:p>
             <a:fld id="{0C6102B9-41E8-4E57-8EA6-AB67D80E10AB}" type="datetime1">
               <a:rPr lang="fr-FR" smtClean="0"/>
-              <a:t>25/11/2019</a:t>
+              <a:t>26/11/2019</a:t>
             </a:fld>
             <a:endParaRPr lang="fr-FR"/>
           </a:p>
@@ -30844,7 +30844,7 @@
           <a:p>
             <a:fld id="{5EF8BD1A-0AB3-42BB-87D7-511BD450E973}" type="datetime1">
               <a:rPr lang="fr-FR" smtClean="0"/>
-              <a:t>25/11/2019</a:t>
+              <a:t>26/11/2019</a:t>
             </a:fld>
             <a:endParaRPr lang="fr-FR"/>
           </a:p>
@@ -31223,7 +31223,7 @@
           <a:p>
             <a:fld id="{F0ED20F9-E137-45C5-9CDB-EB23F7F61742}" type="datetime1">
               <a:rPr lang="fr-FR" smtClean="0"/>
-              <a:t>25/11/2019</a:t>
+              <a:t>26/11/2019</a:t>
             </a:fld>
             <a:endParaRPr lang="fr-FR"/>
           </a:p>
@@ -31341,7 +31341,7 @@
           <a:p>
             <a:fld id="{7F549FA9-5419-4577-ACA1-5FA8B1F430E1}" type="datetime1">
               <a:rPr lang="fr-FR" smtClean="0"/>
-              <a:t>25/11/2019</a:t>
+              <a:t>26/11/2019</a:t>
             </a:fld>
             <a:endParaRPr lang="fr-FR"/>
           </a:p>
@@ -31436,7 +31436,7 @@
           <a:p>
             <a:fld id="{B732A3B4-D77F-4011-84A4-1CE2C85060AA}" type="datetime1">
               <a:rPr lang="fr-FR" smtClean="0"/>
-              <a:t>25/11/2019</a:t>
+              <a:t>26/11/2019</a:t>
             </a:fld>
             <a:endParaRPr lang="fr-FR"/>
           </a:p>
@@ -31685,7 +31685,7 @@
           <a:p>
             <a:fld id="{AFD5C01D-38A9-4545-9F6C-D14ECEB1FB25}" type="datetime1">
               <a:rPr lang="fr-FR" smtClean="0"/>
-              <a:t>25/11/2019</a:t>
+              <a:t>26/11/2019</a:t>
             </a:fld>
             <a:endParaRPr lang="fr-FR"/>
           </a:p>
@@ -31942,7 +31942,7 @@
           <a:p>
             <a:fld id="{AD9F5F43-A7C8-4BE7-8EDD-3B94DD5ED3AC}" type="datetime1">
               <a:rPr lang="fr-FR" smtClean="0"/>
-              <a:t>25/11/2019</a:t>
+              <a:t>26/11/2019</a:t>
             </a:fld>
             <a:endParaRPr lang="fr-FR"/>
           </a:p>
@@ -32185,7 +32185,7 @@
           <a:p>
             <a:fld id="{C0D22650-866C-43F7-8C91-C810959EF2B7}" type="datetime1">
               <a:rPr lang="fr-FR" smtClean="0"/>
-              <a:t>25/11/2019</a:t>
+              <a:t>26/11/2019</a:t>
             </a:fld>
             <a:endParaRPr lang="fr-FR"/>
           </a:p>
@@ -32762,7 +32762,7 @@
           <a:p>
             <a:fld id="{C0D22650-866C-43F7-8C91-C810959EF2B7}" type="datetime1">
               <a:rPr lang="fr-FR" smtClean="0"/>
-              <a:t>25/11/2019</a:t>
+              <a:t>26/11/2019</a:t>
             </a:fld>
             <a:endParaRPr lang="fr-FR"/>
           </a:p>
@@ -47496,8 +47496,8 @@
         </p:nvSpPr>
         <p:spPr>
           <a:xfrm>
-            <a:off x="7113502" y="6237828"/>
-            <a:ext cx="5126724" cy="369332"/>
+            <a:off x="7526511" y="6251761"/>
+            <a:ext cx="4701928" cy="369332"/>
           </a:xfrm>
           <a:prstGeom prst="rect">
             <a:avLst/>
@@ -47515,7 +47515,7 @@
                   <a:schemeClr val="bg1"/>
                 </a:solidFill>
               </a:rPr>
-              <a:t>AWS </a:t>
+              <a:t>Cloud </a:t>
             </a:r>
             <a:r>
               <a:rPr lang="fr-FR" dirty="0" err="1">
@@ -47531,53 +47531,13 @@
                   <a:schemeClr val="bg1"/>
                 </a:solidFill>
               </a:rPr>
-              <a:t> (IP </a:t>
-            </a:r>
-            <a:r>
-              <a:rPr lang="fr-FR" dirty="0" err="1">
-                <a:solidFill>
-                  <a:schemeClr val="bg1"/>
-                </a:solidFill>
-              </a:rPr>
-              <a:t>Elastic</a:t>
+              <a:t> : </a:t>
             </a:r>
             <a:r>
               <a:rPr lang="fr-FR" dirty="0">
-                <a:solidFill>
-                  <a:schemeClr val="bg1"/>
-                </a:solidFill>
+                <a:hlinkClick r:id="rId4" tooltip="http://15.188.179.79:8501/"/>
               </a:rPr>
-              <a:t>) : </a:t>
-            </a:r>
-            <a:r>
-              <a:rPr lang="fr-FR" dirty="0">
-                <a:solidFill>
-                  <a:schemeClr val="accent6"/>
-                </a:solidFill>
-                <a:hlinkClick r:id="rId4" invalidUrl="http:///">
-                  <a:extLst>
-                    <a:ext uri="{A12FA001-AC4F-418D-AE19-62706E023703}">
-                      <ahyp:hlinkClr xmlns:ahyp="http://schemas.microsoft.com/office/drawing/2018/hyperlinkcolor" val="tx"/>
-                    </a:ext>
-                  </a:extLst>
-                </a:hlinkClick>
-              </a:rPr>
-              <a:t>http://</a:t>
-            </a:r>
-            <a:r>
-              <a:rPr lang="fr-FR" dirty="0">
-                <a:solidFill>
-                  <a:schemeClr val="accent6"/>
-                </a:solidFill>
-                <a:hlinkClick r:id="rId5">
-                  <a:extLst>
-                    <a:ext uri="{A12FA001-AC4F-418D-AE19-62706E023703}">
-                      <ahyp:hlinkClr xmlns:ahyp="http://schemas.microsoft.com/office/drawing/2018/hyperlinkcolor" val="tx"/>
-                    </a:ext>
-                  </a:extLst>
-                </a:hlinkClick>
-              </a:rPr>
-              <a:t>15.188.179.79</a:t>
+              <a:t>http://15.188.179.79:8501</a:t>
             </a:r>
             <a:endParaRPr lang="fr-FR" dirty="0">
               <a:solidFill>

</xml_diff>

<commit_message>
Ajout pourcentage sur dashboard
</commit_message>
<xml_diff>
--- a/projet7.pptx
+++ b/projet7.pptx
@@ -18,10 +18,10 @@
     <p:sldId id="399" r:id="rId9"/>
     <p:sldId id="388" r:id="rId10"/>
     <p:sldId id="396" r:id="rId11"/>
-    <p:sldId id="404" r:id="rId12"/>
-    <p:sldId id="408" r:id="rId13"/>
-    <p:sldId id="398" r:id="rId14"/>
-    <p:sldId id="406" r:id="rId15"/>
+    <p:sldId id="406" r:id="rId12"/>
+    <p:sldId id="404" r:id="rId13"/>
+    <p:sldId id="408" r:id="rId14"/>
+    <p:sldId id="398" r:id="rId15"/>
     <p:sldId id="385" r:id="rId16"/>
     <p:sldId id="402" r:id="rId17"/>
     <p:sldId id="278" r:id="rId18"/>
@@ -2797,10 +2797,25 @@
   <pc:docChgLst>
     <pc:chgData name="Christophe Lebrun" userId="303fc86cbab77272" providerId="LiveId" clId="{0E6B5E6D-1ABA-4AE4-87BD-C358916F337D}"/>
     <pc:docChg chg="custSel modSld sldOrd">
-      <pc:chgData name="Christophe Lebrun" userId="303fc86cbab77272" providerId="LiveId" clId="{0E6B5E6D-1ABA-4AE4-87BD-C358916F337D}" dt="2019-11-23T08:12:28.424" v="159" actId="1036"/>
+      <pc:chgData name="Christophe Lebrun" userId="303fc86cbab77272" providerId="LiveId" clId="{0E6B5E6D-1ABA-4AE4-87BD-C358916F337D}" dt="2019-11-28T20:30:23.160" v="201" actId="20577"/>
       <pc:docMkLst>
         <pc:docMk/>
       </pc:docMkLst>
+      <pc:sldChg chg="modSp">
+        <pc:chgData name="Christophe Lebrun" userId="303fc86cbab77272" providerId="LiveId" clId="{0E6B5E6D-1ABA-4AE4-87BD-C358916F337D}" dt="2019-11-28T20:06:26.307" v="178" actId="20577"/>
+        <pc:sldMkLst>
+          <pc:docMk/>
+          <pc:sldMk cId="3576308320" sldId="271"/>
+        </pc:sldMkLst>
+        <pc:spChg chg="mod">
+          <ac:chgData name="Christophe Lebrun" userId="303fc86cbab77272" providerId="LiveId" clId="{0E6B5E6D-1ABA-4AE4-87BD-C358916F337D}" dt="2019-11-28T20:06:26.307" v="178" actId="20577"/>
+          <ac:spMkLst>
+            <pc:docMk/>
+            <pc:sldMk cId="3576308320" sldId="271"/>
+            <ac:spMk id="8" creationId="{D2AE1507-D6AC-45E7-8492-397B4CA37FAD}"/>
+          </ac:spMkLst>
+        </pc:spChg>
+      </pc:sldChg>
       <pc:sldChg chg="addSp delSp modSp">
         <pc:chgData name="Christophe Lebrun" userId="303fc86cbab77272" providerId="LiveId" clId="{0E6B5E6D-1ABA-4AE4-87BD-C358916F337D}" dt="2019-11-23T07:57:05.361" v="137" actId="1076"/>
         <pc:sldMkLst>
@@ -2889,11 +2904,19 @@
         </pc:picChg>
       </pc:sldChg>
       <pc:sldChg chg="addSp delSp modSp">
-        <pc:chgData name="Christophe Lebrun" userId="303fc86cbab77272" providerId="LiveId" clId="{0E6B5E6D-1ABA-4AE4-87BD-C358916F337D}" dt="2019-11-23T07:45:51.853" v="59" actId="14100"/>
+        <pc:chgData name="Christophe Lebrun" userId="303fc86cbab77272" providerId="LiveId" clId="{0E6B5E6D-1ABA-4AE4-87BD-C358916F337D}" dt="2019-11-28T19:20:37.588" v="160" actId="20577"/>
         <pc:sldMkLst>
           <pc:docMk/>
           <pc:sldMk cId="1469477853" sldId="388"/>
         </pc:sldMkLst>
+        <pc:spChg chg="mod">
+          <ac:chgData name="Christophe Lebrun" userId="303fc86cbab77272" providerId="LiveId" clId="{0E6B5E6D-1ABA-4AE4-87BD-C358916F337D}" dt="2019-11-28T19:20:37.588" v="160" actId="20577"/>
+          <ac:spMkLst>
+            <pc:docMk/>
+            <pc:sldMk cId="1469477853" sldId="388"/>
+            <ac:spMk id="2" creationId="{5C9A419A-49B0-418E-80CB-42594B300BD2}"/>
+          </ac:spMkLst>
+        </pc:spChg>
         <pc:spChg chg="add mod">
           <ac:chgData name="Christophe Lebrun" userId="303fc86cbab77272" providerId="LiveId" clId="{0E6B5E6D-1ABA-4AE4-87BD-C358916F337D}" dt="2019-11-23T07:43:54.972" v="19" actId="14100"/>
           <ac:spMkLst>
@@ -2926,8 +2949,23 @@
           <pc:sldMk cId="2350210987" sldId="392"/>
         </pc:sldMkLst>
       </pc:sldChg>
+      <pc:sldChg chg="modSp">
+        <pc:chgData name="Christophe Lebrun" userId="303fc86cbab77272" providerId="LiveId" clId="{0E6B5E6D-1ABA-4AE4-87BD-C358916F337D}" dt="2019-11-28T19:21:28.937" v="170" actId="20577"/>
+        <pc:sldMkLst>
+          <pc:docMk/>
+          <pc:sldMk cId="1126268051" sldId="394"/>
+        </pc:sldMkLst>
+        <pc:graphicFrameChg chg="mod">
+          <ac:chgData name="Christophe Lebrun" userId="303fc86cbab77272" providerId="LiveId" clId="{0E6B5E6D-1ABA-4AE4-87BD-C358916F337D}" dt="2019-11-28T19:21:28.937" v="170" actId="20577"/>
+          <ac:graphicFrameMkLst>
+            <pc:docMk/>
+            <pc:sldMk cId="1126268051" sldId="394"/>
+            <ac:graphicFrameMk id="11" creationId="{D8E42004-D009-467C-ADC8-2C1E18434201}"/>
+          </ac:graphicFrameMkLst>
+        </pc:graphicFrameChg>
+      </pc:sldChg>
       <pc:sldChg chg="delSp modSp ord">
-        <pc:chgData name="Christophe Lebrun" userId="303fc86cbab77272" providerId="LiveId" clId="{0E6B5E6D-1ABA-4AE4-87BD-C358916F337D}" dt="2019-11-23T07:46:11.875" v="60" actId="14100"/>
+        <pc:chgData name="Christophe Lebrun" userId="303fc86cbab77272" providerId="LiveId" clId="{0E6B5E6D-1ABA-4AE4-87BD-C358916F337D}" dt="2019-11-28T20:25:31.698" v="199" actId="14100"/>
         <pc:sldMkLst>
           <pc:docMk/>
           <pc:sldMk cId="616920843" sldId="396"/>
@@ -2954,6 +2992,22 @@
             <pc:docMk/>
             <pc:sldMk cId="616920843" sldId="396"/>
             <ac:picMk id="4" creationId="{8FDB3700-8155-4A6F-9C7A-9AD1A5D517C2}"/>
+          </ac:picMkLst>
+        </pc:picChg>
+        <pc:picChg chg="mod">
+          <ac:chgData name="Christophe Lebrun" userId="303fc86cbab77272" providerId="LiveId" clId="{0E6B5E6D-1ABA-4AE4-87BD-C358916F337D}" dt="2019-11-28T20:25:12.036" v="197" actId="1038"/>
+          <ac:picMkLst>
+            <pc:docMk/>
+            <pc:sldMk cId="616920843" sldId="396"/>
+            <ac:picMk id="8" creationId="{1922D9D9-7305-4E49-BE24-98B350BA1B8C}"/>
+          </ac:picMkLst>
+        </pc:picChg>
+        <pc:picChg chg="mod">
+          <ac:chgData name="Christophe Lebrun" userId="303fc86cbab77272" providerId="LiveId" clId="{0E6B5E6D-1ABA-4AE4-87BD-C358916F337D}" dt="2019-11-28T20:25:31.698" v="199" actId="14100"/>
+          <ac:picMkLst>
+            <pc:docMk/>
+            <pc:sldMk cId="616920843" sldId="396"/>
+            <ac:picMk id="9" creationId="{610AD87A-1E00-4237-B10D-42762C7C81E5}"/>
           </ac:picMkLst>
         </pc:picChg>
         <pc:picChg chg="mod">
@@ -2987,6 +3041,29 @@
             <ac:picMk id="7" creationId="{4F3450B8-A5CC-461B-8096-A3E0C8FAF9F6}"/>
           </ac:picMkLst>
         </pc:picChg>
+      </pc:sldChg>
+      <pc:sldChg chg="modSp">
+        <pc:chgData name="Christophe Lebrun" userId="303fc86cbab77272" providerId="LiveId" clId="{0E6B5E6D-1ABA-4AE4-87BD-C358916F337D}" dt="2019-11-28T20:30:23.160" v="201" actId="20577"/>
+        <pc:sldMkLst>
+          <pc:docMk/>
+          <pc:sldMk cId="2090096952" sldId="402"/>
+        </pc:sldMkLst>
+        <pc:spChg chg="mod">
+          <ac:chgData name="Christophe Lebrun" userId="303fc86cbab77272" providerId="LiveId" clId="{0E6B5E6D-1ABA-4AE4-87BD-C358916F337D}" dt="2019-11-28T20:30:23.160" v="201" actId="20577"/>
+          <ac:spMkLst>
+            <pc:docMk/>
+            <pc:sldMk cId="2090096952" sldId="402"/>
+            <ac:spMk id="2" creationId="{7F77AC2A-2C99-4832-88AD-A2DAA31BDD2F}"/>
+          </ac:spMkLst>
+        </pc:spChg>
+        <pc:spChg chg="mod">
+          <ac:chgData name="Christophe Lebrun" userId="303fc86cbab77272" providerId="LiveId" clId="{0E6B5E6D-1ABA-4AE4-87BD-C358916F337D}" dt="2019-11-28T20:30:19.331" v="200" actId="20577"/>
+          <ac:spMkLst>
+            <pc:docMk/>
+            <pc:sldMk cId="2090096952" sldId="402"/>
+            <ac:spMk id="5" creationId="{86700D53-705B-46ED-AF66-E74E744184AC}"/>
+          </ac:spMkLst>
+        </pc:spChg>
       </pc:sldChg>
       <pc:sldChg chg="addSp delSp modSp">
         <pc:chgData name="Christophe Lebrun" userId="303fc86cbab77272" providerId="LiveId" clId="{0E6B5E6D-1ABA-4AE4-87BD-C358916F337D}" dt="2019-11-23T07:51:28.983" v="90" actId="14100"/>
@@ -3036,7 +3113,7 @@
         </pc:picChg>
       </pc:sldChg>
       <pc:sldChg chg="modSp">
-        <pc:chgData name="Christophe Lebrun" userId="303fc86cbab77272" providerId="LiveId" clId="{0E6B5E6D-1ABA-4AE4-87BD-C358916F337D}" dt="2019-11-23T07:46:33.067" v="70" actId="20577"/>
+        <pc:chgData name="Christophe Lebrun" userId="303fc86cbab77272" providerId="LiveId" clId="{0E6B5E6D-1ABA-4AE4-87BD-C358916F337D}" dt="2019-11-28T20:08:45.024" v="188" actId="20577"/>
         <pc:sldMkLst>
           <pc:docMk/>
           <pc:sldMk cId="59910576" sldId="404"/>
@@ -3049,6 +3126,14 @@
             <ac:spMk id="2" creationId="{5C9A419A-49B0-418E-80CB-42594B300BD2}"/>
           </ac:spMkLst>
         </pc:spChg>
+        <pc:spChg chg="mod">
+          <ac:chgData name="Christophe Lebrun" userId="303fc86cbab77272" providerId="LiveId" clId="{0E6B5E6D-1ABA-4AE4-87BD-C358916F337D}" dt="2019-11-28T20:08:45.024" v="188" actId="20577"/>
+          <ac:spMkLst>
+            <pc:docMk/>
+            <pc:sldMk cId="59910576" sldId="404"/>
+            <ac:spMk id="50" creationId="{84B65492-C7C1-4A1F-A699-04E87C68A7CF}"/>
+          </ac:spMkLst>
+        </pc:spChg>
         <pc:picChg chg="mod">
           <ac:chgData name="Christophe Lebrun" userId="303fc86cbab77272" providerId="LiveId" clId="{0E6B5E6D-1ABA-4AE4-87BD-C358916F337D}" dt="2019-11-23T07:46:28.137" v="61" actId="1076"/>
           <ac:picMkLst>
@@ -3058,8 +3143,8 @@
           </ac:picMkLst>
         </pc:picChg>
       </pc:sldChg>
-      <pc:sldChg chg="addSp delSp modSp">
-        <pc:chgData name="Christophe Lebrun" userId="303fc86cbab77272" providerId="LiveId" clId="{0E6B5E6D-1ABA-4AE4-87BD-C358916F337D}" dt="2019-11-23T08:12:28.424" v="159" actId="1036"/>
+      <pc:sldChg chg="addSp delSp modSp ord">
+        <pc:chgData name="Christophe Lebrun" userId="303fc86cbab77272" providerId="LiveId" clId="{0E6B5E6D-1ABA-4AE4-87BD-C358916F337D}" dt="2019-11-28T20:05:43.991" v="172"/>
         <pc:sldMkLst>
           <pc:docMk/>
           <pc:sldMk cId="1020119926" sldId="406"/>
@@ -9162,7 +9247,7 @@
         <a:p>
           <a:r>
             <a:rPr lang="en-US" noProof="0" dirty="0"/>
-            <a:t>Group by &amp; Merges</a:t>
+            <a:t>Merges &amp; Group by</a:t>
           </a:r>
         </a:p>
       </dgm:t>
@@ -11315,7 +11400,7 @@
           </a:pPr>
           <a:r>
             <a:rPr lang="en-US" sz="1400" kern="1200" noProof="0" dirty="0"/>
-            <a:t>Group by &amp; Merges</a:t>
+            <a:t>Merges &amp; Group by</a:t>
           </a:r>
         </a:p>
       </dsp:txBody>
@@ -21572,7 +21657,7 @@
           <a:p>
             <a:fld id="{A6994B78-A156-4E76-BB28-39D7E36AE272}" type="datetimeFigureOut">
               <a:rPr lang="fr-FR" smtClean="0"/>
-              <a:t>26/11/2019</a:t>
+              <a:t>28/11/2019</a:t>
             </a:fld>
             <a:endParaRPr lang="fr-FR"/>
           </a:p>
@@ -21730,7 +21815,7 @@
           <a:p>
             <a:fld id="{5AA8A231-FDF8-4574-A969-AC3B90D90B32}" type="slidenum">
               <a:rPr lang="fr-FR" smtClean="0"/>
-              <a:t>‹N°›</a:t>
+              <a:t>‹#›</a:t>
             </a:fld>
             <a:endParaRPr lang="fr-FR"/>
           </a:p>
@@ -22093,7 +22178,7 @@
           <a:p>
             <a:fld id="{4A2428F8-4951-4546-B4FA-7B0FACC74B80}" type="datetime1">
               <a:rPr lang="fr-FR" smtClean="0"/>
-              <a:t>26/11/2019</a:t>
+              <a:t>28/11/2019</a:t>
             </a:fld>
             <a:endParaRPr lang="fr-FR"/>
           </a:p>
@@ -22145,7 +22230,7 @@
           <a:p>
             <a:fld id="{22EBEF4F-4056-4A7E-9612-F3E8B502E28B}" type="slidenum">
               <a:rPr lang="fr-FR" smtClean="0"/>
-              <a:t>‹N°›</a:t>
+              <a:t>‹#›</a:t>
             </a:fld>
             <a:endParaRPr lang="fr-FR"/>
           </a:p>
@@ -22360,7 +22445,7 @@
           <a:p>
             <a:fld id="{ACB6019D-FF65-4B6D-88E7-E32520CD55FC}" type="datetime1">
               <a:rPr lang="fr-FR" smtClean="0"/>
-              <a:t>26/11/2019</a:t>
+              <a:t>28/11/2019</a:t>
             </a:fld>
             <a:endParaRPr lang="fr-FR"/>
           </a:p>
@@ -22402,7 +22487,7 @@
           <a:p>
             <a:fld id="{22EBEF4F-4056-4A7E-9612-F3E8B502E28B}" type="slidenum">
               <a:rPr lang="fr-FR" smtClean="0"/>
-              <a:t>‹N°›</a:t>
+              <a:t>‹#›</a:t>
             </a:fld>
             <a:endParaRPr lang="fr-FR"/>
           </a:p>
@@ -22591,7 +22676,7 @@
           <a:p>
             <a:fld id="{F801886C-9464-46E7-BC75-B4C59B337121}" type="datetime1">
               <a:rPr lang="fr-FR" smtClean="0"/>
-              <a:t>26/11/2019</a:t>
+              <a:t>28/11/2019</a:t>
             </a:fld>
             <a:endParaRPr lang="fr-FR"/>
           </a:p>
@@ -22643,7 +22728,7 @@
           <a:p>
             <a:fld id="{22EBEF4F-4056-4A7E-9612-F3E8B502E28B}" type="slidenum">
               <a:rPr lang="fr-FR" smtClean="0"/>
-              <a:t>‹N°›</a:t>
+              <a:t>‹#›</a:t>
             </a:fld>
             <a:endParaRPr lang="fr-FR"/>
           </a:p>
@@ -22901,7 +22986,7 @@
           <a:p>
             <a:fld id="{AB2972D2-6F14-4C24-9E0C-4FF7F34B2768}" type="datetime1">
               <a:rPr lang="fr-FR" smtClean="0"/>
-              <a:t>26/11/2019</a:t>
+              <a:t>28/11/2019</a:t>
             </a:fld>
             <a:endParaRPr lang="fr-FR"/>
           </a:p>
@@ -22953,7 +23038,7 @@
           <a:p>
             <a:fld id="{22EBEF4F-4056-4A7E-9612-F3E8B502E28B}" type="slidenum">
               <a:rPr lang="fr-FR" smtClean="0"/>
-              <a:t>‹N°›</a:t>
+              <a:t>‹#›</a:t>
             </a:fld>
             <a:endParaRPr lang="fr-FR"/>
           </a:p>
@@ -23374,7 +23459,7 @@
           <a:p>
             <a:fld id="{150DD647-851C-4A6E-99E4-412E2060441D}" type="datetime1">
               <a:rPr lang="fr-FR" smtClean="0"/>
-              <a:t>26/11/2019</a:t>
+              <a:t>28/11/2019</a:t>
             </a:fld>
             <a:endParaRPr lang="fr-FR"/>
           </a:p>
@@ -23426,7 +23511,7 @@
           <a:p>
             <a:fld id="{22EBEF4F-4056-4A7E-9612-F3E8B502E28B}" type="slidenum">
               <a:rPr lang="fr-FR" smtClean="0"/>
-              <a:t>‹N°›</a:t>
+              <a:t>‹#›</a:t>
             </a:fld>
             <a:endParaRPr lang="fr-FR"/>
           </a:p>
@@ -23921,7 +24006,7 @@
           <a:p>
             <a:fld id="{33781566-4F69-403C-9080-3BFEE2B37491}" type="datetime1">
               <a:rPr lang="fr-FR" smtClean="0"/>
-              <a:t>26/11/2019</a:t>
+              <a:t>28/11/2019</a:t>
             </a:fld>
             <a:endParaRPr lang="fr-FR"/>
           </a:p>
@@ -23963,7 +24048,7 @@
           <a:p>
             <a:fld id="{22EBEF4F-4056-4A7E-9612-F3E8B502E28B}" type="slidenum">
               <a:rPr lang="fr-FR" smtClean="0"/>
-              <a:t>‹N°›</a:t>
+              <a:t>‹#›</a:t>
             </a:fld>
             <a:endParaRPr lang="fr-FR"/>
           </a:p>
@@ -24695,7 +24780,7 @@
           <a:p>
             <a:fld id="{14D47B0C-B5AB-42EB-BB2D-F19425E95921}" type="datetime1">
               <a:rPr lang="fr-FR" smtClean="0"/>
-              <a:t>26/11/2019</a:t>
+              <a:t>28/11/2019</a:t>
             </a:fld>
             <a:endParaRPr lang="fr-FR"/>
           </a:p>
@@ -24737,7 +24822,7 @@
           <a:p>
             <a:fld id="{22EBEF4F-4056-4A7E-9612-F3E8B502E28B}" type="slidenum">
               <a:rPr lang="fr-FR" smtClean="0"/>
-              <a:t>‹N°›</a:t>
+              <a:t>‹#›</a:t>
             </a:fld>
             <a:endParaRPr lang="fr-FR"/>
           </a:p>
@@ -24870,7 +24955,7 @@
           <a:p>
             <a:fld id="{C573A1F9-098E-4818-B4BA-05597FCE7433}" type="datetime1">
               <a:rPr lang="fr-FR" smtClean="0"/>
-              <a:t>26/11/2019</a:t>
+              <a:t>28/11/2019</a:t>
             </a:fld>
             <a:endParaRPr lang="fr-FR"/>
           </a:p>
@@ -24912,7 +24997,7 @@
           <a:p>
             <a:fld id="{22EBEF4F-4056-4A7E-9612-F3E8B502E28B}" type="slidenum">
               <a:rPr lang="fr-FR" smtClean="0"/>
-              <a:t>‹N°›</a:t>
+              <a:t>‹#›</a:t>
             </a:fld>
             <a:endParaRPr lang="fr-FR"/>
           </a:p>
@@ -25093,7 +25178,7 @@
           <a:p>
             <a:fld id="{9B85617F-11C8-46B4-82FC-6C143D8E927D}" type="datetime1">
               <a:rPr lang="fr-FR" smtClean="0"/>
-              <a:t>26/11/2019</a:t>
+              <a:t>28/11/2019</a:t>
             </a:fld>
             <a:endParaRPr lang="fr-FR"/>
           </a:p>
@@ -25145,7 +25230,7 @@
           <a:p>
             <a:fld id="{22EBEF4F-4056-4A7E-9612-F3E8B502E28B}" type="slidenum">
               <a:rPr lang="fr-FR" smtClean="0"/>
-              <a:t>‹N°›</a:t>
+              <a:t>‹#›</a:t>
             </a:fld>
             <a:endParaRPr lang="fr-FR"/>
           </a:p>
@@ -25334,7 +25419,7 @@
           <a:p>
             <a:fld id="{21493104-0DD6-4188-A408-37748D818DBE}" type="datetime1">
               <a:rPr lang="fr-FR" smtClean="0"/>
-              <a:t>26/11/2019</a:t>
+              <a:t>28/11/2019</a:t>
             </a:fld>
             <a:endParaRPr lang="fr-FR"/>
           </a:p>
@@ -25386,7 +25471,7 @@
           <a:p>
             <a:fld id="{22EBEF4F-4056-4A7E-9612-F3E8B502E28B}" type="slidenum">
               <a:rPr lang="fr-FR" smtClean="0"/>
-              <a:t>‹N°›</a:t>
+              <a:t>‹#›</a:t>
             </a:fld>
             <a:endParaRPr lang="fr-FR"/>
           </a:p>
@@ -25514,7 +25599,7 @@
           <a:p>
             <a:fld id="{824ACC8D-CADA-4745-885B-C009075ACE07}" type="datetime1">
               <a:rPr lang="fr-FR" smtClean="0"/>
-              <a:t>26/11/2019</a:t>
+              <a:t>28/11/2019</a:t>
             </a:fld>
             <a:endParaRPr lang="fr-FR"/>
           </a:p>
@@ -25556,7 +25641,7 @@
           <a:p>
             <a:fld id="{22EBEF4F-4056-4A7E-9612-F3E8B502E28B}" type="slidenum">
               <a:rPr lang="fr-FR" smtClean="0"/>
-              <a:t>‹N°›</a:t>
+              <a:t>‹#›</a:t>
             </a:fld>
             <a:endParaRPr lang="fr-FR"/>
           </a:p>
@@ -25684,7 +25769,7 @@
           <a:p>
             <a:fld id="{2468CB63-00AE-4756-B792-32C885852036}" type="datetime1">
               <a:rPr lang="fr-FR" smtClean="0"/>
-              <a:t>26/11/2019</a:t>
+              <a:t>28/11/2019</a:t>
             </a:fld>
             <a:endParaRPr lang="fr-FR"/>
           </a:p>
@@ -25726,7 +25811,7 @@
           <a:p>
             <a:fld id="{22EBEF4F-4056-4A7E-9612-F3E8B502E28B}" type="slidenum">
               <a:rPr lang="fr-FR" smtClean="0"/>
-              <a:t>‹N°›</a:t>
+              <a:t>‹#›</a:t>
             </a:fld>
             <a:endParaRPr lang="fr-FR"/>
           </a:p>
@@ -25973,7 +26058,7 @@
           <a:p>
             <a:fld id="{F898AE11-0657-4D23-A8AC-E411F594EC7D}" type="datetime1">
               <a:rPr lang="fr-FR" smtClean="0"/>
-              <a:t>26/11/2019</a:t>
+              <a:t>28/11/2019</a:t>
             </a:fld>
             <a:endParaRPr lang="fr-FR"/>
           </a:p>
@@ -26025,7 +26110,7 @@
           <a:p>
             <a:fld id="{22EBEF4F-4056-4A7E-9612-F3E8B502E28B}" type="slidenum">
               <a:rPr lang="fr-FR" smtClean="0"/>
-              <a:t>‹N°›</a:t>
+              <a:t>‹#›</a:t>
             </a:fld>
             <a:endParaRPr lang="fr-FR"/>
           </a:p>
@@ -26215,7 +26300,7 @@
           <a:p>
             <a:fld id="{5F7B142A-F148-4ADB-A468-FE587DAD07D9}" type="datetime1">
               <a:rPr lang="fr-FR" smtClean="0"/>
-              <a:t>26/11/2019</a:t>
+              <a:t>28/11/2019</a:t>
             </a:fld>
             <a:endParaRPr lang="fr-FR"/>
           </a:p>
@@ -26257,7 +26342,7 @@
           <a:p>
             <a:fld id="{22EBEF4F-4056-4A7E-9612-F3E8B502E28B}" type="slidenum">
               <a:rPr lang="fr-FR" smtClean="0"/>
-              <a:t>‹N°›</a:t>
+              <a:t>‹#›</a:t>
             </a:fld>
             <a:endParaRPr lang="fr-FR"/>
           </a:p>
@@ -26594,7 +26679,7 @@
           <a:p>
             <a:fld id="{DF19706F-1691-421A-B634-B96F386F7B76}" type="datetime1">
               <a:rPr lang="fr-FR" smtClean="0"/>
-              <a:t>26/11/2019</a:t>
+              <a:t>28/11/2019</a:t>
             </a:fld>
             <a:endParaRPr lang="fr-FR"/>
           </a:p>
@@ -26636,7 +26721,7 @@
           <a:p>
             <a:fld id="{22EBEF4F-4056-4A7E-9612-F3E8B502E28B}" type="slidenum">
               <a:rPr lang="fr-FR" smtClean="0"/>
-              <a:t>‹N°›</a:t>
+              <a:t>‹#›</a:t>
             </a:fld>
             <a:endParaRPr lang="fr-FR"/>
           </a:p>
@@ -26712,7 +26797,7 @@
           <a:p>
             <a:fld id="{82E02EEA-4114-443B-89FA-6E832FF354CE}" type="datetime1">
               <a:rPr lang="fr-FR" smtClean="0"/>
-              <a:t>26/11/2019</a:t>
+              <a:t>28/11/2019</a:t>
             </a:fld>
             <a:endParaRPr lang="fr-FR"/>
           </a:p>
@@ -26754,7 +26839,7 @@
           <a:p>
             <a:fld id="{22EBEF4F-4056-4A7E-9612-F3E8B502E28B}" type="slidenum">
               <a:rPr lang="fr-FR" smtClean="0"/>
-              <a:t>‹N°›</a:t>
+              <a:t>‹#›</a:t>
             </a:fld>
             <a:endParaRPr lang="fr-FR"/>
           </a:p>
@@ -26807,7 +26892,7 @@
           <a:p>
             <a:fld id="{5BF41AA7-3BDA-4782-B3C5-401728461EBA}" type="datetime1">
               <a:rPr lang="fr-FR" smtClean="0"/>
-              <a:t>26/11/2019</a:t>
+              <a:t>28/11/2019</a:t>
             </a:fld>
             <a:endParaRPr lang="fr-FR"/>
           </a:p>
@@ -26849,7 +26934,7 @@
           <a:p>
             <a:fld id="{22EBEF4F-4056-4A7E-9612-F3E8B502E28B}" type="slidenum">
               <a:rPr lang="fr-FR" smtClean="0"/>
-              <a:t>‹N°›</a:t>
+              <a:t>‹#›</a:t>
             </a:fld>
             <a:endParaRPr lang="fr-FR"/>
           </a:p>
@@ -27056,7 +27141,7 @@
           <a:p>
             <a:fld id="{790D4B45-0ED5-401D-87BF-F27E5AD4E8F6}" type="datetime1">
               <a:rPr lang="fr-FR" smtClean="0"/>
-              <a:t>26/11/2019</a:t>
+              <a:t>28/11/2019</a:t>
             </a:fld>
             <a:endParaRPr lang="fr-FR"/>
           </a:p>
@@ -27098,7 +27183,7 @@
           <a:p>
             <a:fld id="{22EBEF4F-4056-4A7E-9612-F3E8B502E28B}" type="slidenum">
               <a:rPr lang="fr-FR" smtClean="0"/>
-              <a:t>‹N°›</a:t>
+              <a:t>‹#›</a:t>
             </a:fld>
             <a:endParaRPr lang="fr-FR"/>
           </a:p>
@@ -27313,7 +27398,7 @@
           <a:p>
             <a:fld id="{C4BA227D-3211-4923-B058-2465568DA97C}" type="datetime1">
               <a:rPr lang="fr-FR" smtClean="0"/>
-              <a:t>26/11/2019</a:t>
+              <a:t>28/11/2019</a:t>
             </a:fld>
             <a:endParaRPr lang="fr-FR"/>
           </a:p>
@@ -27355,7 +27440,7 @@
           <a:p>
             <a:fld id="{22EBEF4F-4056-4A7E-9612-F3E8B502E28B}" type="slidenum">
               <a:rPr lang="fr-FR" smtClean="0"/>
-              <a:t>‹N°›</a:t>
+              <a:t>‹#›</a:t>
             </a:fld>
             <a:endParaRPr lang="fr-FR"/>
           </a:p>
@@ -27570,7 +27655,7 @@
           <a:p>
             <a:fld id="{33EC2012-1BFF-4C92-91DA-ED5E44E2DAE6}" type="datetime1">
               <a:rPr lang="fr-FR" smtClean="0"/>
-              <a:t>26/11/2019</a:t>
+              <a:t>28/11/2019</a:t>
             </a:fld>
             <a:endParaRPr lang="fr-FR"/>
           </a:p>
@@ -27612,7 +27697,7 @@
           <a:p>
             <a:fld id="{22EBEF4F-4056-4A7E-9612-F3E8B502E28B}" type="slidenum">
               <a:rPr lang="fr-FR" smtClean="0"/>
-              <a:t>‹N°›</a:t>
+              <a:t>‹#›</a:t>
             </a:fld>
             <a:endParaRPr lang="fr-FR"/>
           </a:p>
@@ -27801,7 +27886,7 @@
           <a:p>
             <a:fld id="{36D54C82-D4A8-4BCC-BBE6-5333B0B84731}" type="datetime1">
               <a:rPr lang="fr-FR" smtClean="0"/>
-              <a:t>26/11/2019</a:t>
+              <a:t>28/11/2019</a:t>
             </a:fld>
             <a:endParaRPr lang="fr-FR"/>
           </a:p>
@@ -27853,7 +27938,7 @@
           <a:p>
             <a:fld id="{22EBEF4F-4056-4A7E-9612-F3E8B502E28B}" type="slidenum">
               <a:rPr lang="fr-FR" smtClean="0"/>
-              <a:t>‹N°›</a:t>
+              <a:t>‹#›</a:t>
             </a:fld>
             <a:endParaRPr lang="fr-FR"/>
           </a:p>
@@ -28111,7 +28196,7 @@
           <a:p>
             <a:fld id="{DDD00B7C-7A69-493A-8A97-AE08389BB3D5}" type="datetime1">
               <a:rPr lang="fr-FR" smtClean="0"/>
-              <a:t>26/11/2019</a:t>
+              <a:t>28/11/2019</a:t>
             </a:fld>
             <a:endParaRPr lang="fr-FR"/>
           </a:p>
@@ -28163,7 +28248,7 @@
           <a:p>
             <a:fld id="{22EBEF4F-4056-4A7E-9612-F3E8B502E28B}" type="slidenum">
               <a:rPr lang="fr-FR" smtClean="0"/>
-              <a:t>‹N°›</a:t>
+              <a:t>‹#›</a:t>
             </a:fld>
             <a:endParaRPr lang="fr-FR"/>
           </a:p>
@@ -28642,7 +28727,7 @@
           <a:p>
             <a:fld id="{10EA4304-F7B0-45DA-9970-108CC9362744}" type="datetime1">
               <a:rPr lang="fr-FR" smtClean="0"/>
-              <a:t>26/11/2019</a:t>
+              <a:t>28/11/2019</a:t>
             </a:fld>
             <a:endParaRPr lang="fr-FR"/>
           </a:p>
@@ -28694,7 +28779,7 @@
           <a:p>
             <a:fld id="{22EBEF4F-4056-4A7E-9612-F3E8B502E28B}" type="slidenum">
               <a:rPr lang="fr-FR" smtClean="0"/>
-              <a:t>‹N°›</a:t>
+              <a:t>‹#›</a:t>
             </a:fld>
             <a:endParaRPr lang="fr-FR"/>
           </a:p>
@@ -28883,7 +28968,7 @@
           <a:p>
             <a:fld id="{551B583F-2DDE-447D-8CBF-9525FA0FB806}" type="datetime1">
               <a:rPr lang="fr-FR" smtClean="0"/>
-              <a:t>26/11/2019</a:t>
+              <a:t>28/11/2019</a:t>
             </a:fld>
             <a:endParaRPr lang="fr-FR"/>
           </a:p>
@@ -28935,7 +29020,7 @@
           <a:p>
             <a:fld id="{22EBEF4F-4056-4A7E-9612-F3E8B502E28B}" type="slidenum">
               <a:rPr lang="fr-FR" smtClean="0"/>
-              <a:t>‹N°›</a:t>
+              <a:t>‹#›</a:t>
             </a:fld>
             <a:endParaRPr lang="fr-FR"/>
           </a:p>
@@ -29430,7 +29515,7 @@
           <a:p>
             <a:fld id="{F196D0C2-EC15-4914-BD1C-8DC6D93A7E06}" type="datetime1">
               <a:rPr lang="fr-FR" smtClean="0"/>
-              <a:t>26/11/2019</a:t>
+              <a:t>28/11/2019</a:t>
             </a:fld>
             <a:endParaRPr lang="fr-FR"/>
           </a:p>
@@ -29472,7 +29557,7 @@
           <a:p>
             <a:fld id="{22EBEF4F-4056-4A7E-9612-F3E8B502E28B}" type="slidenum">
               <a:rPr lang="fr-FR" smtClean="0"/>
-              <a:t>‹N°›</a:t>
+              <a:t>‹#›</a:t>
             </a:fld>
             <a:endParaRPr lang="fr-FR"/>
           </a:p>
@@ -30204,7 +30289,7 @@
           <a:p>
             <a:fld id="{B0F0F71C-CB2D-46DF-BBF5-45A6CF07943D}" type="datetime1">
               <a:rPr lang="fr-FR" smtClean="0"/>
-              <a:t>26/11/2019</a:t>
+              <a:t>28/11/2019</a:t>
             </a:fld>
             <a:endParaRPr lang="fr-FR"/>
           </a:p>
@@ -30246,7 +30331,7 @@
           <a:p>
             <a:fld id="{22EBEF4F-4056-4A7E-9612-F3E8B502E28B}" type="slidenum">
               <a:rPr lang="fr-FR" smtClean="0"/>
-              <a:t>‹N°›</a:t>
+              <a:t>‹#›</a:t>
             </a:fld>
             <a:endParaRPr lang="fr-FR"/>
           </a:p>
@@ -30379,7 +30464,7 @@
           <a:p>
             <a:fld id="{D8EE97A0-E3EB-454D-B57B-09208F6C2349}" type="datetime1">
               <a:rPr lang="fr-FR" smtClean="0"/>
-              <a:t>26/11/2019</a:t>
+              <a:t>28/11/2019</a:t>
             </a:fld>
             <a:endParaRPr lang="fr-FR"/>
           </a:p>
@@ -30421,7 +30506,7 @@
           <a:p>
             <a:fld id="{22EBEF4F-4056-4A7E-9612-F3E8B502E28B}" type="slidenum">
               <a:rPr lang="fr-FR" smtClean="0"/>
-              <a:t>‹N°›</a:t>
+              <a:t>‹#›</a:t>
             </a:fld>
             <a:endParaRPr lang="fr-FR"/>
           </a:p>
@@ -30602,7 +30687,7 @@
           <a:p>
             <a:fld id="{0C6102B9-41E8-4E57-8EA6-AB67D80E10AB}" type="datetime1">
               <a:rPr lang="fr-FR" smtClean="0"/>
-              <a:t>26/11/2019</a:t>
+              <a:t>28/11/2019</a:t>
             </a:fld>
             <a:endParaRPr lang="fr-FR"/>
           </a:p>
@@ -30654,7 +30739,7 @@
           <a:p>
             <a:fld id="{22EBEF4F-4056-4A7E-9612-F3E8B502E28B}" type="slidenum">
               <a:rPr lang="fr-FR" smtClean="0"/>
-              <a:t>‹N°›</a:t>
+              <a:t>‹#›</a:t>
             </a:fld>
             <a:endParaRPr lang="fr-FR"/>
           </a:p>
@@ -30844,7 +30929,7 @@
           <a:p>
             <a:fld id="{5EF8BD1A-0AB3-42BB-87D7-511BD450E973}" type="datetime1">
               <a:rPr lang="fr-FR" smtClean="0"/>
-              <a:t>26/11/2019</a:t>
+              <a:t>28/11/2019</a:t>
             </a:fld>
             <a:endParaRPr lang="fr-FR"/>
           </a:p>
@@ -30886,7 +30971,7 @@
           <a:p>
             <a:fld id="{22EBEF4F-4056-4A7E-9612-F3E8B502E28B}" type="slidenum">
               <a:rPr lang="fr-FR" smtClean="0"/>
-              <a:t>‹N°›</a:t>
+              <a:t>‹#›</a:t>
             </a:fld>
             <a:endParaRPr lang="fr-FR"/>
           </a:p>
@@ -31223,7 +31308,7 @@
           <a:p>
             <a:fld id="{F0ED20F9-E137-45C5-9CDB-EB23F7F61742}" type="datetime1">
               <a:rPr lang="fr-FR" smtClean="0"/>
-              <a:t>26/11/2019</a:t>
+              <a:t>28/11/2019</a:t>
             </a:fld>
             <a:endParaRPr lang="fr-FR"/>
           </a:p>
@@ -31265,7 +31350,7 @@
           <a:p>
             <a:fld id="{22EBEF4F-4056-4A7E-9612-F3E8B502E28B}" type="slidenum">
               <a:rPr lang="fr-FR" smtClean="0"/>
-              <a:t>‹N°›</a:t>
+              <a:t>‹#›</a:t>
             </a:fld>
             <a:endParaRPr lang="fr-FR"/>
           </a:p>
@@ -31341,7 +31426,7 @@
           <a:p>
             <a:fld id="{7F549FA9-5419-4577-ACA1-5FA8B1F430E1}" type="datetime1">
               <a:rPr lang="fr-FR" smtClean="0"/>
-              <a:t>26/11/2019</a:t>
+              <a:t>28/11/2019</a:t>
             </a:fld>
             <a:endParaRPr lang="fr-FR"/>
           </a:p>
@@ -31383,7 +31468,7 @@
           <a:p>
             <a:fld id="{22EBEF4F-4056-4A7E-9612-F3E8B502E28B}" type="slidenum">
               <a:rPr lang="fr-FR" smtClean="0"/>
-              <a:t>‹N°›</a:t>
+              <a:t>‹#›</a:t>
             </a:fld>
             <a:endParaRPr lang="fr-FR"/>
           </a:p>
@@ -31436,7 +31521,7 @@
           <a:p>
             <a:fld id="{B732A3B4-D77F-4011-84A4-1CE2C85060AA}" type="datetime1">
               <a:rPr lang="fr-FR" smtClean="0"/>
-              <a:t>26/11/2019</a:t>
+              <a:t>28/11/2019</a:t>
             </a:fld>
             <a:endParaRPr lang="fr-FR"/>
           </a:p>
@@ -31478,7 +31563,7 @@
           <a:p>
             <a:fld id="{22EBEF4F-4056-4A7E-9612-F3E8B502E28B}" type="slidenum">
               <a:rPr lang="fr-FR" smtClean="0"/>
-              <a:t>‹N°›</a:t>
+              <a:t>‹#›</a:t>
             </a:fld>
             <a:endParaRPr lang="fr-FR"/>
           </a:p>
@@ -31685,7 +31770,7 @@
           <a:p>
             <a:fld id="{AFD5C01D-38A9-4545-9F6C-D14ECEB1FB25}" type="datetime1">
               <a:rPr lang="fr-FR" smtClean="0"/>
-              <a:t>26/11/2019</a:t>
+              <a:t>28/11/2019</a:t>
             </a:fld>
             <a:endParaRPr lang="fr-FR"/>
           </a:p>
@@ -31727,7 +31812,7 @@
           <a:p>
             <a:fld id="{22EBEF4F-4056-4A7E-9612-F3E8B502E28B}" type="slidenum">
               <a:rPr lang="fr-FR" smtClean="0"/>
-              <a:t>‹N°›</a:t>
+              <a:t>‹#›</a:t>
             </a:fld>
             <a:endParaRPr lang="fr-FR"/>
           </a:p>
@@ -31942,7 +32027,7 @@
           <a:p>
             <a:fld id="{AD9F5F43-A7C8-4BE7-8EDD-3B94DD5ED3AC}" type="datetime1">
               <a:rPr lang="fr-FR" smtClean="0"/>
-              <a:t>26/11/2019</a:t>
+              <a:t>28/11/2019</a:t>
             </a:fld>
             <a:endParaRPr lang="fr-FR"/>
           </a:p>
@@ -31984,7 +32069,7 @@
           <a:p>
             <a:fld id="{22EBEF4F-4056-4A7E-9612-F3E8B502E28B}" type="slidenum">
               <a:rPr lang="fr-FR" smtClean="0"/>
-              <a:t>‹N°›</a:t>
+              <a:t>‹#›</a:t>
             </a:fld>
             <a:endParaRPr lang="fr-FR"/>
           </a:p>
@@ -32185,7 +32270,7 @@
           <a:p>
             <a:fld id="{C0D22650-866C-43F7-8C91-C810959EF2B7}" type="datetime1">
               <a:rPr lang="fr-FR" smtClean="0"/>
-              <a:t>26/11/2019</a:t>
+              <a:t>28/11/2019</a:t>
             </a:fld>
             <a:endParaRPr lang="fr-FR"/>
           </a:p>
@@ -32263,7 +32348,7 @@
           <a:p>
             <a:fld id="{22EBEF4F-4056-4A7E-9612-F3E8B502E28B}" type="slidenum">
               <a:rPr lang="fr-FR" smtClean="0"/>
-              <a:t>‹N°›</a:t>
+              <a:t>‹#›</a:t>
             </a:fld>
             <a:endParaRPr lang="fr-FR"/>
           </a:p>
@@ -32762,7 +32847,7 @@
           <a:p>
             <a:fld id="{C0D22650-866C-43F7-8C91-C810959EF2B7}" type="datetime1">
               <a:rPr lang="fr-FR" smtClean="0"/>
-              <a:t>26/11/2019</a:t>
+              <a:t>28/11/2019</a:t>
             </a:fld>
             <a:endParaRPr lang="fr-FR"/>
           </a:p>
@@ -32840,7 +32925,7 @@
           <a:p>
             <a:fld id="{22EBEF4F-4056-4A7E-9612-F3E8B502E28B}" type="slidenum">
               <a:rPr lang="fr-FR" smtClean="0"/>
-              <a:t>‹N°›</a:t>
+              <a:t>‹#›</a:t>
             </a:fld>
             <a:endParaRPr lang="fr-FR"/>
           </a:p>
@@ -33578,6 +33663,1204 @@
       </p:grpSpPr>
       <p:sp>
         <p:nvSpPr>
+          <p:cNvPr id="2" name="Titre 1">
+            <a:extLst>
+              <a:ext uri="{FF2B5EF4-FFF2-40B4-BE49-F238E27FC236}">
+                <a16:creationId xmlns:a16="http://schemas.microsoft.com/office/drawing/2014/main" id="{3EEEBCC2-CED2-436F-9CA0-FA371E85D1C5}"/>
+              </a:ext>
+            </a:extLst>
+          </p:cNvPr>
+          <p:cNvSpPr>
+            <a:spLocks noGrp="1"/>
+          </p:cNvSpPr>
+          <p:nvPr>
+            <p:ph type="title"/>
+          </p:nvPr>
+        </p:nvSpPr>
+        <p:spPr>
+          <a:xfrm>
+            <a:off x="2409040" y="17452"/>
+            <a:ext cx="8610600" cy="1293028"/>
+          </a:xfrm>
+        </p:spPr>
+        <p:txBody>
+          <a:bodyPr/>
+          <a:lstStyle/>
+          <a:p>
+            <a:r>
+              <a:rPr lang="fr-FR" sz="3600" cap="small" dirty="0"/>
+              <a:t>Interprétabilité</a:t>
+            </a:r>
+          </a:p>
+        </p:txBody>
+      </p:sp>
+      <p:pic>
+        <p:nvPicPr>
+          <p:cNvPr id="6" name="Espace réservé du contenu 5">
+            <a:extLst>
+              <a:ext uri="{FF2B5EF4-FFF2-40B4-BE49-F238E27FC236}">
+                <a16:creationId xmlns:a16="http://schemas.microsoft.com/office/drawing/2014/main" id="{970C91BE-C969-4EF2-9164-BB2F0D97E4CB}"/>
+              </a:ext>
+            </a:extLst>
+          </p:cNvPr>
+          <p:cNvPicPr>
+            <a:picLocks noGrp="1" noChangeAspect="1"/>
+          </p:cNvPicPr>
+          <p:nvPr>
+            <p:ph idx="1"/>
+          </p:nvPr>
+        </p:nvPicPr>
+        <p:blipFill>
+          <a:blip r:embed="rId2"/>
+          <a:stretch>
+            <a:fillRect/>
+          </a:stretch>
+        </p:blipFill>
+        <p:spPr>
+          <a:xfrm>
+            <a:off x="11216444" y="5919398"/>
+            <a:ext cx="904793" cy="827765"/>
+          </a:xfrm>
+          <a:prstGeom prst="rect">
+            <a:avLst/>
+          </a:prstGeom>
+        </p:spPr>
+      </p:pic>
+      <p:sp>
+        <p:nvSpPr>
+          <p:cNvPr id="4" name="Espace réservé du numéro de diapositive 3">
+            <a:extLst>
+              <a:ext uri="{FF2B5EF4-FFF2-40B4-BE49-F238E27FC236}">
+                <a16:creationId xmlns:a16="http://schemas.microsoft.com/office/drawing/2014/main" id="{0D1F85B1-90BF-48DF-AC04-9DBB845D9362}"/>
+              </a:ext>
+            </a:extLst>
+          </p:cNvPr>
+          <p:cNvSpPr>
+            <a:spLocks noGrp="1"/>
+          </p:cNvSpPr>
+          <p:nvPr>
+            <p:ph type="sldNum" sz="quarter" idx="12"/>
+          </p:nvPr>
+        </p:nvSpPr>
+        <p:spPr/>
+        <p:txBody>
+          <a:bodyPr/>
+          <a:lstStyle/>
+          <a:p>
+            <a:fld id="{22EBEF4F-4056-4A7E-9612-F3E8B502E28B}" type="slidenum">
+              <a:rPr lang="fr-FR" smtClean="0"/>
+              <a:t>10</a:t>
+            </a:fld>
+            <a:endParaRPr lang="fr-FR"/>
+          </a:p>
+        </p:txBody>
+      </p:sp>
+      <p:grpSp>
+        <p:nvGrpSpPr>
+          <p:cNvPr id="28" name="Groupe 27">
+            <a:extLst>
+              <a:ext uri="{FF2B5EF4-FFF2-40B4-BE49-F238E27FC236}">
+                <a16:creationId xmlns:a16="http://schemas.microsoft.com/office/drawing/2014/main" id="{5C7968B1-38C1-4BFC-833F-16013AB76CD9}"/>
+              </a:ext>
+            </a:extLst>
+          </p:cNvPr>
+          <p:cNvGrpSpPr/>
+          <p:nvPr/>
+        </p:nvGrpSpPr>
+        <p:grpSpPr>
+          <a:xfrm>
+            <a:off x="378543" y="1298925"/>
+            <a:ext cx="11155467" cy="2719318"/>
+            <a:chOff x="378543" y="1298925"/>
+            <a:chExt cx="11155467" cy="2719318"/>
+          </a:xfrm>
+        </p:grpSpPr>
+        <p:sp>
+          <p:nvSpPr>
+            <p:cNvPr id="12" name="Cube 11">
+              <a:extLst>
+                <a:ext uri="{FF2B5EF4-FFF2-40B4-BE49-F238E27FC236}">
+                  <a16:creationId xmlns:a16="http://schemas.microsoft.com/office/drawing/2014/main" id="{53E7DD06-59A1-4820-B127-C0F6B143B44B}"/>
+                </a:ext>
+              </a:extLst>
+            </p:cNvPr>
+            <p:cNvSpPr/>
+            <p:nvPr/>
+          </p:nvSpPr>
+          <p:spPr>
+            <a:xfrm>
+              <a:off x="7506585" y="1638995"/>
+              <a:ext cx="1495735" cy="1484197"/>
+            </a:xfrm>
+            <a:prstGeom prst="cube">
+              <a:avLst/>
+            </a:prstGeom>
+            <a:solidFill>
+              <a:schemeClr val="bg1"/>
+            </a:solidFill>
+            <a:ln w="44450">
+              <a:solidFill>
+                <a:schemeClr val="tx1"/>
+              </a:solidFill>
+            </a:ln>
+          </p:spPr>
+          <p:style>
+            <a:lnRef idx="2">
+              <a:schemeClr val="accent1">
+                <a:shade val="50000"/>
+              </a:schemeClr>
+            </a:lnRef>
+            <a:fillRef idx="1">
+              <a:schemeClr val="accent1"/>
+            </a:fillRef>
+            <a:effectRef idx="0">
+              <a:schemeClr val="accent1"/>
+            </a:effectRef>
+            <a:fontRef idx="minor">
+              <a:schemeClr val="lt1"/>
+            </a:fontRef>
+          </p:style>
+          <p:txBody>
+            <a:bodyPr rtlCol="0" anchor="ctr"/>
+            <a:lstStyle/>
+            <a:p>
+              <a:pPr algn="ctr"/>
+              <a:r>
+                <a:rPr lang="fr-FR" sz="4800" b="1" dirty="0">
+                  <a:latin typeface="Times New Roman" panose="02020603050405020304" pitchFamily="18" charset="0"/>
+                  <a:cs typeface="Times New Roman" panose="02020603050405020304" pitchFamily="18" charset="0"/>
+                </a:rPr>
+                <a:t>?</a:t>
+              </a:r>
+            </a:p>
+          </p:txBody>
+        </p:sp>
+        <p:pic>
+          <p:nvPicPr>
+            <p:cNvPr id="16" name="Graphique 15" descr="Statistiques">
+              <a:extLst>
+                <a:ext uri="{FF2B5EF4-FFF2-40B4-BE49-F238E27FC236}">
+                  <a16:creationId xmlns:a16="http://schemas.microsoft.com/office/drawing/2014/main" id="{B2E1C465-2BEC-49AD-8A55-15CD5C166995}"/>
+                </a:ext>
+              </a:extLst>
+            </p:cNvPr>
+            <p:cNvPicPr>
+              <a:picLocks noChangeAspect="1"/>
+            </p:cNvPicPr>
+            <p:nvPr/>
+          </p:nvPicPr>
+          <p:blipFill>
+            <a:blip r:embed="rId3">
+              <a:extLst>
+                <a:ext uri="{28A0092B-C50C-407E-A947-70E740481C1C}">
+                  <a14:useLocalDpi xmlns:a14="http://schemas.microsoft.com/office/drawing/2010/main" val="0"/>
+                </a:ext>
+                <a:ext uri="{96DAC541-7B7A-43D3-8B79-37D633B846F1}">
+                  <asvg:svgBlip xmlns:asvg="http://schemas.microsoft.com/office/drawing/2016/SVG/main" r:embed="rId4"/>
+                </a:ext>
+              </a:extLst>
+            </a:blip>
+            <a:stretch>
+              <a:fillRect/>
+            </a:stretch>
+          </p:blipFill>
+          <p:spPr>
+            <a:xfrm>
+              <a:off x="9775308" y="1486831"/>
+              <a:ext cx="1758268" cy="1758268"/>
+            </a:xfrm>
+            <a:prstGeom prst="rect">
+              <a:avLst/>
+            </a:prstGeom>
+          </p:spPr>
+        </p:pic>
+        <p:pic>
+          <p:nvPicPr>
+            <p:cNvPr id="18" name="Graphique 17" descr="Base de données">
+              <a:extLst>
+                <a:ext uri="{FF2B5EF4-FFF2-40B4-BE49-F238E27FC236}">
+                  <a16:creationId xmlns:a16="http://schemas.microsoft.com/office/drawing/2014/main" id="{200AD8DC-526C-45DC-946A-CBA7D10B9E59}"/>
+                </a:ext>
+              </a:extLst>
+            </p:cNvPr>
+            <p:cNvPicPr>
+              <a:picLocks noChangeAspect="1"/>
+            </p:cNvPicPr>
+            <p:nvPr/>
+          </p:nvPicPr>
+          <p:blipFill>
+            <a:blip r:embed="rId5">
+              <a:extLst>
+                <a:ext uri="{28A0092B-C50C-407E-A947-70E740481C1C}">
+                  <a14:useLocalDpi xmlns:a14="http://schemas.microsoft.com/office/drawing/2010/main" val="0"/>
+                </a:ext>
+                <a:ext uri="{96DAC541-7B7A-43D3-8B79-37D633B846F1}">
+                  <asvg:svgBlip xmlns:asvg="http://schemas.microsoft.com/office/drawing/2016/SVG/main" r:embed="rId6"/>
+                </a:ext>
+              </a:extLst>
+            </a:blip>
+            <a:stretch>
+              <a:fillRect/>
+            </a:stretch>
+          </p:blipFill>
+          <p:spPr>
+            <a:xfrm>
+              <a:off x="378543" y="1398503"/>
+              <a:ext cx="2030497" cy="2030497"/>
+            </a:xfrm>
+            <a:prstGeom prst="rect">
+              <a:avLst/>
+            </a:prstGeom>
+          </p:spPr>
+        </p:pic>
+        <p:sp>
+          <p:nvSpPr>
+            <p:cNvPr id="19" name="Rectangle : coins arrondis 18">
+              <a:extLst>
+                <a:ext uri="{FF2B5EF4-FFF2-40B4-BE49-F238E27FC236}">
+                  <a16:creationId xmlns:a16="http://schemas.microsoft.com/office/drawing/2014/main" id="{7BF85BA5-8782-4149-AFD1-AFEFFEF0501F}"/>
+                </a:ext>
+              </a:extLst>
+            </p:cNvPr>
+            <p:cNvSpPr/>
+            <p:nvPr/>
+          </p:nvSpPr>
+          <p:spPr>
+            <a:xfrm>
+              <a:off x="673504" y="3480264"/>
+              <a:ext cx="1342023" cy="537979"/>
+            </a:xfrm>
+            <a:prstGeom prst="roundRect">
+              <a:avLst/>
+            </a:prstGeom>
+            <a:solidFill>
+              <a:schemeClr val="bg1"/>
+            </a:solidFill>
+            <a:ln w="28575">
+              <a:solidFill>
+                <a:schemeClr val="tx1"/>
+              </a:solidFill>
+            </a:ln>
+          </p:spPr>
+          <p:style>
+            <a:lnRef idx="2">
+              <a:schemeClr val="accent1">
+                <a:shade val="50000"/>
+              </a:schemeClr>
+            </a:lnRef>
+            <a:fillRef idx="1">
+              <a:schemeClr val="accent1"/>
+            </a:fillRef>
+            <a:effectRef idx="0">
+              <a:schemeClr val="accent1"/>
+            </a:effectRef>
+            <a:fontRef idx="minor">
+              <a:schemeClr val="lt1"/>
+            </a:fontRef>
+          </p:style>
+          <p:txBody>
+            <a:bodyPr rtlCol="0" anchor="ctr"/>
+            <a:lstStyle/>
+            <a:p>
+              <a:pPr algn="ctr"/>
+              <a:r>
+                <a:rPr lang="fr-FR" dirty="0"/>
+                <a:t>ORIGINAL FEATURES</a:t>
+              </a:r>
+            </a:p>
+          </p:txBody>
+        </p:sp>
+        <p:sp>
+          <p:nvSpPr>
+            <p:cNvPr id="21" name="Rectangle : coins arrondis 20">
+              <a:extLst>
+                <a:ext uri="{FF2B5EF4-FFF2-40B4-BE49-F238E27FC236}">
+                  <a16:creationId xmlns:a16="http://schemas.microsoft.com/office/drawing/2014/main" id="{2F6A878F-C608-48BA-9453-C41111D1BCFD}"/>
+                </a:ext>
+              </a:extLst>
+            </p:cNvPr>
+            <p:cNvSpPr/>
+            <p:nvPr/>
+          </p:nvSpPr>
+          <p:spPr>
+            <a:xfrm>
+              <a:off x="2746457" y="3479439"/>
+              <a:ext cx="1782053" cy="537979"/>
+            </a:xfrm>
+            <a:prstGeom prst="roundRect">
+              <a:avLst/>
+            </a:prstGeom>
+            <a:solidFill>
+              <a:schemeClr val="bg1"/>
+            </a:solidFill>
+            <a:ln w="28575">
+              <a:solidFill>
+                <a:schemeClr val="tx1"/>
+              </a:solidFill>
+            </a:ln>
+          </p:spPr>
+          <p:style>
+            <a:lnRef idx="2">
+              <a:schemeClr val="accent1">
+                <a:shade val="50000"/>
+              </a:schemeClr>
+            </a:lnRef>
+            <a:fillRef idx="1">
+              <a:schemeClr val="accent1"/>
+            </a:fillRef>
+            <a:effectRef idx="0">
+              <a:schemeClr val="accent1"/>
+            </a:effectRef>
+            <a:fontRef idx="minor">
+              <a:schemeClr val="lt1"/>
+            </a:fontRef>
+          </p:style>
+          <p:txBody>
+            <a:bodyPr rtlCol="0" anchor="ctr"/>
+            <a:lstStyle/>
+            <a:p>
+              <a:pPr algn="ctr"/>
+              <a:r>
+                <a:rPr lang="fr-FR" dirty="0"/>
+                <a:t>FEATURES’</a:t>
+              </a:r>
+            </a:p>
+            <a:p>
+              <a:pPr algn="ctr"/>
+              <a:r>
+                <a:rPr lang="fr-FR" dirty="0"/>
+                <a:t>ENGINEERING</a:t>
+              </a:r>
+            </a:p>
+          </p:txBody>
+        </p:sp>
+        <p:pic>
+          <p:nvPicPr>
+            <p:cNvPr id="23" name="Graphique 22" descr="Tête avec engrenages">
+              <a:extLst>
+                <a:ext uri="{FF2B5EF4-FFF2-40B4-BE49-F238E27FC236}">
+                  <a16:creationId xmlns:a16="http://schemas.microsoft.com/office/drawing/2014/main" id="{2865341C-A282-4DFB-A09A-18363E0ACED1}"/>
+                </a:ext>
+              </a:extLst>
+            </p:cNvPr>
+            <p:cNvPicPr>
+              <a:picLocks noChangeAspect="1"/>
+            </p:cNvPicPr>
+            <p:nvPr/>
+          </p:nvPicPr>
+          <p:blipFill>
+            <a:blip r:embed="rId7">
+              <a:extLst>
+                <a:ext uri="{28A0092B-C50C-407E-A947-70E740481C1C}">
+                  <a14:useLocalDpi xmlns:a14="http://schemas.microsoft.com/office/drawing/2010/main" val="0"/>
+                </a:ext>
+                <a:ext uri="{96DAC541-7B7A-43D3-8B79-37D633B846F1}">
+                  <asvg:svgBlip xmlns:asvg="http://schemas.microsoft.com/office/drawing/2016/SVG/main" r:embed="rId8"/>
+                </a:ext>
+              </a:extLst>
+            </a:blip>
+            <a:stretch>
+              <a:fillRect/>
+            </a:stretch>
+          </p:blipFill>
+          <p:spPr>
+            <a:xfrm>
+              <a:off x="3070263" y="1638995"/>
+              <a:ext cx="1418912" cy="1418912"/>
+            </a:xfrm>
+            <a:prstGeom prst="rect">
+              <a:avLst/>
+            </a:prstGeom>
+          </p:spPr>
+        </p:pic>
+        <p:pic>
+          <p:nvPicPr>
+            <p:cNvPr id="24" name="Graphique 23" descr="Base de données">
+              <a:extLst>
+                <a:ext uri="{FF2B5EF4-FFF2-40B4-BE49-F238E27FC236}">
+                  <a16:creationId xmlns:a16="http://schemas.microsoft.com/office/drawing/2014/main" id="{F1DBBBCC-747F-45F0-95BC-9EEE2635CF32}"/>
+                </a:ext>
+              </a:extLst>
+            </p:cNvPr>
+            <p:cNvPicPr>
+              <a:picLocks noChangeAspect="1"/>
+            </p:cNvPicPr>
+            <p:nvPr/>
+          </p:nvPicPr>
+          <p:blipFill>
+            <a:blip r:embed="rId5">
+              <a:extLst>
+                <a:ext uri="{28A0092B-C50C-407E-A947-70E740481C1C}">
+                  <a14:useLocalDpi xmlns:a14="http://schemas.microsoft.com/office/drawing/2010/main" val="0"/>
+                </a:ext>
+                <a:ext uri="{96DAC541-7B7A-43D3-8B79-37D633B846F1}">
+                  <asvg:svgBlip xmlns:asvg="http://schemas.microsoft.com/office/drawing/2016/SVG/main" r:embed="rId6"/>
+                </a:ext>
+              </a:extLst>
+            </a:blip>
+            <a:stretch>
+              <a:fillRect/>
+            </a:stretch>
+          </p:blipFill>
+          <p:spPr>
+            <a:xfrm>
+              <a:off x="5076925" y="1298925"/>
+              <a:ext cx="2030497" cy="2030497"/>
+            </a:xfrm>
+            <a:prstGeom prst="rect">
+              <a:avLst/>
+            </a:prstGeom>
+          </p:spPr>
+        </p:pic>
+        <p:sp>
+          <p:nvSpPr>
+            <p:cNvPr id="25" name="Rectangle : coins arrondis 24">
+              <a:extLst>
+                <a:ext uri="{FF2B5EF4-FFF2-40B4-BE49-F238E27FC236}">
+                  <a16:creationId xmlns:a16="http://schemas.microsoft.com/office/drawing/2014/main" id="{9090EBA1-1099-4EF2-9DCF-C452175FAE4F}"/>
+                </a:ext>
+              </a:extLst>
+            </p:cNvPr>
+            <p:cNvSpPr/>
+            <p:nvPr/>
+          </p:nvSpPr>
+          <p:spPr>
+            <a:xfrm>
+              <a:off x="5259440" y="3479439"/>
+              <a:ext cx="1643824" cy="537979"/>
+            </a:xfrm>
+            <a:prstGeom prst="roundRect">
+              <a:avLst/>
+            </a:prstGeom>
+            <a:solidFill>
+              <a:schemeClr val="bg1"/>
+            </a:solidFill>
+            <a:ln w="28575">
+              <a:solidFill>
+                <a:schemeClr val="tx1"/>
+              </a:solidFill>
+            </a:ln>
+          </p:spPr>
+          <p:style>
+            <a:lnRef idx="2">
+              <a:schemeClr val="accent1">
+                <a:shade val="50000"/>
+              </a:schemeClr>
+            </a:lnRef>
+            <a:fillRef idx="1">
+              <a:schemeClr val="accent1"/>
+            </a:fillRef>
+            <a:effectRef idx="0">
+              <a:schemeClr val="accent1"/>
+            </a:effectRef>
+            <a:fontRef idx="minor">
+              <a:schemeClr val="lt1"/>
+            </a:fontRef>
+          </p:style>
+          <p:txBody>
+            <a:bodyPr rtlCol="0" anchor="ctr"/>
+            <a:lstStyle/>
+            <a:p>
+              <a:pPr algn="ctr"/>
+              <a:r>
+                <a:rPr lang="fr-FR" dirty="0"/>
+                <a:t>PROCESSED DATA</a:t>
+              </a:r>
+            </a:p>
+          </p:txBody>
+        </p:sp>
+        <p:sp>
+          <p:nvSpPr>
+            <p:cNvPr id="26" name="Rectangle : coins arrondis 25">
+              <a:extLst>
+                <a:ext uri="{FF2B5EF4-FFF2-40B4-BE49-F238E27FC236}">
+                  <a16:creationId xmlns:a16="http://schemas.microsoft.com/office/drawing/2014/main" id="{26A176E4-4DDC-46BE-AEAE-66FB37B858BA}"/>
+                </a:ext>
+              </a:extLst>
+            </p:cNvPr>
+            <p:cNvSpPr/>
+            <p:nvPr/>
+          </p:nvSpPr>
+          <p:spPr>
+            <a:xfrm>
+              <a:off x="7487783" y="3479439"/>
+              <a:ext cx="1514537" cy="537979"/>
+            </a:xfrm>
+            <a:prstGeom prst="roundRect">
+              <a:avLst/>
+            </a:prstGeom>
+            <a:solidFill>
+              <a:schemeClr val="bg1"/>
+            </a:solidFill>
+            <a:ln w="28575">
+              <a:solidFill>
+                <a:schemeClr val="tx1"/>
+              </a:solidFill>
+            </a:ln>
+          </p:spPr>
+          <p:style>
+            <a:lnRef idx="2">
+              <a:schemeClr val="accent1">
+                <a:shade val="50000"/>
+              </a:schemeClr>
+            </a:lnRef>
+            <a:fillRef idx="1">
+              <a:schemeClr val="accent1"/>
+            </a:fillRef>
+            <a:effectRef idx="0">
+              <a:schemeClr val="accent1"/>
+            </a:effectRef>
+            <a:fontRef idx="minor">
+              <a:schemeClr val="lt1"/>
+            </a:fontRef>
+          </p:style>
+          <p:txBody>
+            <a:bodyPr rtlCol="0" anchor="ctr"/>
+            <a:lstStyle/>
+            <a:p>
+              <a:pPr algn="ctr"/>
+              <a:r>
+                <a:rPr lang="fr-FR" dirty="0"/>
+                <a:t>MODEL</a:t>
+              </a:r>
+            </a:p>
+          </p:txBody>
+        </p:sp>
+        <p:sp>
+          <p:nvSpPr>
+            <p:cNvPr id="27" name="Rectangle : coins arrondis 26">
+              <a:extLst>
+                <a:ext uri="{FF2B5EF4-FFF2-40B4-BE49-F238E27FC236}">
+                  <a16:creationId xmlns:a16="http://schemas.microsoft.com/office/drawing/2014/main" id="{12BFE275-AE48-43D9-AFAD-A11A043A8A3B}"/>
+                </a:ext>
+              </a:extLst>
+            </p:cNvPr>
+            <p:cNvSpPr/>
+            <p:nvPr/>
+          </p:nvSpPr>
+          <p:spPr>
+            <a:xfrm>
+              <a:off x="9810770" y="3479439"/>
+              <a:ext cx="1723240" cy="537979"/>
+            </a:xfrm>
+            <a:prstGeom prst="roundRect">
+              <a:avLst/>
+            </a:prstGeom>
+            <a:solidFill>
+              <a:schemeClr val="bg1"/>
+            </a:solidFill>
+            <a:ln w="28575">
+              <a:solidFill>
+                <a:schemeClr val="tx1"/>
+              </a:solidFill>
+            </a:ln>
+          </p:spPr>
+          <p:style>
+            <a:lnRef idx="2">
+              <a:schemeClr val="accent1">
+                <a:shade val="50000"/>
+              </a:schemeClr>
+            </a:lnRef>
+            <a:fillRef idx="1">
+              <a:schemeClr val="accent1"/>
+            </a:fillRef>
+            <a:effectRef idx="0">
+              <a:schemeClr val="accent1"/>
+            </a:effectRef>
+            <a:fontRef idx="minor">
+              <a:schemeClr val="lt1"/>
+            </a:fontRef>
+          </p:style>
+          <p:txBody>
+            <a:bodyPr rtlCol="0" anchor="ctr"/>
+            <a:lstStyle/>
+            <a:p>
+              <a:pPr algn="ctr"/>
+              <a:r>
+                <a:rPr lang="fr-FR" dirty="0"/>
+                <a:t>PREDICTIONS</a:t>
+              </a:r>
+            </a:p>
+          </p:txBody>
+        </p:sp>
+      </p:grpSp>
+      <p:cxnSp>
+        <p:nvCxnSpPr>
+          <p:cNvPr id="32" name="Connecteur droit avec flèche 31">
+            <a:extLst>
+              <a:ext uri="{FF2B5EF4-FFF2-40B4-BE49-F238E27FC236}">
+                <a16:creationId xmlns:a16="http://schemas.microsoft.com/office/drawing/2014/main" id="{507EDF09-EAF0-41D5-A81E-254E0130A532}"/>
+              </a:ext>
+            </a:extLst>
+          </p:cNvPr>
+          <p:cNvCxnSpPr>
+            <a:cxnSpLocks/>
+            <a:stCxn id="19" idx="3"/>
+            <a:endCxn id="21" idx="1"/>
+          </p:cNvCxnSpPr>
+          <p:nvPr/>
+        </p:nvCxnSpPr>
+        <p:spPr>
+          <a:xfrm flipV="1">
+            <a:off x="2015527" y="3748429"/>
+            <a:ext cx="730930" cy="825"/>
+          </a:xfrm>
+          <a:prstGeom prst="straightConnector1">
+            <a:avLst/>
+          </a:prstGeom>
+          <a:ln w="50800">
+            <a:solidFill>
+              <a:schemeClr val="tx1"/>
+            </a:solidFill>
+            <a:tailEnd type="triangle"/>
+          </a:ln>
+        </p:spPr>
+        <p:style>
+          <a:lnRef idx="1">
+            <a:schemeClr val="accent1"/>
+          </a:lnRef>
+          <a:fillRef idx="0">
+            <a:schemeClr val="accent1"/>
+          </a:fillRef>
+          <a:effectRef idx="0">
+            <a:schemeClr val="accent1"/>
+          </a:effectRef>
+          <a:fontRef idx="minor">
+            <a:schemeClr val="tx1"/>
+          </a:fontRef>
+        </p:style>
+      </p:cxnSp>
+      <p:cxnSp>
+        <p:nvCxnSpPr>
+          <p:cNvPr id="36" name="Connecteur droit avec flèche 35">
+            <a:extLst>
+              <a:ext uri="{FF2B5EF4-FFF2-40B4-BE49-F238E27FC236}">
+                <a16:creationId xmlns:a16="http://schemas.microsoft.com/office/drawing/2014/main" id="{1F82D370-D219-43F4-A45A-07621D36F387}"/>
+              </a:ext>
+            </a:extLst>
+          </p:cNvPr>
+          <p:cNvCxnSpPr>
+            <a:cxnSpLocks/>
+            <a:stCxn id="21" idx="3"/>
+            <a:endCxn id="25" idx="1"/>
+          </p:cNvCxnSpPr>
+          <p:nvPr/>
+        </p:nvCxnSpPr>
+        <p:spPr>
+          <a:xfrm>
+            <a:off x="4528510" y="3748429"/>
+            <a:ext cx="730930" cy="0"/>
+          </a:xfrm>
+          <a:prstGeom prst="straightConnector1">
+            <a:avLst/>
+          </a:prstGeom>
+          <a:ln w="50800">
+            <a:solidFill>
+              <a:schemeClr val="tx1"/>
+            </a:solidFill>
+            <a:tailEnd type="triangle"/>
+          </a:ln>
+        </p:spPr>
+        <p:style>
+          <a:lnRef idx="1">
+            <a:schemeClr val="accent1"/>
+          </a:lnRef>
+          <a:fillRef idx="0">
+            <a:schemeClr val="accent1"/>
+          </a:fillRef>
+          <a:effectRef idx="0">
+            <a:schemeClr val="accent1"/>
+          </a:effectRef>
+          <a:fontRef idx="minor">
+            <a:schemeClr val="tx1"/>
+          </a:fontRef>
+        </p:style>
+      </p:cxnSp>
+      <p:cxnSp>
+        <p:nvCxnSpPr>
+          <p:cNvPr id="37" name="Connecteur droit avec flèche 36">
+            <a:extLst>
+              <a:ext uri="{FF2B5EF4-FFF2-40B4-BE49-F238E27FC236}">
+                <a16:creationId xmlns:a16="http://schemas.microsoft.com/office/drawing/2014/main" id="{25ED32BD-600D-4334-A804-C9C9FC4B5215}"/>
+              </a:ext>
+            </a:extLst>
+          </p:cNvPr>
+          <p:cNvCxnSpPr>
+            <a:cxnSpLocks/>
+            <a:stCxn id="25" idx="3"/>
+            <a:endCxn id="26" idx="1"/>
+          </p:cNvCxnSpPr>
+          <p:nvPr/>
+        </p:nvCxnSpPr>
+        <p:spPr>
+          <a:xfrm>
+            <a:off x="6903264" y="3748429"/>
+            <a:ext cx="584519" cy="0"/>
+          </a:xfrm>
+          <a:prstGeom prst="straightConnector1">
+            <a:avLst/>
+          </a:prstGeom>
+          <a:ln w="50800">
+            <a:solidFill>
+              <a:schemeClr val="tx1"/>
+            </a:solidFill>
+            <a:tailEnd type="triangle"/>
+          </a:ln>
+        </p:spPr>
+        <p:style>
+          <a:lnRef idx="1">
+            <a:schemeClr val="accent1"/>
+          </a:lnRef>
+          <a:fillRef idx="0">
+            <a:schemeClr val="accent1"/>
+          </a:fillRef>
+          <a:effectRef idx="0">
+            <a:schemeClr val="accent1"/>
+          </a:effectRef>
+          <a:fontRef idx="minor">
+            <a:schemeClr val="tx1"/>
+          </a:fontRef>
+        </p:style>
+      </p:cxnSp>
+      <p:cxnSp>
+        <p:nvCxnSpPr>
+          <p:cNvPr id="38" name="Connecteur droit avec flèche 37">
+            <a:extLst>
+              <a:ext uri="{FF2B5EF4-FFF2-40B4-BE49-F238E27FC236}">
+                <a16:creationId xmlns:a16="http://schemas.microsoft.com/office/drawing/2014/main" id="{D1E3B51E-2BEA-4D2E-B3F0-EAA910384C4C}"/>
+              </a:ext>
+            </a:extLst>
+          </p:cNvPr>
+          <p:cNvCxnSpPr>
+            <a:cxnSpLocks/>
+            <a:stCxn id="26" idx="3"/>
+            <a:endCxn id="27" idx="1"/>
+          </p:cNvCxnSpPr>
+          <p:nvPr/>
+        </p:nvCxnSpPr>
+        <p:spPr>
+          <a:xfrm>
+            <a:off x="9002320" y="3748429"/>
+            <a:ext cx="808450" cy="0"/>
+          </a:xfrm>
+          <a:prstGeom prst="straightConnector1">
+            <a:avLst/>
+          </a:prstGeom>
+          <a:ln w="50800">
+            <a:solidFill>
+              <a:schemeClr val="tx1"/>
+            </a:solidFill>
+            <a:tailEnd type="triangle"/>
+          </a:ln>
+        </p:spPr>
+        <p:style>
+          <a:lnRef idx="1">
+            <a:schemeClr val="accent1"/>
+          </a:lnRef>
+          <a:fillRef idx="0">
+            <a:schemeClr val="accent1"/>
+          </a:fillRef>
+          <a:effectRef idx="0">
+            <a:schemeClr val="accent1"/>
+          </a:effectRef>
+          <a:fontRef idx="minor">
+            <a:schemeClr val="tx1"/>
+          </a:fontRef>
+        </p:style>
+      </p:cxnSp>
+      <p:cxnSp>
+        <p:nvCxnSpPr>
+          <p:cNvPr id="42" name="Connecteur : en angle 41">
+            <a:extLst>
+              <a:ext uri="{FF2B5EF4-FFF2-40B4-BE49-F238E27FC236}">
+                <a16:creationId xmlns:a16="http://schemas.microsoft.com/office/drawing/2014/main" id="{B7FFD4A5-6748-4F08-88BB-CB1E1ADA66D6}"/>
+              </a:ext>
+            </a:extLst>
+          </p:cNvPr>
+          <p:cNvCxnSpPr>
+            <a:cxnSpLocks/>
+            <a:stCxn id="19" idx="2"/>
+            <a:endCxn id="29" idx="1"/>
+          </p:cNvCxnSpPr>
+          <p:nvPr/>
+        </p:nvCxnSpPr>
+        <p:spPr>
+          <a:xfrm rot="16200000" flipH="1">
+            <a:off x="2153046" y="3209713"/>
+            <a:ext cx="2151453" cy="3768512"/>
+          </a:xfrm>
+          <a:prstGeom prst="bentConnector2">
+            <a:avLst/>
+          </a:prstGeom>
+          <a:ln w="50800">
+            <a:solidFill>
+              <a:schemeClr val="tx1"/>
+            </a:solidFill>
+            <a:tailEnd type="triangle"/>
+          </a:ln>
+        </p:spPr>
+        <p:style>
+          <a:lnRef idx="1">
+            <a:schemeClr val="accent1"/>
+          </a:lnRef>
+          <a:fillRef idx="0">
+            <a:schemeClr val="accent1"/>
+          </a:fillRef>
+          <a:effectRef idx="0">
+            <a:schemeClr val="accent1"/>
+          </a:effectRef>
+          <a:fontRef idx="minor">
+            <a:schemeClr val="tx1"/>
+          </a:fontRef>
+        </p:style>
+      </p:cxnSp>
+      <p:cxnSp>
+        <p:nvCxnSpPr>
+          <p:cNvPr id="52" name="Connecteur : en angle 51">
+            <a:extLst>
+              <a:ext uri="{FF2B5EF4-FFF2-40B4-BE49-F238E27FC236}">
+                <a16:creationId xmlns:a16="http://schemas.microsoft.com/office/drawing/2014/main" id="{1085DB9D-D48E-416C-B008-EF17D05C77C9}"/>
+              </a:ext>
+            </a:extLst>
+          </p:cNvPr>
+          <p:cNvCxnSpPr>
+            <a:cxnSpLocks/>
+            <a:stCxn id="29" idx="3"/>
+            <a:endCxn id="27" idx="2"/>
+          </p:cNvCxnSpPr>
+          <p:nvPr/>
+        </p:nvCxnSpPr>
+        <p:spPr>
+          <a:xfrm flipV="1">
+            <a:off x="7083775" y="4017418"/>
+            <a:ext cx="3588615" cy="2152278"/>
+          </a:xfrm>
+          <a:prstGeom prst="bentConnector2">
+            <a:avLst/>
+          </a:prstGeom>
+          <a:ln w="50800">
+            <a:solidFill>
+              <a:schemeClr val="tx1"/>
+            </a:solidFill>
+            <a:tailEnd type="triangle"/>
+          </a:ln>
+        </p:spPr>
+        <p:style>
+          <a:lnRef idx="1">
+            <a:schemeClr val="accent1"/>
+          </a:lnRef>
+          <a:fillRef idx="0">
+            <a:schemeClr val="accent1"/>
+          </a:fillRef>
+          <a:effectRef idx="0">
+            <a:schemeClr val="accent1"/>
+          </a:effectRef>
+          <a:fontRef idx="minor">
+            <a:schemeClr val="tx1"/>
+          </a:fontRef>
+        </p:style>
+      </p:cxnSp>
+      <p:sp>
+        <p:nvSpPr>
+          <p:cNvPr id="29" name="Rectangle : coins arrondis 28">
+            <a:extLst>
+              <a:ext uri="{FF2B5EF4-FFF2-40B4-BE49-F238E27FC236}">
+                <a16:creationId xmlns:a16="http://schemas.microsoft.com/office/drawing/2014/main" id="{CE312557-498A-4425-A2EE-4E054DDD0E9C}"/>
+              </a:ext>
+            </a:extLst>
+          </p:cNvPr>
+          <p:cNvSpPr/>
+          <p:nvPr/>
+        </p:nvSpPr>
+        <p:spPr>
+          <a:xfrm>
+            <a:off x="5113028" y="5755817"/>
+            <a:ext cx="1970747" cy="827758"/>
+          </a:xfrm>
+          <a:prstGeom prst="roundRect">
+            <a:avLst/>
+          </a:prstGeom>
+          <a:solidFill>
+            <a:schemeClr val="bg1"/>
+          </a:solidFill>
+          <a:ln w="28575">
+            <a:solidFill>
+              <a:schemeClr val="tx1"/>
+            </a:solidFill>
+          </a:ln>
+        </p:spPr>
+        <p:style>
+          <a:lnRef idx="2">
+            <a:schemeClr val="accent1">
+              <a:shade val="50000"/>
+            </a:schemeClr>
+          </a:lnRef>
+          <a:fillRef idx="1">
+            <a:schemeClr val="accent1"/>
+          </a:fillRef>
+          <a:effectRef idx="0">
+            <a:schemeClr val="accent1"/>
+          </a:effectRef>
+          <a:fontRef idx="minor">
+            <a:schemeClr val="lt1"/>
+          </a:fontRef>
+        </p:style>
+        <p:txBody>
+          <a:bodyPr rtlCol="0" anchor="ctr"/>
+          <a:lstStyle/>
+          <a:p>
+            <a:pPr algn="ctr"/>
+            <a:r>
+              <a:rPr lang="fr-FR" dirty="0"/>
+              <a:t>SURROGATE</a:t>
+            </a:r>
+          </a:p>
+          <a:p>
+            <a:pPr algn="ctr"/>
+            <a:r>
+              <a:rPr lang="fr-FR" dirty="0"/>
+              <a:t>MODEL</a:t>
+            </a:r>
+          </a:p>
+          <a:p>
+            <a:pPr algn="ctr"/>
+            <a:r>
+              <a:rPr lang="fr-FR" dirty="0"/>
+              <a:t>(OVERFITTED)</a:t>
+            </a:r>
+          </a:p>
+        </p:txBody>
+      </p:sp>
+      <p:pic>
+        <p:nvPicPr>
+          <p:cNvPr id="30" name="Graphic 29" descr="Decision chart">
+            <a:extLst>
+              <a:ext uri="{FF2B5EF4-FFF2-40B4-BE49-F238E27FC236}">
+                <a16:creationId xmlns:a16="http://schemas.microsoft.com/office/drawing/2014/main" id="{7F7AD2E5-57EA-49AA-B70D-1413B4B61815}"/>
+              </a:ext>
+            </a:extLst>
+          </p:cNvPr>
+          <p:cNvPicPr>
+            <a:picLocks noChangeAspect="1"/>
+          </p:cNvPicPr>
+          <p:nvPr/>
+        </p:nvPicPr>
+        <p:blipFill>
+          <a:blip r:embed="rId9">
+            <a:extLst>
+              <a:ext uri="{28A0092B-C50C-407E-A947-70E740481C1C}">
+                <a14:useLocalDpi xmlns:a14="http://schemas.microsoft.com/office/drawing/2010/main" val="0"/>
+              </a:ext>
+              <a:ext uri="{96DAC541-7B7A-43D3-8B79-37D633B846F1}">
+                <asvg:svgBlip xmlns:asvg="http://schemas.microsoft.com/office/drawing/2016/SVG/main" r:embed="rId10"/>
+              </a:ext>
+            </a:extLst>
+          </a:blip>
+          <a:stretch>
+            <a:fillRect/>
+          </a:stretch>
+        </p:blipFill>
+        <p:spPr>
+          <a:xfrm>
+            <a:off x="5641202" y="4713204"/>
+            <a:ext cx="914400" cy="914400"/>
+          </a:xfrm>
+          <a:prstGeom prst="rect">
+            <a:avLst/>
+          </a:prstGeom>
+        </p:spPr>
+      </p:pic>
+    </p:spTree>
+    <p:extLst>
+      <p:ext uri="{BB962C8B-B14F-4D97-AF65-F5344CB8AC3E}">
+        <p14:creationId xmlns:p14="http://schemas.microsoft.com/office/powerpoint/2010/main" val="1020119926"/>
+      </p:ext>
+    </p:extLst>
+  </p:cSld>
+  <p:clrMapOvr>
+    <a:masterClrMapping/>
+  </p:clrMapOvr>
+  <p:timing>
+    <p:tnLst>
+      <p:par>
+        <p:cTn id="1" dur="indefinite" restart="never" nodeType="tmRoot">
+          <p:childTnLst>
+            <p:seq concurrent="1" nextAc="seek">
+              <p:cTn id="2" dur="indefinite" nodeType="mainSeq">
+                <p:childTnLst>
+                  <p:par>
+                    <p:cTn id="3" fill="hold">
+                      <p:stCondLst>
+                        <p:cond delay="indefinite"/>
+                      </p:stCondLst>
+                      <p:childTnLst>
+                        <p:par>
+                          <p:cTn id="4" fill="hold">
+                            <p:stCondLst>
+                              <p:cond delay="0"/>
+                            </p:stCondLst>
+                            <p:childTnLst>
+                              <p:par>
+                                <p:cTn id="5" presetID="1" presetClass="entr" presetSubtype="0" fill="hold" grpId="0" nodeType="clickEffect">
+                                  <p:stCondLst>
+                                    <p:cond delay="0"/>
+                                  </p:stCondLst>
+                                  <p:childTnLst>
+                                    <p:set>
+                                      <p:cBhvr>
+                                        <p:cTn id="6" dur="1" fill="hold">
+                                          <p:stCondLst>
+                                            <p:cond delay="0"/>
+                                          </p:stCondLst>
+                                        </p:cTn>
+                                        <p:tgtEl>
+                                          <p:spTgt spid="29"/>
+                                        </p:tgtEl>
+                                        <p:attrNameLst>
+                                          <p:attrName>style.visibility</p:attrName>
+                                        </p:attrNameLst>
+                                      </p:cBhvr>
+                                      <p:to>
+                                        <p:strVal val="visible"/>
+                                      </p:to>
+                                    </p:set>
+                                  </p:childTnLst>
+                                </p:cTn>
+                              </p:par>
+                              <p:par>
+                                <p:cTn id="7" presetID="1" presetClass="entr" presetSubtype="0" fill="hold" nodeType="withEffect">
+                                  <p:stCondLst>
+                                    <p:cond delay="0"/>
+                                  </p:stCondLst>
+                                  <p:childTnLst>
+                                    <p:set>
+                                      <p:cBhvr>
+                                        <p:cTn id="8" dur="1" fill="hold">
+                                          <p:stCondLst>
+                                            <p:cond delay="0"/>
+                                          </p:stCondLst>
+                                        </p:cTn>
+                                        <p:tgtEl>
+                                          <p:spTgt spid="30"/>
+                                        </p:tgtEl>
+                                        <p:attrNameLst>
+                                          <p:attrName>style.visibility</p:attrName>
+                                        </p:attrNameLst>
+                                      </p:cBhvr>
+                                      <p:to>
+                                        <p:strVal val="visible"/>
+                                      </p:to>
+                                    </p:set>
+                                  </p:childTnLst>
+                                </p:cTn>
+                              </p:par>
+                              <p:par>
+                                <p:cTn id="9" presetID="1" presetClass="entr" presetSubtype="0" fill="hold" nodeType="withEffect">
+                                  <p:stCondLst>
+                                    <p:cond delay="0"/>
+                                  </p:stCondLst>
+                                  <p:childTnLst>
+                                    <p:set>
+                                      <p:cBhvr>
+                                        <p:cTn id="10" dur="1" fill="hold">
+                                          <p:stCondLst>
+                                            <p:cond delay="0"/>
+                                          </p:stCondLst>
+                                        </p:cTn>
+                                        <p:tgtEl>
+                                          <p:spTgt spid="42"/>
+                                        </p:tgtEl>
+                                        <p:attrNameLst>
+                                          <p:attrName>style.visibility</p:attrName>
+                                        </p:attrNameLst>
+                                      </p:cBhvr>
+                                      <p:to>
+                                        <p:strVal val="visible"/>
+                                      </p:to>
+                                    </p:set>
+                                  </p:childTnLst>
+                                </p:cTn>
+                              </p:par>
+                              <p:par>
+                                <p:cTn id="11" presetID="1" presetClass="entr" presetSubtype="0" fill="hold" nodeType="withEffect">
+                                  <p:stCondLst>
+                                    <p:cond delay="0"/>
+                                  </p:stCondLst>
+                                  <p:childTnLst>
+                                    <p:set>
+                                      <p:cBhvr>
+                                        <p:cTn id="12" dur="1" fill="hold">
+                                          <p:stCondLst>
+                                            <p:cond delay="0"/>
+                                          </p:stCondLst>
+                                        </p:cTn>
+                                        <p:tgtEl>
+                                          <p:spTgt spid="52"/>
+                                        </p:tgtEl>
+                                        <p:attrNameLst>
+                                          <p:attrName>style.visibility</p:attrName>
+                                        </p:attrNameLst>
+                                      </p:cBhvr>
+                                      <p:to>
+                                        <p:strVal val="visible"/>
+                                      </p:to>
+                                    </p:set>
+                                  </p:childTnLst>
+                                </p:cTn>
+                              </p:par>
+                            </p:childTnLst>
+                          </p:cTn>
+                        </p:par>
+                      </p:childTnLst>
+                    </p:cTn>
+                  </p:par>
+                </p:childTnLst>
+              </p:cTn>
+              <p:prevCondLst>
+                <p:cond evt="onPrev" delay="0">
+                  <p:tgtEl>
+                    <p:sldTgt/>
+                  </p:tgtEl>
+                </p:cond>
+              </p:prevCondLst>
+              <p:nextCondLst>
+                <p:cond evt="onNext" delay="0">
+                  <p:tgtEl>
+                    <p:sldTgt/>
+                  </p:tgtEl>
+                </p:cond>
+              </p:nextCondLst>
+            </p:seq>
+          </p:childTnLst>
+        </p:cTn>
+      </p:par>
+    </p:tnLst>
+    <p:bldLst>
+      <p:bldP spid="29" grpId="0" animBg="1"/>
+    </p:bldLst>
+  </p:timing>
+</p:sld>
+</file>
+
+<file path=ppt/slides/slide11.xml><?xml version="1.0" encoding="utf-8"?>
+<p:sld xmlns:a="http://schemas.openxmlformats.org/drawingml/2006/main" xmlns:r="http://schemas.openxmlformats.org/officeDocument/2006/relationships" xmlns:p="http://schemas.openxmlformats.org/presentationml/2006/main">
+  <p:cSld>
+    <p:spTree>
+      <p:nvGrpSpPr>
+        <p:cNvPr id="1" name=""/>
+        <p:cNvGrpSpPr/>
+        <p:nvPr/>
+      </p:nvGrpSpPr>
+      <p:grpSpPr>
+        <a:xfrm>
+          <a:off x="0" y="0"/>
+          <a:ext cx="0" cy="0"/>
+          <a:chOff x="0" y="0"/>
+          <a:chExt cx="0" cy="0"/>
+        </a:xfrm>
+      </p:grpSpPr>
+      <p:sp>
+        <p:nvSpPr>
           <p:cNvPr id="2" name="Title 1">
             <a:extLst>
               <a:ext uri="{FF2B5EF4-FFF2-40B4-BE49-F238E27FC236}">
@@ -33640,7 +34923,7 @@
           <a:p>
             <a:fld id="{22EBEF4F-4056-4A7E-9612-F3E8B502E28B}" type="slidenum">
               <a:rPr lang="fr-FR" sz="1600" b="1" smtClean="0"/>
-              <a:t>10</a:t>
+              <a:t>11</a:t>
             </a:fld>
             <a:endParaRPr lang="fr-FR" sz="1600" b="1" dirty="0"/>
           </a:p>
@@ -34414,6 +35697,21 @@
             <a:r>
               <a:rPr lang="fr-FR" dirty="0"/>
               <a:t> model</a:t>
+            </a:r>
+          </a:p>
+          <a:p>
+            <a:pPr algn="ctr"/>
+            <a:r>
+              <a:rPr lang="fr-FR" dirty="0"/>
+              <a:t>(</a:t>
+            </a:r>
+            <a:r>
+              <a:rPr lang="fr-FR" dirty="0" err="1"/>
+              <a:t>logit</a:t>
+            </a:r>
+            <a:r>
+              <a:rPr lang="fr-FR" dirty="0"/>
+              <a:t>)</a:t>
             </a:r>
           </a:p>
         </p:txBody>
@@ -35783,7 +37081,7 @@
 </p:sld>
 </file>
 
-<file path=ppt/slides/slide11.xml><?xml version="1.0" encoding="utf-8"?>
+<file path=ppt/slides/slide12.xml><?xml version="1.0" encoding="utf-8"?>
 <p:sld xmlns:a="http://schemas.openxmlformats.org/drawingml/2006/main" xmlns:r="http://schemas.openxmlformats.org/officeDocument/2006/relationships" xmlns:p="http://schemas.openxmlformats.org/presentationml/2006/main">
   <p:cSld>
     <p:spTree>
@@ -36042,7 +37340,7 @@
           <a:p>
             <a:fld id="{22EBEF4F-4056-4A7E-9612-F3E8B502E28B}" type="slidenum">
               <a:rPr lang="fr-FR" sz="1600" b="1" smtClean="0"/>
-              <a:t>11</a:t>
+              <a:t>12</a:t>
             </a:fld>
             <a:endParaRPr lang="fr-FR" sz="1600" b="1" dirty="0"/>
           </a:p>
@@ -44255,7 +45553,7 @@
 </p:sld>
 </file>
 
-<file path=ppt/slides/slide12.xml><?xml version="1.0" encoding="utf-8"?>
+<file path=ppt/slides/slide13.xml><?xml version="1.0" encoding="utf-8"?>
 <p:sld xmlns:a="http://schemas.openxmlformats.org/drawingml/2006/main" xmlns:r="http://schemas.openxmlformats.org/officeDocument/2006/relationships" xmlns:p="http://schemas.openxmlformats.org/presentationml/2006/main">
   <p:cSld>
     <p:spTree>
@@ -44328,7 +45626,7 @@
           <a:p>
             <a:fld id="{22EBEF4F-4056-4A7E-9612-F3E8B502E28B}" type="slidenum">
               <a:rPr lang="fr-FR" sz="1600" b="1" smtClean="0"/>
-              <a:t>12</a:t>
+              <a:t>13</a:t>
             </a:fld>
             <a:endParaRPr lang="fr-FR" sz="1600" b="1" dirty="0"/>
           </a:p>
@@ -44372,1204 +45670,6 @@
   <p:clrMapOvr>
     <a:masterClrMapping/>
   </p:clrMapOvr>
-</p:sld>
-</file>
-
-<file path=ppt/slides/slide13.xml><?xml version="1.0" encoding="utf-8"?>
-<p:sld xmlns:a="http://schemas.openxmlformats.org/drawingml/2006/main" xmlns:r="http://schemas.openxmlformats.org/officeDocument/2006/relationships" xmlns:p="http://schemas.openxmlformats.org/presentationml/2006/main">
-  <p:cSld>
-    <p:spTree>
-      <p:nvGrpSpPr>
-        <p:cNvPr id="1" name=""/>
-        <p:cNvGrpSpPr/>
-        <p:nvPr/>
-      </p:nvGrpSpPr>
-      <p:grpSpPr>
-        <a:xfrm>
-          <a:off x="0" y="0"/>
-          <a:ext cx="0" cy="0"/>
-          <a:chOff x="0" y="0"/>
-          <a:chExt cx="0" cy="0"/>
-        </a:xfrm>
-      </p:grpSpPr>
-      <p:sp>
-        <p:nvSpPr>
-          <p:cNvPr id="2" name="Titre 1">
-            <a:extLst>
-              <a:ext uri="{FF2B5EF4-FFF2-40B4-BE49-F238E27FC236}">
-                <a16:creationId xmlns:a16="http://schemas.microsoft.com/office/drawing/2014/main" id="{3EEEBCC2-CED2-436F-9CA0-FA371E85D1C5}"/>
-              </a:ext>
-            </a:extLst>
-          </p:cNvPr>
-          <p:cNvSpPr>
-            <a:spLocks noGrp="1"/>
-          </p:cNvSpPr>
-          <p:nvPr>
-            <p:ph type="title"/>
-          </p:nvPr>
-        </p:nvSpPr>
-        <p:spPr>
-          <a:xfrm>
-            <a:off x="2409040" y="17452"/>
-            <a:ext cx="8610600" cy="1293028"/>
-          </a:xfrm>
-        </p:spPr>
-        <p:txBody>
-          <a:bodyPr/>
-          <a:lstStyle/>
-          <a:p>
-            <a:r>
-              <a:rPr lang="fr-FR" sz="3600" cap="small" dirty="0"/>
-              <a:t>Interprétabilité</a:t>
-            </a:r>
-          </a:p>
-        </p:txBody>
-      </p:sp>
-      <p:pic>
-        <p:nvPicPr>
-          <p:cNvPr id="6" name="Espace réservé du contenu 5">
-            <a:extLst>
-              <a:ext uri="{FF2B5EF4-FFF2-40B4-BE49-F238E27FC236}">
-                <a16:creationId xmlns:a16="http://schemas.microsoft.com/office/drawing/2014/main" id="{970C91BE-C969-4EF2-9164-BB2F0D97E4CB}"/>
-              </a:ext>
-            </a:extLst>
-          </p:cNvPr>
-          <p:cNvPicPr>
-            <a:picLocks noGrp="1" noChangeAspect="1"/>
-          </p:cNvPicPr>
-          <p:nvPr>
-            <p:ph idx="1"/>
-          </p:nvPr>
-        </p:nvPicPr>
-        <p:blipFill>
-          <a:blip r:embed="rId2"/>
-          <a:stretch>
-            <a:fillRect/>
-          </a:stretch>
-        </p:blipFill>
-        <p:spPr>
-          <a:xfrm>
-            <a:off x="11216444" y="5919398"/>
-            <a:ext cx="904793" cy="827765"/>
-          </a:xfrm>
-          <a:prstGeom prst="rect">
-            <a:avLst/>
-          </a:prstGeom>
-        </p:spPr>
-      </p:pic>
-      <p:sp>
-        <p:nvSpPr>
-          <p:cNvPr id="4" name="Espace réservé du numéro de diapositive 3">
-            <a:extLst>
-              <a:ext uri="{FF2B5EF4-FFF2-40B4-BE49-F238E27FC236}">
-                <a16:creationId xmlns:a16="http://schemas.microsoft.com/office/drawing/2014/main" id="{0D1F85B1-90BF-48DF-AC04-9DBB845D9362}"/>
-              </a:ext>
-            </a:extLst>
-          </p:cNvPr>
-          <p:cNvSpPr>
-            <a:spLocks noGrp="1"/>
-          </p:cNvSpPr>
-          <p:nvPr>
-            <p:ph type="sldNum" sz="quarter" idx="12"/>
-          </p:nvPr>
-        </p:nvSpPr>
-        <p:spPr/>
-        <p:txBody>
-          <a:bodyPr/>
-          <a:lstStyle/>
-          <a:p>
-            <a:fld id="{22EBEF4F-4056-4A7E-9612-F3E8B502E28B}" type="slidenum">
-              <a:rPr lang="fr-FR" smtClean="0"/>
-              <a:t>13</a:t>
-            </a:fld>
-            <a:endParaRPr lang="fr-FR"/>
-          </a:p>
-        </p:txBody>
-      </p:sp>
-      <p:grpSp>
-        <p:nvGrpSpPr>
-          <p:cNvPr id="28" name="Groupe 27">
-            <a:extLst>
-              <a:ext uri="{FF2B5EF4-FFF2-40B4-BE49-F238E27FC236}">
-                <a16:creationId xmlns:a16="http://schemas.microsoft.com/office/drawing/2014/main" id="{5C7968B1-38C1-4BFC-833F-16013AB76CD9}"/>
-              </a:ext>
-            </a:extLst>
-          </p:cNvPr>
-          <p:cNvGrpSpPr/>
-          <p:nvPr/>
-        </p:nvGrpSpPr>
-        <p:grpSpPr>
-          <a:xfrm>
-            <a:off x="378543" y="1298925"/>
-            <a:ext cx="11155467" cy="2719318"/>
-            <a:chOff x="378543" y="1298925"/>
-            <a:chExt cx="11155467" cy="2719318"/>
-          </a:xfrm>
-        </p:grpSpPr>
-        <p:sp>
-          <p:nvSpPr>
-            <p:cNvPr id="12" name="Cube 11">
-              <a:extLst>
-                <a:ext uri="{FF2B5EF4-FFF2-40B4-BE49-F238E27FC236}">
-                  <a16:creationId xmlns:a16="http://schemas.microsoft.com/office/drawing/2014/main" id="{53E7DD06-59A1-4820-B127-C0F6B143B44B}"/>
-                </a:ext>
-              </a:extLst>
-            </p:cNvPr>
-            <p:cNvSpPr/>
-            <p:nvPr/>
-          </p:nvSpPr>
-          <p:spPr>
-            <a:xfrm>
-              <a:off x="7506585" y="1638995"/>
-              <a:ext cx="1495735" cy="1484197"/>
-            </a:xfrm>
-            <a:prstGeom prst="cube">
-              <a:avLst/>
-            </a:prstGeom>
-            <a:solidFill>
-              <a:schemeClr val="bg1"/>
-            </a:solidFill>
-            <a:ln w="44450">
-              <a:solidFill>
-                <a:schemeClr val="tx1"/>
-              </a:solidFill>
-            </a:ln>
-          </p:spPr>
-          <p:style>
-            <a:lnRef idx="2">
-              <a:schemeClr val="accent1">
-                <a:shade val="50000"/>
-              </a:schemeClr>
-            </a:lnRef>
-            <a:fillRef idx="1">
-              <a:schemeClr val="accent1"/>
-            </a:fillRef>
-            <a:effectRef idx="0">
-              <a:schemeClr val="accent1"/>
-            </a:effectRef>
-            <a:fontRef idx="minor">
-              <a:schemeClr val="lt1"/>
-            </a:fontRef>
-          </p:style>
-          <p:txBody>
-            <a:bodyPr rtlCol="0" anchor="ctr"/>
-            <a:lstStyle/>
-            <a:p>
-              <a:pPr algn="ctr"/>
-              <a:r>
-                <a:rPr lang="fr-FR" sz="4800" b="1" dirty="0">
-                  <a:latin typeface="Times New Roman" panose="02020603050405020304" pitchFamily="18" charset="0"/>
-                  <a:cs typeface="Times New Roman" panose="02020603050405020304" pitchFamily="18" charset="0"/>
-                </a:rPr>
-                <a:t>?</a:t>
-              </a:r>
-            </a:p>
-          </p:txBody>
-        </p:sp>
-        <p:pic>
-          <p:nvPicPr>
-            <p:cNvPr id="16" name="Graphique 15" descr="Statistiques">
-              <a:extLst>
-                <a:ext uri="{FF2B5EF4-FFF2-40B4-BE49-F238E27FC236}">
-                  <a16:creationId xmlns:a16="http://schemas.microsoft.com/office/drawing/2014/main" id="{B2E1C465-2BEC-49AD-8A55-15CD5C166995}"/>
-                </a:ext>
-              </a:extLst>
-            </p:cNvPr>
-            <p:cNvPicPr>
-              <a:picLocks noChangeAspect="1"/>
-            </p:cNvPicPr>
-            <p:nvPr/>
-          </p:nvPicPr>
-          <p:blipFill>
-            <a:blip r:embed="rId3">
-              <a:extLst>
-                <a:ext uri="{28A0092B-C50C-407E-A947-70E740481C1C}">
-                  <a14:useLocalDpi xmlns:a14="http://schemas.microsoft.com/office/drawing/2010/main" val="0"/>
-                </a:ext>
-                <a:ext uri="{96DAC541-7B7A-43D3-8B79-37D633B846F1}">
-                  <asvg:svgBlip xmlns:asvg="http://schemas.microsoft.com/office/drawing/2016/SVG/main" r:embed="rId4"/>
-                </a:ext>
-              </a:extLst>
-            </a:blip>
-            <a:stretch>
-              <a:fillRect/>
-            </a:stretch>
-          </p:blipFill>
-          <p:spPr>
-            <a:xfrm>
-              <a:off x="9775308" y="1486831"/>
-              <a:ext cx="1758268" cy="1758268"/>
-            </a:xfrm>
-            <a:prstGeom prst="rect">
-              <a:avLst/>
-            </a:prstGeom>
-          </p:spPr>
-        </p:pic>
-        <p:pic>
-          <p:nvPicPr>
-            <p:cNvPr id="18" name="Graphique 17" descr="Base de données">
-              <a:extLst>
-                <a:ext uri="{FF2B5EF4-FFF2-40B4-BE49-F238E27FC236}">
-                  <a16:creationId xmlns:a16="http://schemas.microsoft.com/office/drawing/2014/main" id="{200AD8DC-526C-45DC-946A-CBA7D10B9E59}"/>
-                </a:ext>
-              </a:extLst>
-            </p:cNvPr>
-            <p:cNvPicPr>
-              <a:picLocks noChangeAspect="1"/>
-            </p:cNvPicPr>
-            <p:nvPr/>
-          </p:nvPicPr>
-          <p:blipFill>
-            <a:blip r:embed="rId5">
-              <a:extLst>
-                <a:ext uri="{28A0092B-C50C-407E-A947-70E740481C1C}">
-                  <a14:useLocalDpi xmlns:a14="http://schemas.microsoft.com/office/drawing/2010/main" val="0"/>
-                </a:ext>
-                <a:ext uri="{96DAC541-7B7A-43D3-8B79-37D633B846F1}">
-                  <asvg:svgBlip xmlns:asvg="http://schemas.microsoft.com/office/drawing/2016/SVG/main" r:embed="rId6"/>
-                </a:ext>
-              </a:extLst>
-            </a:blip>
-            <a:stretch>
-              <a:fillRect/>
-            </a:stretch>
-          </p:blipFill>
-          <p:spPr>
-            <a:xfrm>
-              <a:off x="378543" y="1398503"/>
-              <a:ext cx="2030497" cy="2030497"/>
-            </a:xfrm>
-            <a:prstGeom prst="rect">
-              <a:avLst/>
-            </a:prstGeom>
-          </p:spPr>
-        </p:pic>
-        <p:sp>
-          <p:nvSpPr>
-            <p:cNvPr id="19" name="Rectangle : coins arrondis 18">
-              <a:extLst>
-                <a:ext uri="{FF2B5EF4-FFF2-40B4-BE49-F238E27FC236}">
-                  <a16:creationId xmlns:a16="http://schemas.microsoft.com/office/drawing/2014/main" id="{7BF85BA5-8782-4149-AFD1-AFEFFEF0501F}"/>
-                </a:ext>
-              </a:extLst>
-            </p:cNvPr>
-            <p:cNvSpPr/>
-            <p:nvPr/>
-          </p:nvSpPr>
-          <p:spPr>
-            <a:xfrm>
-              <a:off x="673504" y="3480264"/>
-              <a:ext cx="1342023" cy="537979"/>
-            </a:xfrm>
-            <a:prstGeom prst="roundRect">
-              <a:avLst/>
-            </a:prstGeom>
-            <a:solidFill>
-              <a:schemeClr val="bg1"/>
-            </a:solidFill>
-            <a:ln w="28575">
-              <a:solidFill>
-                <a:schemeClr val="tx1"/>
-              </a:solidFill>
-            </a:ln>
-          </p:spPr>
-          <p:style>
-            <a:lnRef idx="2">
-              <a:schemeClr val="accent1">
-                <a:shade val="50000"/>
-              </a:schemeClr>
-            </a:lnRef>
-            <a:fillRef idx="1">
-              <a:schemeClr val="accent1"/>
-            </a:fillRef>
-            <a:effectRef idx="0">
-              <a:schemeClr val="accent1"/>
-            </a:effectRef>
-            <a:fontRef idx="minor">
-              <a:schemeClr val="lt1"/>
-            </a:fontRef>
-          </p:style>
-          <p:txBody>
-            <a:bodyPr rtlCol="0" anchor="ctr"/>
-            <a:lstStyle/>
-            <a:p>
-              <a:pPr algn="ctr"/>
-              <a:r>
-                <a:rPr lang="fr-FR" dirty="0"/>
-                <a:t>ORIGINAL FEATURES</a:t>
-              </a:r>
-            </a:p>
-          </p:txBody>
-        </p:sp>
-        <p:sp>
-          <p:nvSpPr>
-            <p:cNvPr id="21" name="Rectangle : coins arrondis 20">
-              <a:extLst>
-                <a:ext uri="{FF2B5EF4-FFF2-40B4-BE49-F238E27FC236}">
-                  <a16:creationId xmlns:a16="http://schemas.microsoft.com/office/drawing/2014/main" id="{2F6A878F-C608-48BA-9453-C41111D1BCFD}"/>
-                </a:ext>
-              </a:extLst>
-            </p:cNvPr>
-            <p:cNvSpPr/>
-            <p:nvPr/>
-          </p:nvSpPr>
-          <p:spPr>
-            <a:xfrm>
-              <a:off x="2746457" y="3479439"/>
-              <a:ext cx="1782053" cy="537979"/>
-            </a:xfrm>
-            <a:prstGeom prst="roundRect">
-              <a:avLst/>
-            </a:prstGeom>
-            <a:solidFill>
-              <a:schemeClr val="bg1"/>
-            </a:solidFill>
-            <a:ln w="28575">
-              <a:solidFill>
-                <a:schemeClr val="tx1"/>
-              </a:solidFill>
-            </a:ln>
-          </p:spPr>
-          <p:style>
-            <a:lnRef idx="2">
-              <a:schemeClr val="accent1">
-                <a:shade val="50000"/>
-              </a:schemeClr>
-            </a:lnRef>
-            <a:fillRef idx="1">
-              <a:schemeClr val="accent1"/>
-            </a:fillRef>
-            <a:effectRef idx="0">
-              <a:schemeClr val="accent1"/>
-            </a:effectRef>
-            <a:fontRef idx="minor">
-              <a:schemeClr val="lt1"/>
-            </a:fontRef>
-          </p:style>
-          <p:txBody>
-            <a:bodyPr rtlCol="0" anchor="ctr"/>
-            <a:lstStyle/>
-            <a:p>
-              <a:pPr algn="ctr"/>
-              <a:r>
-                <a:rPr lang="fr-FR" dirty="0"/>
-                <a:t>FEATURES’</a:t>
-              </a:r>
-            </a:p>
-            <a:p>
-              <a:pPr algn="ctr"/>
-              <a:r>
-                <a:rPr lang="fr-FR" dirty="0"/>
-                <a:t>ENGINEERING</a:t>
-              </a:r>
-            </a:p>
-          </p:txBody>
-        </p:sp>
-        <p:pic>
-          <p:nvPicPr>
-            <p:cNvPr id="23" name="Graphique 22" descr="Tête avec engrenages">
-              <a:extLst>
-                <a:ext uri="{FF2B5EF4-FFF2-40B4-BE49-F238E27FC236}">
-                  <a16:creationId xmlns:a16="http://schemas.microsoft.com/office/drawing/2014/main" id="{2865341C-A282-4DFB-A09A-18363E0ACED1}"/>
-                </a:ext>
-              </a:extLst>
-            </p:cNvPr>
-            <p:cNvPicPr>
-              <a:picLocks noChangeAspect="1"/>
-            </p:cNvPicPr>
-            <p:nvPr/>
-          </p:nvPicPr>
-          <p:blipFill>
-            <a:blip r:embed="rId7">
-              <a:extLst>
-                <a:ext uri="{28A0092B-C50C-407E-A947-70E740481C1C}">
-                  <a14:useLocalDpi xmlns:a14="http://schemas.microsoft.com/office/drawing/2010/main" val="0"/>
-                </a:ext>
-                <a:ext uri="{96DAC541-7B7A-43D3-8B79-37D633B846F1}">
-                  <asvg:svgBlip xmlns:asvg="http://schemas.microsoft.com/office/drawing/2016/SVG/main" r:embed="rId8"/>
-                </a:ext>
-              </a:extLst>
-            </a:blip>
-            <a:stretch>
-              <a:fillRect/>
-            </a:stretch>
-          </p:blipFill>
-          <p:spPr>
-            <a:xfrm>
-              <a:off x="3070263" y="1638995"/>
-              <a:ext cx="1418912" cy="1418912"/>
-            </a:xfrm>
-            <a:prstGeom prst="rect">
-              <a:avLst/>
-            </a:prstGeom>
-          </p:spPr>
-        </p:pic>
-        <p:pic>
-          <p:nvPicPr>
-            <p:cNvPr id="24" name="Graphique 23" descr="Base de données">
-              <a:extLst>
-                <a:ext uri="{FF2B5EF4-FFF2-40B4-BE49-F238E27FC236}">
-                  <a16:creationId xmlns:a16="http://schemas.microsoft.com/office/drawing/2014/main" id="{F1DBBBCC-747F-45F0-95BC-9EEE2635CF32}"/>
-                </a:ext>
-              </a:extLst>
-            </p:cNvPr>
-            <p:cNvPicPr>
-              <a:picLocks noChangeAspect="1"/>
-            </p:cNvPicPr>
-            <p:nvPr/>
-          </p:nvPicPr>
-          <p:blipFill>
-            <a:blip r:embed="rId5">
-              <a:extLst>
-                <a:ext uri="{28A0092B-C50C-407E-A947-70E740481C1C}">
-                  <a14:useLocalDpi xmlns:a14="http://schemas.microsoft.com/office/drawing/2010/main" val="0"/>
-                </a:ext>
-                <a:ext uri="{96DAC541-7B7A-43D3-8B79-37D633B846F1}">
-                  <asvg:svgBlip xmlns:asvg="http://schemas.microsoft.com/office/drawing/2016/SVG/main" r:embed="rId6"/>
-                </a:ext>
-              </a:extLst>
-            </a:blip>
-            <a:stretch>
-              <a:fillRect/>
-            </a:stretch>
-          </p:blipFill>
-          <p:spPr>
-            <a:xfrm>
-              <a:off x="5076925" y="1298925"/>
-              <a:ext cx="2030497" cy="2030497"/>
-            </a:xfrm>
-            <a:prstGeom prst="rect">
-              <a:avLst/>
-            </a:prstGeom>
-          </p:spPr>
-        </p:pic>
-        <p:sp>
-          <p:nvSpPr>
-            <p:cNvPr id="25" name="Rectangle : coins arrondis 24">
-              <a:extLst>
-                <a:ext uri="{FF2B5EF4-FFF2-40B4-BE49-F238E27FC236}">
-                  <a16:creationId xmlns:a16="http://schemas.microsoft.com/office/drawing/2014/main" id="{9090EBA1-1099-4EF2-9DCF-C452175FAE4F}"/>
-                </a:ext>
-              </a:extLst>
-            </p:cNvPr>
-            <p:cNvSpPr/>
-            <p:nvPr/>
-          </p:nvSpPr>
-          <p:spPr>
-            <a:xfrm>
-              <a:off x="5259440" y="3479439"/>
-              <a:ext cx="1643824" cy="537979"/>
-            </a:xfrm>
-            <a:prstGeom prst="roundRect">
-              <a:avLst/>
-            </a:prstGeom>
-            <a:solidFill>
-              <a:schemeClr val="bg1"/>
-            </a:solidFill>
-            <a:ln w="28575">
-              <a:solidFill>
-                <a:schemeClr val="tx1"/>
-              </a:solidFill>
-            </a:ln>
-          </p:spPr>
-          <p:style>
-            <a:lnRef idx="2">
-              <a:schemeClr val="accent1">
-                <a:shade val="50000"/>
-              </a:schemeClr>
-            </a:lnRef>
-            <a:fillRef idx="1">
-              <a:schemeClr val="accent1"/>
-            </a:fillRef>
-            <a:effectRef idx="0">
-              <a:schemeClr val="accent1"/>
-            </a:effectRef>
-            <a:fontRef idx="minor">
-              <a:schemeClr val="lt1"/>
-            </a:fontRef>
-          </p:style>
-          <p:txBody>
-            <a:bodyPr rtlCol="0" anchor="ctr"/>
-            <a:lstStyle/>
-            <a:p>
-              <a:pPr algn="ctr"/>
-              <a:r>
-                <a:rPr lang="fr-FR" dirty="0"/>
-                <a:t>PROCESSED DATA</a:t>
-              </a:r>
-            </a:p>
-          </p:txBody>
-        </p:sp>
-        <p:sp>
-          <p:nvSpPr>
-            <p:cNvPr id="26" name="Rectangle : coins arrondis 25">
-              <a:extLst>
-                <a:ext uri="{FF2B5EF4-FFF2-40B4-BE49-F238E27FC236}">
-                  <a16:creationId xmlns:a16="http://schemas.microsoft.com/office/drawing/2014/main" id="{26A176E4-4DDC-46BE-AEAE-66FB37B858BA}"/>
-                </a:ext>
-              </a:extLst>
-            </p:cNvPr>
-            <p:cNvSpPr/>
-            <p:nvPr/>
-          </p:nvSpPr>
-          <p:spPr>
-            <a:xfrm>
-              <a:off x="7487783" y="3479439"/>
-              <a:ext cx="1514537" cy="537979"/>
-            </a:xfrm>
-            <a:prstGeom prst="roundRect">
-              <a:avLst/>
-            </a:prstGeom>
-            <a:solidFill>
-              <a:schemeClr val="bg1"/>
-            </a:solidFill>
-            <a:ln w="28575">
-              <a:solidFill>
-                <a:schemeClr val="tx1"/>
-              </a:solidFill>
-            </a:ln>
-          </p:spPr>
-          <p:style>
-            <a:lnRef idx="2">
-              <a:schemeClr val="accent1">
-                <a:shade val="50000"/>
-              </a:schemeClr>
-            </a:lnRef>
-            <a:fillRef idx="1">
-              <a:schemeClr val="accent1"/>
-            </a:fillRef>
-            <a:effectRef idx="0">
-              <a:schemeClr val="accent1"/>
-            </a:effectRef>
-            <a:fontRef idx="minor">
-              <a:schemeClr val="lt1"/>
-            </a:fontRef>
-          </p:style>
-          <p:txBody>
-            <a:bodyPr rtlCol="0" anchor="ctr"/>
-            <a:lstStyle/>
-            <a:p>
-              <a:pPr algn="ctr"/>
-              <a:r>
-                <a:rPr lang="fr-FR" dirty="0"/>
-                <a:t>MODEL</a:t>
-              </a:r>
-            </a:p>
-          </p:txBody>
-        </p:sp>
-        <p:sp>
-          <p:nvSpPr>
-            <p:cNvPr id="27" name="Rectangle : coins arrondis 26">
-              <a:extLst>
-                <a:ext uri="{FF2B5EF4-FFF2-40B4-BE49-F238E27FC236}">
-                  <a16:creationId xmlns:a16="http://schemas.microsoft.com/office/drawing/2014/main" id="{12BFE275-AE48-43D9-AFAD-A11A043A8A3B}"/>
-                </a:ext>
-              </a:extLst>
-            </p:cNvPr>
-            <p:cNvSpPr/>
-            <p:nvPr/>
-          </p:nvSpPr>
-          <p:spPr>
-            <a:xfrm>
-              <a:off x="9810770" y="3479439"/>
-              <a:ext cx="1723240" cy="537979"/>
-            </a:xfrm>
-            <a:prstGeom prst="roundRect">
-              <a:avLst/>
-            </a:prstGeom>
-            <a:solidFill>
-              <a:schemeClr val="bg1"/>
-            </a:solidFill>
-            <a:ln w="28575">
-              <a:solidFill>
-                <a:schemeClr val="tx1"/>
-              </a:solidFill>
-            </a:ln>
-          </p:spPr>
-          <p:style>
-            <a:lnRef idx="2">
-              <a:schemeClr val="accent1">
-                <a:shade val="50000"/>
-              </a:schemeClr>
-            </a:lnRef>
-            <a:fillRef idx="1">
-              <a:schemeClr val="accent1"/>
-            </a:fillRef>
-            <a:effectRef idx="0">
-              <a:schemeClr val="accent1"/>
-            </a:effectRef>
-            <a:fontRef idx="minor">
-              <a:schemeClr val="lt1"/>
-            </a:fontRef>
-          </p:style>
-          <p:txBody>
-            <a:bodyPr rtlCol="0" anchor="ctr"/>
-            <a:lstStyle/>
-            <a:p>
-              <a:pPr algn="ctr"/>
-              <a:r>
-                <a:rPr lang="fr-FR" dirty="0"/>
-                <a:t>PREDICTIONS</a:t>
-              </a:r>
-            </a:p>
-          </p:txBody>
-        </p:sp>
-      </p:grpSp>
-      <p:cxnSp>
-        <p:nvCxnSpPr>
-          <p:cNvPr id="32" name="Connecteur droit avec flèche 31">
-            <a:extLst>
-              <a:ext uri="{FF2B5EF4-FFF2-40B4-BE49-F238E27FC236}">
-                <a16:creationId xmlns:a16="http://schemas.microsoft.com/office/drawing/2014/main" id="{507EDF09-EAF0-41D5-A81E-254E0130A532}"/>
-              </a:ext>
-            </a:extLst>
-          </p:cNvPr>
-          <p:cNvCxnSpPr>
-            <a:cxnSpLocks/>
-            <a:stCxn id="19" idx="3"/>
-            <a:endCxn id="21" idx="1"/>
-          </p:cNvCxnSpPr>
-          <p:nvPr/>
-        </p:nvCxnSpPr>
-        <p:spPr>
-          <a:xfrm flipV="1">
-            <a:off x="2015527" y="3748429"/>
-            <a:ext cx="730930" cy="825"/>
-          </a:xfrm>
-          <a:prstGeom prst="straightConnector1">
-            <a:avLst/>
-          </a:prstGeom>
-          <a:ln w="50800">
-            <a:solidFill>
-              <a:schemeClr val="tx1"/>
-            </a:solidFill>
-            <a:tailEnd type="triangle"/>
-          </a:ln>
-        </p:spPr>
-        <p:style>
-          <a:lnRef idx="1">
-            <a:schemeClr val="accent1"/>
-          </a:lnRef>
-          <a:fillRef idx="0">
-            <a:schemeClr val="accent1"/>
-          </a:fillRef>
-          <a:effectRef idx="0">
-            <a:schemeClr val="accent1"/>
-          </a:effectRef>
-          <a:fontRef idx="minor">
-            <a:schemeClr val="tx1"/>
-          </a:fontRef>
-        </p:style>
-      </p:cxnSp>
-      <p:cxnSp>
-        <p:nvCxnSpPr>
-          <p:cNvPr id="36" name="Connecteur droit avec flèche 35">
-            <a:extLst>
-              <a:ext uri="{FF2B5EF4-FFF2-40B4-BE49-F238E27FC236}">
-                <a16:creationId xmlns:a16="http://schemas.microsoft.com/office/drawing/2014/main" id="{1F82D370-D219-43F4-A45A-07621D36F387}"/>
-              </a:ext>
-            </a:extLst>
-          </p:cNvPr>
-          <p:cNvCxnSpPr>
-            <a:cxnSpLocks/>
-            <a:stCxn id="21" idx="3"/>
-            <a:endCxn id="25" idx="1"/>
-          </p:cNvCxnSpPr>
-          <p:nvPr/>
-        </p:nvCxnSpPr>
-        <p:spPr>
-          <a:xfrm>
-            <a:off x="4528510" y="3748429"/>
-            <a:ext cx="730930" cy="0"/>
-          </a:xfrm>
-          <a:prstGeom prst="straightConnector1">
-            <a:avLst/>
-          </a:prstGeom>
-          <a:ln w="50800">
-            <a:solidFill>
-              <a:schemeClr val="tx1"/>
-            </a:solidFill>
-            <a:tailEnd type="triangle"/>
-          </a:ln>
-        </p:spPr>
-        <p:style>
-          <a:lnRef idx="1">
-            <a:schemeClr val="accent1"/>
-          </a:lnRef>
-          <a:fillRef idx="0">
-            <a:schemeClr val="accent1"/>
-          </a:fillRef>
-          <a:effectRef idx="0">
-            <a:schemeClr val="accent1"/>
-          </a:effectRef>
-          <a:fontRef idx="minor">
-            <a:schemeClr val="tx1"/>
-          </a:fontRef>
-        </p:style>
-      </p:cxnSp>
-      <p:cxnSp>
-        <p:nvCxnSpPr>
-          <p:cNvPr id="37" name="Connecteur droit avec flèche 36">
-            <a:extLst>
-              <a:ext uri="{FF2B5EF4-FFF2-40B4-BE49-F238E27FC236}">
-                <a16:creationId xmlns:a16="http://schemas.microsoft.com/office/drawing/2014/main" id="{25ED32BD-600D-4334-A804-C9C9FC4B5215}"/>
-              </a:ext>
-            </a:extLst>
-          </p:cNvPr>
-          <p:cNvCxnSpPr>
-            <a:cxnSpLocks/>
-            <a:stCxn id="25" idx="3"/>
-            <a:endCxn id="26" idx="1"/>
-          </p:cNvCxnSpPr>
-          <p:nvPr/>
-        </p:nvCxnSpPr>
-        <p:spPr>
-          <a:xfrm>
-            <a:off x="6903264" y="3748429"/>
-            <a:ext cx="584519" cy="0"/>
-          </a:xfrm>
-          <a:prstGeom prst="straightConnector1">
-            <a:avLst/>
-          </a:prstGeom>
-          <a:ln w="50800">
-            <a:solidFill>
-              <a:schemeClr val="tx1"/>
-            </a:solidFill>
-            <a:tailEnd type="triangle"/>
-          </a:ln>
-        </p:spPr>
-        <p:style>
-          <a:lnRef idx="1">
-            <a:schemeClr val="accent1"/>
-          </a:lnRef>
-          <a:fillRef idx="0">
-            <a:schemeClr val="accent1"/>
-          </a:fillRef>
-          <a:effectRef idx="0">
-            <a:schemeClr val="accent1"/>
-          </a:effectRef>
-          <a:fontRef idx="minor">
-            <a:schemeClr val="tx1"/>
-          </a:fontRef>
-        </p:style>
-      </p:cxnSp>
-      <p:cxnSp>
-        <p:nvCxnSpPr>
-          <p:cNvPr id="38" name="Connecteur droit avec flèche 37">
-            <a:extLst>
-              <a:ext uri="{FF2B5EF4-FFF2-40B4-BE49-F238E27FC236}">
-                <a16:creationId xmlns:a16="http://schemas.microsoft.com/office/drawing/2014/main" id="{D1E3B51E-2BEA-4D2E-B3F0-EAA910384C4C}"/>
-              </a:ext>
-            </a:extLst>
-          </p:cNvPr>
-          <p:cNvCxnSpPr>
-            <a:cxnSpLocks/>
-            <a:stCxn id="26" idx="3"/>
-            <a:endCxn id="27" idx="1"/>
-          </p:cNvCxnSpPr>
-          <p:nvPr/>
-        </p:nvCxnSpPr>
-        <p:spPr>
-          <a:xfrm>
-            <a:off x="9002320" y="3748429"/>
-            <a:ext cx="808450" cy="0"/>
-          </a:xfrm>
-          <a:prstGeom prst="straightConnector1">
-            <a:avLst/>
-          </a:prstGeom>
-          <a:ln w="50800">
-            <a:solidFill>
-              <a:schemeClr val="tx1"/>
-            </a:solidFill>
-            <a:tailEnd type="triangle"/>
-          </a:ln>
-        </p:spPr>
-        <p:style>
-          <a:lnRef idx="1">
-            <a:schemeClr val="accent1"/>
-          </a:lnRef>
-          <a:fillRef idx="0">
-            <a:schemeClr val="accent1"/>
-          </a:fillRef>
-          <a:effectRef idx="0">
-            <a:schemeClr val="accent1"/>
-          </a:effectRef>
-          <a:fontRef idx="minor">
-            <a:schemeClr val="tx1"/>
-          </a:fontRef>
-        </p:style>
-      </p:cxnSp>
-      <p:cxnSp>
-        <p:nvCxnSpPr>
-          <p:cNvPr id="42" name="Connecteur : en angle 41">
-            <a:extLst>
-              <a:ext uri="{FF2B5EF4-FFF2-40B4-BE49-F238E27FC236}">
-                <a16:creationId xmlns:a16="http://schemas.microsoft.com/office/drawing/2014/main" id="{B7FFD4A5-6748-4F08-88BB-CB1E1ADA66D6}"/>
-              </a:ext>
-            </a:extLst>
-          </p:cNvPr>
-          <p:cNvCxnSpPr>
-            <a:cxnSpLocks/>
-            <a:stCxn id="19" idx="2"/>
-            <a:endCxn id="29" idx="1"/>
-          </p:cNvCxnSpPr>
-          <p:nvPr/>
-        </p:nvCxnSpPr>
-        <p:spPr>
-          <a:xfrm rot="16200000" flipH="1">
-            <a:off x="2153046" y="3209713"/>
-            <a:ext cx="2151453" cy="3768512"/>
-          </a:xfrm>
-          <a:prstGeom prst="bentConnector2">
-            <a:avLst/>
-          </a:prstGeom>
-          <a:ln w="50800">
-            <a:solidFill>
-              <a:schemeClr val="tx1"/>
-            </a:solidFill>
-            <a:tailEnd type="triangle"/>
-          </a:ln>
-        </p:spPr>
-        <p:style>
-          <a:lnRef idx="1">
-            <a:schemeClr val="accent1"/>
-          </a:lnRef>
-          <a:fillRef idx="0">
-            <a:schemeClr val="accent1"/>
-          </a:fillRef>
-          <a:effectRef idx="0">
-            <a:schemeClr val="accent1"/>
-          </a:effectRef>
-          <a:fontRef idx="minor">
-            <a:schemeClr val="tx1"/>
-          </a:fontRef>
-        </p:style>
-      </p:cxnSp>
-      <p:cxnSp>
-        <p:nvCxnSpPr>
-          <p:cNvPr id="52" name="Connecteur : en angle 51">
-            <a:extLst>
-              <a:ext uri="{FF2B5EF4-FFF2-40B4-BE49-F238E27FC236}">
-                <a16:creationId xmlns:a16="http://schemas.microsoft.com/office/drawing/2014/main" id="{1085DB9D-D48E-416C-B008-EF17D05C77C9}"/>
-              </a:ext>
-            </a:extLst>
-          </p:cNvPr>
-          <p:cNvCxnSpPr>
-            <a:cxnSpLocks/>
-            <a:stCxn id="29" idx="3"/>
-            <a:endCxn id="27" idx="2"/>
-          </p:cNvCxnSpPr>
-          <p:nvPr/>
-        </p:nvCxnSpPr>
-        <p:spPr>
-          <a:xfrm flipV="1">
-            <a:off x="7083775" y="4017418"/>
-            <a:ext cx="3588615" cy="2152278"/>
-          </a:xfrm>
-          <a:prstGeom prst="bentConnector2">
-            <a:avLst/>
-          </a:prstGeom>
-          <a:ln w="50800">
-            <a:solidFill>
-              <a:schemeClr val="tx1"/>
-            </a:solidFill>
-            <a:tailEnd type="triangle"/>
-          </a:ln>
-        </p:spPr>
-        <p:style>
-          <a:lnRef idx="1">
-            <a:schemeClr val="accent1"/>
-          </a:lnRef>
-          <a:fillRef idx="0">
-            <a:schemeClr val="accent1"/>
-          </a:fillRef>
-          <a:effectRef idx="0">
-            <a:schemeClr val="accent1"/>
-          </a:effectRef>
-          <a:fontRef idx="minor">
-            <a:schemeClr val="tx1"/>
-          </a:fontRef>
-        </p:style>
-      </p:cxnSp>
-      <p:sp>
-        <p:nvSpPr>
-          <p:cNvPr id="29" name="Rectangle : coins arrondis 28">
-            <a:extLst>
-              <a:ext uri="{FF2B5EF4-FFF2-40B4-BE49-F238E27FC236}">
-                <a16:creationId xmlns:a16="http://schemas.microsoft.com/office/drawing/2014/main" id="{CE312557-498A-4425-A2EE-4E054DDD0E9C}"/>
-              </a:ext>
-            </a:extLst>
-          </p:cNvPr>
-          <p:cNvSpPr/>
-          <p:nvPr/>
-        </p:nvSpPr>
-        <p:spPr>
-          <a:xfrm>
-            <a:off x="5113028" y="5755817"/>
-            <a:ext cx="1970747" cy="827758"/>
-          </a:xfrm>
-          <a:prstGeom prst="roundRect">
-            <a:avLst/>
-          </a:prstGeom>
-          <a:solidFill>
-            <a:schemeClr val="bg1"/>
-          </a:solidFill>
-          <a:ln w="28575">
-            <a:solidFill>
-              <a:schemeClr val="tx1"/>
-            </a:solidFill>
-          </a:ln>
-        </p:spPr>
-        <p:style>
-          <a:lnRef idx="2">
-            <a:schemeClr val="accent1">
-              <a:shade val="50000"/>
-            </a:schemeClr>
-          </a:lnRef>
-          <a:fillRef idx="1">
-            <a:schemeClr val="accent1"/>
-          </a:fillRef>
-          <a:effectRef idx="0">
-            <a:schemeClr val="accent1"/>
-          </a:effectRef>
-          <a:fontRef idx="minor">
-            <a:schemeClr val="lt1"/>
-          </a:fontRef>
-        </p:style>
-        <p:txBody>
-          <a:bodyPr rtlCol="0" anchor="ctr"/>
-          <a:lstStyle/>
-          <a:p>
-            <a:pPr algn="ctr"/>
-            <a:r>
-              <a:rPr lang="fr-FR" dirty="0"/>
-              <a:t>SURROGATE</a:t>
-            </a:r>
-          </a:p>
-          <a:p>
-            <a:pPr algn="ctr"/>
-            <a:r>
-              <a:rPr lang="fr-FR" dirty="0"/>
-              <a:t>MODEL</a:t>
-            </a:r>
-          </a:p>
-          <a:p>
-            <a:pPr algn="ctr"/>
-            <a:r>
-              <a:rPr lang="fr-FR" dirty="0"/>
-              <a:t>(OVERFITTED)</a:t>
-            </a:r>
-          </a:p>
-        </p:txBody>
-      </p:sp>
-      <p:pic>
-        <p:nvPicPr>
-          <p:cNvPr id="30" name="Graphic 29" descr="Decision chart">
-            <a:extLst>
-              <a:ext uri="{FF2B5EF4-FFF2-40B4-BE49-F238E27FC236}">
-                <a16:creationId xmlns:a16="http://schemas.microsoft.com/office/drawing/2014/main" id="{7F7AD2E5-57EA-49AA-B70D-1413B4B61815}"/>
-              </a:ext>
-            </a:extLst>
-          </p:cNvPr>
-          <p:cNvPicPr>
-            <a:picLocks noChangeAspect="1"/>
-          </p:cNvPicPr>
-          <p:nvPr/>
-        </p:nvPicPr>
-        <p:blipFill>
-          <a:blip r:embed="rId9">
-            <a:extLst>
-              <a:ext uri="{28A0092B-C50C-407E-A947-70E740481C1C}">
-                <a14:useLocalDpi xmlns:a14="http://schemas.microsoft.com/office/drawing/2010/main" val="0"/>
-              </a:ext>
-              <a:ext uri="{96DAC541-7B7A-43D3-8B79-37D633B846F1}">
-                <asvg:svgBlip xmlns:asvg="http://schemas.microsoft.com/office/drawing/2016/SVG/main" r:embed="rId10"/>
-              </a:ext>
-            </a:extLst>
-          </a:blip>
-          <a:stretch>
-            <a:fillRect/>
-          </a:stretch>
-        </p:blipFill>
-        <p:spPr>
-          <a:xfrm>
-            <a:off x="5641202" y="4713204"/>
-            <a:ext cx="914400" cy="914400"/>
-          </a:xfrm>
-          <a:prstGeom prst="rect">
-            <a:avLst/>
-          </a:prstGeom>
-        </p:spPr>
-      </p:pic>
-    </p:spTree>
-    <p:extLst>
-      <p:ext uri="{BB962C8B-B14F-4D97-AF65-F5344CB8AC3E}">
-        <p14:creationId xmlns:p14="http://schemas.microsoft.com/office/powerpoint/2010/main" val="1020119926"/>
-      </p:ext>
-    </p:extLst>
-  </p:cSld>
-  <p:clrMapOvr>
-    <a:masterClrMapping/>
-  </p:clrMapOvr>
-  <p:timing>
-    <p:tnLst>
-      <p:par>
-        <p:cTn id="1" dur="indefinite" restart="never" nodeType="tmRoot">
-          <p:childTnLst>
-            <p:seq concurrent="1" nextAc="seek">
-              <p:cTn id="2" dur="indefinite" nodeType="mainSeq">
-                <p:childTnLst>
-                  <p:par>
-                    <p:cTn id="3" fill="hold">
-                      <p:stCondLst>
-                        <p:cond delay="indefinite"/>
-                      </p:stCondLst>
-                      <p:childTnLst>
-                        <p:par>
-                          <p:cTn id="4" fill="hold">
-                            <p:stCondLst>
-                              <p:cond delay="0"/>
-                            </p:stCondLst>
-                            <p:childTnLst>
-                              <p:par>
-                                <p:cTn id="5" presetID="1" presetClass="entr" presetSubtype="0" fill="hold" grpId="0" nodeType="clickEffect">
-                                  <p:stCondLst>
-                                    <p:cond delay="0"/>
-                                  </p:stCondLst>
-                                  <p:childTnLst>
-                                    <p:set>
-                                      <p:cBhvr>
-                                        <p:cTn id="6" dur="1" fill="hold">
-                                          <p:stCondLst>
-                                            <p:cond delay="0"/>
-                                          </p:stCondLst>
-                                        </p:cTn>
-                                        <p:tgtEl>
-                                          <p:spTgt spid="29"/>
-                                        </p:tgtEl>
-                                        <p:attrNameLst>
-                                          <p:attrName>style.visibility</p:attrName>
-                                        </p:attrNameLst>
-                                      </p:cBhvr>
-                                      <p:to>
-                                        <p:strVal val="visible"/>
-                                      </p:to>
-                                    </p:set>
-                                  </p:childTnLst>
-                                </p:cTn>
-                              </p:par>
-                              <p:par>
-                                <p:cTn id="7" presetID="1" presetClass="entr" presetSubtype="0" fill="hold" nodeType="withEffect">
-                                  <p:stCondLst>
-                                    <p:cond delay="0"/>
-                                  </p:stCondLst>
-                                  <p:childTnLst>
-                                    <p:set>
-                                      <p:cBhvr>
-                                        <p:cTn id="8" dur="1" fill="hold">
-                                          <p:stCondLst>
-                                            <p:cond delay="0"/>
-                                          </p:stCondLst>
-                                        </p:cTn>
-                                        <p:tgtEl>
-                                          <p:spTgt spid="30"/>
-                                        </p:tgtEl>
-                                        <p:attrNameLst>
-                                          <p:attrName>style.visibility</p:attrName>
-                                        </p:attrNameLst>
-                                      </p:cBhvr>
-                                      <p:to>
-                                        <p:strVal val="visible"/>
-                                      </p:to>
-                                    </p:set>
-                                  </p:childTnLst>
-                                </p:cTn>
-                              </p:par>
-                              <p:par>
-                                <p:cTn id="9" presetID="1" presetClass="entr" presetSubtype="0" fill="hold" nodeType="withEffect">
-                                  <p:stCondLst>
-                                    <p:cond delay="0"/>
-                                  </p:stCondLst>
-                                  <p:childTnLst>
-                                    <p:set>
-                                      <p:cBhvr>
-                                        <p:cTn id="10" dur="1" fill="hold">
-                                          <p:stCondLst>
-                                            <p:cond delay="0"/>
-                                          </p:stCondLst>
-                                        </p:cTn>
-                                        <p:tgtEl>
-                                          <p:spTgt spid="42"/>
-                                        </p:tgtEl>
-                                        <p:attrNameLst>
-                                          <p:attrName>style.visibility</p:attrName>
-                                        </p:attrNameLst>
-                                      </p:cBhvr>
-                                      <p:to>
-                                        <p:strVal val="visible"/>
-                                      </p:to>
-                                    </p:set>
-                                  </p:childTnLst>
-                                </p:cTn>
-                              </p:par>
-                              <p:par>
-                                <p:cTn id="11" presetID="1" presetClass="entr" presetSubtype="0" fill="hold" nodeType="withEffect">
-                                  <p:stCondLst>
-                                    <p:cond delay="0"/>
-                                  </p:stCondLst>
-                                  <p:childTnLst>
-                                    <p:set>
-                                      <p:cBhvr>
-                                        <p:cTn id="12" dur="1" fill="hold">
-                                          <p:stCondLst>
-                                            <p:cond delay="0"/>
-                                          </p:stCondLst>
-                                        </p:cTn>
-                                        <p:tgtEl>
-                                          <p:spTgt spid="52"/>
-                                        </p:tgtEl>
-                                        <p:attrNameLst>
-                                          <p:attrName>style.visibility</p:attrName>
-                                        </p:attrNameLst>
-                                      </p:cBhvr>
-                                      <p:to>
-                                        <p:strVal val="visible"/>
-                                      </p:to>
-                                    </p:set>
-                                  </p:childTnLst>
-                                </p:cTn>
-                              </p:par>
-                            </p:childTnLst>
-                          </p:cTn>
-                        </p:par>
-                      </p:childTnLst>
-                    </p:cTn>
-                  </p:par>
-                </p:childTnLst>
-              </p:cTn>
-              <p:prevCondLst>
-                <p:cond evt="onPrev" delay="0">
-                  <p:tgtEl>
-                    <p:sldTgt/>
-                  </p:tgtEl>
-                </p:cond>
-              </p:prevCondLst>
-              <p:nextCondLst>
-                <p:cond evt="onNext" delay="0">
-                  <p:tgtEl>
-                    <p:sldTgt/>
-                  </p:tgtEl>
-                </p:cond>
-              </p:nextCondLst>
-            </p:seq>
-          </p:childTnLst>
-        </p:cTn>
-      </p:par>
-    </p:tnLst>
-    <p:bldLst>
-      <p:bldP spid="29" grpId="0" animBg="1"/>
-    </p:bldLst>
-  </p:timing>
 </p:sld>
 </file>
 
@@ -47457,7 +47557,7 @@
                   <a:schemeClr val="bg1"/>
                 </a:solidFill>
               </a:rPr>
-              <a:t> : </a:t>
+              <a:t>: </a:t>
             </a:r>
             <a:r>
               <a:rPr lang="fr-FR" dirty="0">
@@ -47531,7 +47631,7 @@
                   <a:schemeClr val="bg1"/>
                 </a:solidFill>
               </a:rPr>
-              <a:t> : </a:t>
+              <a:t>: </a:t>
             </a:r>
             <a:r>
               <a:rPr lang="fr-FR" dirty="0">
@@ -49616,36 +49716,6 @@
                   <a:schemeClr val="tx1"/>
                 </a:solidFill>
               </a:rPr>
-              <a:t> </a:t>
-            </a:r>
-            <a:r>
-              <a:rPr lang="fr-FR" sz="2400" b="1" dirty="0">
-                <a:solidFill>
-                  <a:srgbClr val="FFFF00"/>
-                </a:solidFill>
-              </a:rPr>
-              <a:t>interprétation</a:t>
-            </a:r>
-            <a:r>
-              <a:rPr lang="fr-FR" sz="2400" dirty="0">
-                <a:solidFill>
-                  <a:schemeClr val="tx1"/>
-                </a:solidFill>
-              </a:rPr>
-              <a:t> du modèle</a:t>
-            </a:r>
-          </a:p>
-          <a:p>
-            <a:pPr lvl="1">
-              <a:buFont typeface="Symbol" panose="05050102010706020507" pitchFamily="18" charset="2"/>
-              <a:buChar char="Þ"/>
-            </a:pPr>
-            <a:r>
-              <a:rPr lang="fr-FR" sz="2400" dirty="0">
-                <a:solidFill>
-                  <a:schemeClr val="tx1"/>
-                </a:solidFill>
-              </a:rPr>
               <a:t> déploiement du modèle sous forme d’</a:t>
             </a:r>
             <a:r>
@@ -49678,11 +49748,36 @@
               </a:rPr>
               <a:t>tableau de bord interactif</a:t>
             </a:r>
-            <a:endParaRPr lang="fr-FR" sz="2400" dirty="0">
-              <a:solidFill>
-                <a:schemeClr val="tx1"/>
-              </a:solidFill>
-            </a:endParaRPr>
+          </a:p>
+          <a:p>
+            <a:pPr lvl="1">
+              <a:buFont typeface="Symbol" panose="05050102010706020507" pitchFamily="18" charset="2"/>
+              <a:buChar char="Þ"/>
+            </a:pPr>
+            <a:r>
+              <a:rPr lang="fr-FR" sz="2400" dirty="0">
+                <a:solidFill>
+                  <a:schemeClr val="tx1"/>
+                </a:solidFill>
+              </a:rPr>
+              <a:t> </a:t>
+            </a:r>
+            <a:r>
+              <a:rPr lang="fr-FR" sz="2400" b="1" dirty="0">
+                <a:solidFill>
+                  <a:srgbClr val="FFFF00"/>
+                </a:solidFill>
+              </a:rPr>
+              <a:t>interprétation</a:t>
+            </a:r>
+            <a:r>
+              <a:rPr lang="fr-FR" sz="2400" dirty="0">
+                <a:solidFill>
+                  <a:schemeClr val="tx1"/>
+                </a:solidFill>
+              </a:rPr>
+              <a:t> du modèle</a:t>
+            </a:r>
           </a:p>
           <a:p>
             <a:pPr lvl="1">
@@ -50346,7 +50441,7 @@
           <p:nvPr>
             <p:extLst>
               <p:ext uri="{D42A27DB-BD31-4B8C-83A1-F6EECF244321}">
-                <p14:modId xmlns:p14="http://schemas.microsoft.com/office/powerpoint/2010/main" val="616495216"/>
+                <p14:modId xmlns:p14="http://schemas.microsoft.com/office/powerpoint/2010/main" val="2374614221"/>
               </p:ext>
             </p:extLst>
           </p:nvPr>
@@ -50605,7 +50700,7 @@
           <a:p>
             <a:r>
               <a:rPr lang="fr-FR" b="1" cap="small" dirty="0"/>
-              <a:t>Équilibrage des classes</a:t>
+              <a:t>Équilibre des classes</a:t>
             </a:r>
             <a:endParaRPr lang="en-GB" b="1" cap="small" dirty="0"/>
           </a:p>
@@ -51028,7 +51123,7 @@
         </p:blipFill>
         <p:spPr>
           <a:xfrm>
-            <a:off x="2868060" y="4068804"/>
+            <a:off x="3494783" y="4058530"/>
             <a:ext cx="3277359" cy="2731133"/>
           </a:xfrm>
           <a:prstGeom prst="rect">
@@ -51099,8 +51194,8 @@
         </p:blipFill>
         <p:spPr>
           <a:xfrm>
-            <a:off x="927824" y="4538895"/>
-            <a:ext cx="1590897" cy="895475"/>
+            <a:off x="732084" y="4068804"/>
+            <a:ext cx="2690746" cy="1514551"/>
           </a:xfrm>
           <a:prstGeom prst="rect">
             <a:avLst/>

</xml_diff>

<commit_message>
Corrections diaporama (formule métrique)
</commit_message>
<xml_diff>
--- a/projet7.pptx
+++ b/projet7.pptx
@@ -6,7 +6,7 @@
     <p:sldMasterId id="2147483732" r:id="rId2"/>
   </p:sldMasterIdLst>
   <p:notesMasterIdLst>
-    <p:notesMasterId r:id="rId23"/>
+    <p:notesMasterId r:id="rId24"/>
   </p:notesMasterIdLst>
   <p:sldIdLst>
     <p:sldId id="272" r:id="rId3"/>
@@ -29,6 +29,7 @@
     <p:sldId id="401" r:id="rId20"/>
     <p:sldId id="386" r:id="rId21"/>
     <p:sldId id="407" r:id="rId22"/>
+    <p:sldId id="409" r:id="rId23"/>
   </p:sldIdLst>
   <p:sldSz cx="12192000" cy="6858000"/>
   <p:notesSz cx="6858000" cy="9144000"/>
@@ -152,7 +153,7 @@
   <pc:docChgLst>
     <pc:chgData name="Christophe Lebrun" userId="303fc86cbab77272" providerId="LiveId" clId="{5CF99517-1F4B-4B47-8D8E-709890DD7C88}"/>
     <pc:docChg chg="undo custSel addSld delSld modSld sldOrd">
-      <pc:chgData name="Christophe Lebrun" userId="303fc86cbab77272" providerId="LiveId" clId="{5CF99517-1F4B-4B47-8D8E-709890DD7C88}" dt="2019-11-26T07:37:41.781" v="3252" actId="1076"/>
+      <pc:chgData name="Christophe Lebrun" userId="303fc86cbab77272" providerId="LiveId" clId="{5CF99517-1F4B-4B47-8D8E-709890DD7C88}" dt="2019-11-29T06:44:42.096" v="3360" actId="20577"/>
       <pc:docMkLst>
         <pc:docMk/>
       </pc:docMkLst>
@@ -162,6 +163,21 @@
           <pc:docMk/>
           <pc:sldMk cId="3031979299" sldId="267"/>
         </pc:sldMkLst>
+      </pc:sldChg>
+      <pc:sldChg chg="modSp">
+        <pc:chgData name="Christophe Lebrun" userId="303fc86cbab77272" providerId="LiveId" clId="{5CF99517-1F4B-4B47-8D8E-709890DD7C88}" dt="2019-11-29T06:44:42.096" v="3360" actId="20577"/>
+        <pc:sldMkLst>
+          <pc:docMk/>
+          <pc:sldMk cId="3576308320" sldId="271"/>
+        </pc:sldMkLst>
+        <pc:spChg chg="mod">
+          <ac:chgData name="Christophe Lebrun" userId="303fc86cbab77272" providerId="LiveId" clId="{5CF99517-1F4B-4B47-8D8E-709890DD7C88}" dt="2019-11-29T06:44:42.096" v="3360" actId="20577"/>
+          <ac:spMkLst>
+            <pc:docMk/>
+            <pc:sldMk cId="3576308320" sldId="271"/>
+            <ac:spMk id="8" creationId="{D2AE1507-D6AC-45E7-8492-397B4CA37FAD}"/>
+          </ac:spMkLst>
+        </pc:spChg>
       </pc:sldChg>
       <pc:sldChg chg="del">
         <pc:chgData name="Christophe Lebrun" userId="303fc86cbab77272" providerId="LiveId" clId="{5CF99517-1F4B-4B47-8D8E-709890DD7C88}" dt="2019-11-22T18:58:44.184" v="605" actId="2696"/>
@@ -783,7 +799,22 @@
         </pc:sldMkLst>
       </pc:sldChg>
       <pc:sldChg chg="addSp modSp">
-        <pc:chgData name="Christophe Lebrun" userId="303fc86cbab77272" providerId="LiveId" clId="{5CF99517-1F4B-4B47-8D8E-709890DD7C88}" dt="2019-11-25T15:58:53.094" v="3220" actId="1076"/>
+        <pc:chgData name="Christophe Lebrun" userId="303fc86cbab77272" providerId="LiveId" clId="{5CF99517-1F4B-4B47-8D8E-709890DD7C88}" dt="2019-11-29T06:43:46.128" v="3354" actId="14100"/>
+        <pc:sldMkLst>
+          <pc:docMk/>
+          <pc:sldMk cId="1126268051" sldId="394"/>
+        </pc:sldMkLst>
+        <pc:spChg chg="add mod">
+          <ac:chgData name="Christophe Lebrun" userId="303fc86cbab77272" providerId="LiveId" clId="{5CF99517-1F4B-4B47-8D8E-709890DD7C88}" dt="2019-11-29T06:43:46.128" v="3354" actId="14100"/>
+          <ac:spMkLst>
+            <pc:docMk/>
+            <pc:sldMk cId="1126268051" sldId="394"/>
+            <ac:spMk id="12" creationId="{6D851787-4F77-4C23-B364-A92B588420BF}"/>
+          </ac:spMkLst>
+        </pc:spChg>
+      </pc:sldChg>
+      <pc:sldChg chg="addSp delSp modSp">
+        <pc:chgData name="Christophe Lebrun" userId="303fc86cbab77272" providerId="LiveId" clId="{5CF99517-1F4B-4B47-8D8E-709890DD7C88}" dt="2019-11-29T06:40:04.252" v="3267" actId="1076"/>
         <pc:sldMkLst>
           <pc:docMk/>
           <pc:sldMk cId="616920843" sldId="396"/>
@@ -804,8 +835,8 @@
             <ac:picMk id="3" creationId="{A36E309D-8F32-40B9-A588-BA9A67766C5F}"/>
           </ac:picMkLst>
         </pc:picChg>
-        <pc:picChg chg="mod">
-          <ac:chgData name="Christophe Lebrun" userId="303fc86cbab77272" providerId="LiveId" clId="{5CF99517-1F4B-4B47-8D8E-709890DD7C88}" dt="2019-11-25T15:58:46.808" v="3219" actId="1076"/>
+        <pc:picChg chg="del mod">
+          <ac:chgData name="Christophe Lebrun" userId="303fc86cbab77272" providerId="LiveId" clId="{5CF99517-1F4B-4B47-8D8E-709890DD7C88}" dt="2019-11-29T06:38:49.674" v="3253" actId="478"/>
           <ac:picMkLst>
             <pc:docMk/>
             <pc:sldMk cId="616920843" sldId="396"/>
@@ -813,7 +844,7 @@
           </ac:picMkLst>
         </pc:picChg>
         <pc:picChg chg="add mod">
-          <ac:chgData name="Christophe Lebrun" userId="303fc86cbab77272" providerId="LiveId" clId="{5CF99517-1F4B-4B47-8D8E-709890DD7C88}" dt="2019-11-25T15:58:27.788" v="3216" actId="1076"/>
+          <ac:chgData name="Christophe Lebrun" userId="303fc86cbab77272" providerId="LiveId" clId="{5CF99517-1F4B-4B47-8D8E-709890DD7C88}" dt="2019-11-29T06:39:58.894" v="3266" actId="1076"/>
           <ac:picMkLst>
             <pc:docMk/>
             <pc:sldMk cId="616920843" sldId="396"/>
@@ -821,7 +852,7 @@
           </ac:picMkLst>
         </pc:picChg>
         <pc:picChg chg="add mod">
-          <ac:chgData name="Christophe Lebrun" userId="303fc86cbab77272" providerId="LiveId" clId="{5CF99517-1F4B-4B47-8D8E-709890DD7C88}" dt="2019-11-25T15:58:53.094" v="3220" actId="1076"/>
+          <ac:chgData name="Christophe Lebrun" userId="303fc86cbab77272" providerId="LiveId" clId="{5CF99517-1F4B-4B47-8D8E-709890DD7C88}" dt="2019-11-29T06:40:04.252" v="3267" actId="1076"/>
           <ac:picMkLst>
             <pc:docMk/>
             <pc:sldMk cId="616920843" sldId="396"/>
@@ -829,11 +860,19 @@
           </ac:picMkLst>
         </pc:picChg>
         <pc:picChg chg="mod">
-          <ac:chgData name="Christophe Lebrun" userId="303fc86cbab77272" providerId="LiveId" clId="{5CF99517-1F4B-4B47-8D8E-709890DD7C88}" dt="2019-11-23T14:00:56.221" v="3010" actId="14100"/>
+          <ac:chgData name="Christophe Lebrun" userId="303fc86cbab77272" providerId="LiveId" clId="{5CF99517-1F4B-4B47-8D8E-709890DD7C88}" dt="2019-11-29T06:39:57.304" v="3265" actId="1076"/>
           <ac:picMkLst>
             <pc:docMk/>
             <pc:sldMk cId="616920843" sldId="396"/>
             <ac:picMk id="10" creationId="{B9F6FC63-1D1D-4967-8BAF-1A048984E01E}"/>
+          </ac:picMkLst>
+        </pc:picChg>
+        <pc:picChg chg="add mod ord">
+          <ac:chgData name="Christophe Lebrun" userId="303fc86cbab77272" providerId="LiveId" clId="{5CF99517-1F4B-4B47-8D8E-709890DD7C88}" dt="2019-11-29T06:39:55.286" v="3264" actId="1076"/>
+          <ac:picMkLst>
+            <pc:docMk/>
+            <pc:sldMk cId="616920843" sldId="396"/>
+            <ac:picMk id="11" creationId="{DA60B205-2B20-4D85-96DD-F15DBDA4A55A}"/>
           </ac:picMkLst>
         </pc:picChg>
       </pc:sldChg>
@@ -2796,8 +2835,8 @@
   </pc:docChgLst>
   <pc:docChgLst>
     <pc:chgData name="Christophe Lebrun" userId="303fc86cbab77272" providerId="LiveId" clId="{0E6B5E6D-1ABA-4AE4-87BD-C358916F337D}"/>
-    <pc:docChg chg="custSel modSld sldOrd">
-      <pc:chgData name="Christophe Lebrun" userId="303fc86cbab77272" providerId="LiveId" clId="{0E6B5E6D-1ABA-4AE4-87BD-C358916F337D}" dt="2019-11-28T20:30:23.160" v="201" actId="20577"/>
+    <pc:docChg chg="custSel addSld modSld sldOrd">
+      <pc:chgData name="Christophe Lebrun" userId="303fc86cbab77272" providerId="LiveId" clId="{0E6B5E6D-1ABA-4AE4-87BD-C358916F337D}" dt="2019-11-29T07:51:59.651" v="278" actId="14100"/>
       <pc:docMkLst>
         <pc:docMk/>
       </pc:docMkLst>
@@ -2950,11 +2989,19 @@
         </pc:sldMkLst>
       </pc:sldChg>
       <pc:sldChg chg="modSp">
-        <pc:chgData name="Christophe Lebrun" userId="303fc86cbab77272" providerId="LiveId" clId="{0E6B5E6D-1ABA-4AE4-87BD-C358916F337D}" dt="2019-11-28T19:21:28.937" v="170" actId="20577"/>
+        <pc:chgData name="Christophe Lebrun" userId="303fc86cbab77272" providerId="LiveId" clId="{0E6B5E6D-1ABA-4AE4-87BD-C358916F337D}" dt="2019-11-29T07:05:18.441" v="213" actId="207"/>
         <pc:sldMkLst>
           <pc:docMk/>
           <pc:sldMk cId="1126268051" sldId="394"/>
         </pc:sldMkLst>
+        <pc:spChg chg="mod">
+          <ac:chgData name="Christophe Lebrun" userId="303fc86cbab77272" providerId="LiveId" clId="{0E6B5E6D-1ABA-4AE4-87BD-C358916F337D}" dt="2019-11-29T07:05:18.441" v="213" actId="207"/>
+          <ac:spMkLst>
+            <pc:docMk/>
+            <pc:sldMk cId="1126268051" sldId="394"/>
+            <ac:spMk id="12" creationId="{6D851787-4F77-4C23-B364-A92B588420BF}"/>
+          </ac:spMkLst>
+        </pc:spChg>
         <pc:graphicFrameChg chg="mod">
           <ac:chgData name="Christophe Lebrun" userId="303fc86cbab77272" providerId="LiveId" clId="{0E6B5E6D-1ABA-4AE4-87BD-C358916F337D}" dt="2019-11-28T19:21:28.937" v="170" actId="20577"/>
           <ac:graphicFrameMkLst>
@@ -3043,6 +3090,21 @@
         </pc:picChg>
       </pc:sldChg>
       <pc:sldChg chg="modSp">
+        <pc:chgData name="Christophe Lebrun" userId="303fc86cbab77272" providerId="LiveId" clId="{0E6B5E6D-1ABA-4AE4-87BD-C358916F337D}" dt="2019-11-29T07:50:04.067" v="274" actId="114"/>
+        <pc:sldMkLst>
+          <pc:docMk/>
+          <pc:sldMk cId="2824916186" sldId="401"/>
+        </pc:sldMkLst>
+        <pc:graphicFrameChg chg="mod">
+          <ac:chgData name="Christophe Lebrun" userId="303fc86cbab77272" providerId="LiveId" clId="{0E6B5E6D-1ABA-4AE4-87BD-C358916F337D}" dt="2019-11-29T07:50:04.067" v="274" actId="114"/>
+          <ac:graphicFrameMkLst>
+            <pc:docMk/>
+            <pc:sldMk cId="2824916186" sldId="401"/>
+            <ac:graphicFrameMk id="4" creationId="{4A873700-2DA4-401D-96D3-38F0871B5687}"/>
+          </ac:graphicFrameMkLst>
+        </pc:graphicFrameChg>
+      </pc:sldChg>
+      <pc:sldChg chg="modSp">
         <pc:chgData name="Christophe Lebrun" userId="303fc86cbab77272" providerId="LiveId" clId="{0E6B5E6D-1ABA-4AE4-87BD-C358916F337D}" dt="2019-11-28T20:30:23.160" v="201" actId="20577"/>
         <pc:sldMkLst>
           <pc:docMk/>
@@ -3113,7 +3175,7 @@
         </pc:picChg>
       </pc:sldChg>
       <pc:sldChg chg="modSp">
-        <pc:chgData name="Christophe Lebrun" userId="303fc86cbab77272" providerId="LiveId" clId="{0E6B5E6D-1ABA-4AE4-87BD-C358916F337D}" dt="2019-11-28T20:08:45.024" v="188" actId="20577"/>
+        <pc:chgData name="Christophe Lebrun" userId="303fc86cbab77272" providerId="LiveId" clId="{0E6B5E6D-1ABA-4AE4-87BD-C358916F337D}" dt="2019-11-29T07:04:52.891" v="211" actId="20577"/>
         <pc:sldMkLst>
           <pc:docMk/>
           <pc:sldMk cId="59910576" sldId="404"/>
@@ -3127,7 +3189,7 @@
           </ac:spMkLst>
         </pc:spChg>
         <pc:spChg chg="mod">
-          <ac:chgData name="Christophe Lebrun" userId="303fc86cbab77272" providerId="LiveId" clId="{0E6B5E6D-1ABA-4AE4-87BD-C358916F337D}" dt="2019-11-28T20:08:45.024" v="188" actId="20577"/>
+          <ac:chgData name="Christophe Lebrun" userId="303fc86cbab77272" providerId="LiveId" clId="{0E6B5E6D-1ABA-4AE4-87BD-C358916F337D}" dt="2019-11-29T07:04:52.891" v="211" actId="20577"/>
           <ac:spMkLst>
             <pc:docMk/>
             <pc:sldMk cId="59910576" sldId="404"/>
@@ -3205,6 +3267,92 @@
             <ac:cxnSpMk id="52" creationId="{1085DB9D-D48E-416C-B008-EF17D05C77C9}"/>
           </ac:cxnSpMkLst>
         </pc:cxnChg>
+      </pc:sldChg>
+      <pc:sldChg chg="modSp">
+        <pc:chgData name="Christophe Lebrun" userId="303fc86cbab77272" providerId="LiveId" clId="{0E6B5E6D-1ABA-4AE4-87BD-C358916F337D}" dt="2019-11-29T07:04:44.260" v="203" actId="207"/>
+        <pc:sldMkLst>
+          <pc:docMk/>
+          <pc:sldMk cId="2662316673" sldId="408"/>
+        </pc:sldMkLst>
+        <pc:spChg chg="mod">
+          <ac:chgData name="Christophe Lebrun" userId="303fc86cbab77272" providerId="LiveId" clId="{0E6B5E6D-1ABA-4AE4-87BD-C358916F337D}" dt="2019-11-29T07:04:44.260" v="203" actId="207"/>
+          <ac:spMkLst>
+            <pc:docMk/>
+            <pc:sldMk cId="2662316673" sldId="408"/>
+            <ac:spMk id="142" creationId="{5C1C94EF-F6D4-43D7-9AFE-0096354704EA}"/>
+          </ac:spMkLst>
+        </pc:spChg>
+      </pc:sldChg>
+      <pc:sldChg chg="addSp delSp modSp add delAnim">
+        <pc:chgData name="Christophe Lebrun" userId="303fc86cbab77272" providerId="LiveId" clId="{0E6B5E6D-1ABA-4AE4-87BD-C358916F337D}" dt="2019-11-29T07:51:59.651" v="278" actId="14100"/>
+        <pc:sldMkLst>
+          <pc:docMk/>
+          <pc:sldMk cId="2841722851" sldId="409"/>
+        </pc:sldMkLst>
+        <pc:spChg chg="add del mod">
+          <ac:chgData name="Christophe Lebrun" userId="303fc86cbab77272" providerId="LiveId" clId="{0E6B5E6D-1ABA-4AE4-87BD-C358916F337D}" dt="2019-11-29T07:51:35.061" v="275" actId="478"/>
+          <ac:spMkLst>
+            <pc:docMk/>
+            <pc:sldMk cId="2841722851" sldId="409"/>
+            <ac:spMk id="3" creationId="{A9D39839-F2D0-4E50-BE4A-6FF577141D02}"/>
+          </ac:spMkLst>
+        </pc:spChg>
+        <pc:spChg chg="mod">
+          <ac:chgData name="Christophe Lebrun" userId="303fc86cbab77272" providerId="LiveId" clId="{0E6B5E6D-1ABA-4AE4-87BD-C358916F337D}" dt="2019-11-29T07:49:31.676" v="247" actId="20577"/>
+          <ac:spMkLst>
+            <pc:docMk/>
+            <pc:sldMk cId="2841722851" sldId="409"/>
+            <ac:spMk id="7" creationId="{BF41FD47-EEB0-48CC-8D8A-5B72D9263CAB}"/>
+          </ac:spMkLst>
+        </pc:spChg>
+        <pc:spChg chg="del">
+          <ac:chgData name="Christophe Lebrun" userId="303fc86cbab77272" providerId="LiveId" clId="{0E6B5E6D-1ABA-4AE4-87BD-C358916F337D}" dt="2019-11-29T07:49:41.482" v="250" actId="478"/>
+          <ac:spMkLst>
+            <pc:docMk/>
+            <pc:sldMk cId="2841722851" sldId="409"/>
+            <ac:spMk id="9" creationId="{7D11BF4D-C821-408A-8121-4D7606B20A5B}"/>
+          </ac:spMkLst>
+        </pc:spChg>
+        <pc:spChg chg="add mod">
+          <ac:chgData name="Christophe Lebrun" userId="303fc86cbab77272" providerId="LiveId" clId="{0E6B5E6D-1ABA-4AE4-87BD-C358916F337D}" dt="2019-11-29T07:48:50.072" v="218" actId="14100"/>
+          <ac:spMkLst>
+            <pc:docMk/>
+            <pc:sldMk cId="2841722851" sldId="409"/>
+            <ac:spMk id="11" creationId="{D43AC8A9-1652-4B5F-84A5-CE4D844D82FC}"/>
+          </ac:spMkLst>
+        </pc:spChg>
+        <pc:picChg chg="del">
+          <ac:chgData name="Christophe Lebrun" userId="303fc86cbab77272" providerId="LiveId" clId="{0E6B5E6D-1ABA-4AE4-87BD-C358916F337D}" dt="2019-11-29T07:49:33.891" v="248" actId="478"/>
+          <ac:picMkLst>
+            <pc:docMk/>
+            <pc:sldMk cId="2841722851" sldId="409"/>
+            <ac:picMk id="6" creationId="{247C3C59-A3F2-4C25-9154-A28531EA94CE}"/>
+          </ac:picMkLst>
+        </pc:picChg>
+        <pc:picChg chg="del">
+          <ac:chgData name="Christophe Lebrun" userId="303fc86cbab77272" providerId="LiveId" clId="{0E6B5E6D-1ABA-4AE4-87BD-C358916F337D}" dt="2019-11-29T07:49:38.072" v="249" actId="478"/>
+          <ac:picMkLst>
+            <pc:docMk/>
+            <pc:sldMk cId="2841722851" sldId="409"/>
+            <ac:picMk id="8" creationId="{BE6CEC5A-2DD6-448A-A907-6F5B52B44F90}"/>
+          </ac:picMkLst>
+        </pc:picChg>
+        <pc:picChg chg="del">
+          <ac:chgData name="Christophe Lebrun" userId="303fc86cbab77272" providerId="LiveId" clId="{0E6B5E6D-1ABA-4AE4-87BD-C358916F337D}" dt="2019-11-29T07:48:15.276" v="215" actId="478"/>
+          <ac:picMkLst>
+            <pc:docMk/>
+            <pc:sldMk cId="2841722851" sldId="409"/>
+            <ac:picMk id="10" creationId="{6F5E0B48-7E39-4D92-A7B8-CEC622A3A43E}"/>
+          </ac:picMkLst>
+        </pc:picChg>
+        <pc:picChg chg="add mod">
+          <ac:chgData name="Christophe Lebrun" userId="303fc86cbab77272" providerId="LiveId" clId="{0E6B5E6D-1ABA-4AE4-87BD-C358916F337D}" dt="2019-11-29T07:51:59.651" v="278" actId="14100"/>
+          <ac:picMkLst>
+            <pc:docMk/>
+            <pc:sldMk cId="2841722851" sldId="409"/>
+            <ac:picMk id="12" creationId="{FDE98FCE-DE21-47BA-A75F-FDC93EC0C7A5}"/>
+          </ac:picMkLst>
+        </pc:picChg>
       </pc:sldChg>
     </pc:docChg>
   </pc:docChgLst>
@@ -10395,18 +10543,18 @@
         <a:lstStyle/>
         <a:p>
           <a:r>
-            <a:rPr lang="fr-FR" sz="4400" i="0" cap="none" baseline="0" dirty="0" err="1"/>
+            <a:rPr lang="fr-FR" sz="4400" i="1" cap="none" baseline="0" dirty="0" err="1"/>
             <a:t>Tree</a:t>
           </a:r>
           <a:r>
-            <a:rPr lang="fr-FR" sz="4400" i="0" cap="none" baseline="0" dirty="0"/>
+            <a:rPr lang="fr-FR" sz="4400" i="1" cap="none" baseline="0" dirty="0"/>
             <a:t> </a:t>
           </a:r>
           <a:r>
-            <a:rPr lang="fr-FR" sz="4400" i="0" cap="none" baseline="0" dirty="0" err="1"/>
+            <a:rPr lang="fr-FR" sz="4400" i="1" cap="none" baseline="0" dirty="0" err="1"/>
             <a:t>interpreter</a:t>
           </a:r>
-          <a:endParaRPr lang="fr-FR" sz="4400" i="0" cap="none" baseline="0" dirty="0"/>
+          <a:endParaRPr lang="fr-FR" sz="4400" i="1" cap="none" baseline="0" dirty="0"/>
         </a:p>
       </dgm:t>
     </dgm:pt>
@@ -10431,6 +10579,43 @@
           <a:endParaRPr lang="fr-FR"/>
         </a:p>
       </dgm:t>
+    </dgm:pt>
+    <dgm:pt modelId="{7C1111FD-461A-4B48-BE5E-A7592F0966E4}">
+      <dgm:prSet custT="1"/>
+      <dgm:spPr>
+        <a:ln>
+          <a:solidFill>
+            <a:schemeClr val="accent3"/>
+          </a:solidFill>
+        </a:ln>
+      </dgm:spPr>
+      <dgm:t>
+        <a:bodyPr/>
+        <a:lstStyle/>
+        <a:p>
+          <a:r>
+            <a:rPr lang="en-GB" sz="4400" i="0" cap="none" baseline="0" dirty="0" err="1"/>
+            <a:t>Modèle</a:t>
+          </a:r>
+          <a:r>
+            <a:rPr lang="en-GB" sz="4400" i="0" cap="none" baseline="0" dirty="0"/>
+            <a:t> </a:t>
+          </a:r>
+          <a:r>
+            <a:rPr lang="en-GB" sz="4400" i="0" cap="none" baseline="0" dirty="0" err="1"/>
+            <a:t>sélectionné</a:t>
+          </a:r>
+          <a:endParaRPr lang="fr-FR" sz="4400" i="0" cap="none" baseline="0" dirty="0"/>
+        </a:p>
+      </dgm:t>
+    </dgm:pt>
+    <dgm:pt modelId="{E130F9E6-B4DE-4113-9732-D252FB86462B}" type="parTrans" cxnId="{26958E2D-382B-4AED-B8AA-26EEF128CF2A}">
+      <dgm:prSet/>
+      <dgm:spPr/>
+    </dgm:pt>
+    <dgm:pt modelId="{B6FA602D-FD77-4A67-967A-D2A4FDE06A95}" type="sibTrans" cxnId="{26958E2D-382B-4AED-B8AA-26EEF128CF2A}">
+      <dgm:prSet/>
+      <dgm:spPr/>
     </dgm:pt>
     <dgm:pt modelId="{B79F42B9-2C33-44FA-9767-F9E8E0FC20A5}" type="pres">
       <dgm:prSet presAssocID="{97CFFB21-1D1C-40D2-A843-52415A2E1E28}" presName="linear" presStyleCnt="0">
@@ -10473,6 +10658,7 @@
     </dgm:pt>
   </dgm:ptLst>
   <dgm:cxnLst>
+    <dgm:cxn modelId="{26958E2D-382B-4AED-B8AA-26EEF128CF2A}" srcId="{B45A9B83-EB06-48CA-8C9E-3318CF22F76C}" destId="{7C1111FD-461A-4B48-BE5E-A7592F0966E4}" srcOrd="2" destOrd="0" parTransId="{E130F9E6-B4DE-4113-9732-D252FB86462B}" sibTransId="{B6FA602D-FD77-4A67-967A-D2A4FDE06A95}"/>
     <dgm:cxn modelId="{EBD1A73D-8CF1-4470-996B-0DDB3094184D}" type="presOf" srcId="{B45A9B83-EB06-48CA-8C9E-3318CF22F76C}" destId="{1AB74DEC-5A1F-4151-9385-520A15A9B834}" srcOrd="0" destOrd="0" presId="urn:microsoft.com/office/officeart/2005/8/layout/list1"/>
     <dgm:cxn modelId="{45A88E64-0619-46CA-B117-315D0073C8F6}" type="presOf" srcId="{B45A9B83-EB06-48CA-8C9E-3318CF22F76C}" destId="{BD75D9C0-7A59-4DED-B0DF-8AAFC0A16095}" srcOrd="1" destOrd="0" presId="urn:microsoft.com/office/officeart/2005/8/layout/list1"/>
     <dgm:cxn modelId="{65FDFA45-7B16-49A5-971E-A3A4CF687D31}" type="presOf" srcId="{6365D475-A405-4282-8F10-D84C72F6DFFF}" destId="{2F26B953-D615-4F1B-AE92-ADA95D0E677C}" srcOrd="0" destOrd="1" presId="urn:microsoft.com/office/officeart/2005/8/layout/list1"/>
@@ -10481,6 +10667,7 @@
     <dgm:cxn modelId="{8B357EAC-04AE-4CFD-A5FE-737FD5DB1B55}" type="presOf" srcId="{A5625751-3184-4D8B-8F3A-BE7255AF8D46}" destId="{2F26B953-D615-4F1B-AE92-ADA95D0E677C}" srcOrd="0" destOrd="0" presId="urn:microsoft.com/office/officeart/2005/8/layout/list1"/>
     <dgm:cxn modelId="{215793B3-7B0A-4948-967D-70446AF5C9CE}" srcId="{B45A9B83-EB06-48CA-8C9E-3318CF22F76C}" destId="{A5625751-3184-4D8B-8F3A-BE7255AF8D46}" srcOrd="0" destOrd="0" parTransId="{9BE9376F-C244-450A-9BB8-DCFEE401E245}" sibTransId="{51AFA782-1C35-4986-82B7-7426C26EA1D5}"/>
     <dgm:cxn modelId="{A1BB80C2-1C87-4E8F-B0DC-D494DF3564AB}" type="presOf" srcId="{97CFFB21-1D1C-40D2-A843-52415A2E1E28}" destId="{B79F42B9-2C33-44FA-9767-F9E8E0FC20A5}" srcOrd="0" destOrd="0" presId="urn:microsoft.com/office/officeart/2005/8/layout/list1"/>
+    <dgm:cxn modelId="{C5E407FB-D5C9-41FD-9D46-466C4D47322C}" type="presOf" srcId="{7C1111FD-461A-4B48-BE5E-A7592F0966E4}" destId="{2F26B953-D615-4F1B-AE92-ADA95D0E677C}" srcOrd="0" destOrd="2" presId="urn:microsoft.com/office/officeart/2005/8/layout/list1"/>
     <dgm:cxn modelId="{6FCC6B6C-134E-4ED8-9DEE-73D029479B65}" type="presParOf" srcId="{B79F42B9-2C33-44FA-9767-F9E8E0FC20A5}" destId="{DF4A7ACF-A667-46E0-931F-A653472F20DC}" srcOrd="0" destOrd="0" presId="urn:microsoft.com/office/officeart/2005/8/layout/list1"/>
     <dgm:cxn modelId="{5A972CB4-3C83-47D9-943D-52707A6A9D9D}" type="presParOf" srcId="{DF4A7ACF-A667-46E0-931F-A653472F20DC}" destId="{1AB74DEC-5A1F-4151-9385-520A15A9B834}" srcOrd="0" destOrd="0" presId="urn:microsoft.com/office/officeart/2005/8/layout/list1"/>
     <dgm:cxn modelId="{1762E1F2-BF4F-452A-B8ED-107DEBC69B1B}" type="presParOf" srcId="{DF4A7ACF-A667-46E0-931F-A653472F20DC}" destId="{BD75D9C0-7A59-4DED-B0DF-8AAFC0A16095}" srcOrd="1" destOrd="0" presId="urn:microsoft.com/office/officeart/2005/8/layout/list1"/>
@@ -12529,8 +12716,8 @@
       </dsp:nvSpPr>
       <dsp:spPr>
         <a:xfrm>
-          <a:off x="0" y="960679"/>
-          <a:ext cx="11425186" cy="2622443"/>
+          <a:off x="0" y="654727"/>
+          <a:ext cx="11425186" cy="3234346"/>
         </a:xfrm>
         <a:prstGeom prst="rect">
           <a:avLst/>
@@ -12565,7 +12752,7 @@
         <a:fontRef idx="minor"/>
       </dsp:style>
       <dsp:txBody>
-        <a:bodyPr spcFirstLastPara="0" vert="horz" wrap="square" lIns="886721" tIns="958088" rIns="886721" bIns="312928" numCol="1" spcCol="1270" anchor="t" anchorCtr="0">
+        <a:bodyPr spcFirstLastPara="0" vert="horz" wrap="square" lIns="886721" tIns="853948" rIns="886721" bIns="312928" numCol="1" spcCol="1270" anchor="t" anchorCtr="0">
           <a:noAutofit/>
         </a:bodyPr>
         <a:lstStyle/>
@@ -12610,23 +12797,50 @@
             <a:buChar char="•"/>
           </a:pPr>
           <a:r>
-            <a:rPr lang="fr-FR" sz="4400" i="0" kern="1200" cap="none" baseline="0" dirty="0" err="1"/>
+            <a:rPr lang="fr-FR" sz="4400" i="1" kern="1200" cap="none" baseline="0" dirty="0" err="1"/>
             <a:t>Tree</a:t>
           </a:r>
           <a:r>
-            <a:rPr lang="fr-FR" sz="4400" i="0" kern="1200" cap="none" baseline="0" dirty="0"/>
+            <a:rPr lang="fr-FR" sz="4400" i="1" kern="1200" cap="none" baseline="0" dirty="0"/>
             <a:t> </a:t>
           </a:r>
           <a:r>
-            <a:rPr lang="fr-FR" sz="4400" i="0" kern="1200" cap="none" baseline="0" dirty="0" err="1"/>
+            <a:rPr lang="fr-FR" sz="4400" i="1" kern="1200" cap="none" baseline="0" dirty="0" err="1"/>
             <a:t>interpreter</a:t>
+          </a:r>
+          <a:endParaRPr lang="fr-FR" sz="4400" i="1" kern="1200" cap="none" baseline="0" dirty="0"/>
+        </a:p>
+        <a:p>
+          <a:pPr marL="285750" lvl="1" indent="-285750" algn="l" defTabSz="1955800">
+            <a:lnSpc>
+              <a:spcPct val="90000"/>
+            </a:lnSpc>
+            <a:spcBef>
+              <a:spcPct val="0"/>
+            </a:spcBef>
+            <a:spcAft>
+              <a:spcPct val="15000"/>
+            </a:spcAft>
+            <a:buChar char="•"/>
+          </a:pPr>
+          <a:r>
+            <a:rPr lang="en-GB" sz="4400" i="0" kern="1200" cap="none" baseline="0" dirty="0" err="1"/>
+            <a:t>Modèle</a:t>
+          </a:r>
+          <a:r>
+            <a:rPr lang="en-GB" sz="4400" i="0" kern="1200" cap="none" baseline="0" dirty="0"/>
+            <a:t> </a:t>
+          </a:r>
+          <a:r>
+            <a:rPr lang="en-GB" sz="4400" i="0" kern="1200" cap="none" baseline="0" dirty="0" err="1"/>
+            <a:t>sélectionné</a:t>
           </a:r>
           <a:endParaRPr lang="fr-FR" sz="4400" i="0" kern="1200" cap="none" baseline="0" dirty="0"/>
         </a:p>
       </dsp:txBody>
       <dsp:txXfrm>
-        <a:off x="0" y="960679"/>
-        <a:ext cx="11425186" cy="2622443"/>
+        <a:off x="0" y="654727"/>
+        <a:ext cx="11425186" cy="3234346"/>
       </dsp:txXfrm>
     </dsp:sp>
     <dsp:sp modelId="{BD75D9C0-7A59-4DED-B0DF-8AAFC0A16095}">
@@ -12636,7 +12850,7 @@
       </dsp:nvSpPr>
       <dsp:spPr>
         <a:xfrm>
-          <a:off x="581707" y="563042"/>
+          <a:off x="581707" y="257091"/>
           <a:ext cx="7997630" cy="699241"/>
         </a:xfrm>
         <a:prstGeom prst="roundRect">
@@ -12678,7 +12892,7 @@
         </a:bodyPr>
         <a:lstStyle/>
         <a:p>
-          <a:pPr marL="0" lvl="0" indent="0" algn="l" defTabSz="2044700">
+          <a:pPr marL="0" lvl="0" indent="0" algn="l" defTabSz="1822450">
             <a:lnSpc>
               <a:spcPct val="90000"/>
             </a:lnSpc>
@@ -12691,14 +12905,14 @@
             <a:buNone/>
           </a:pPr>
           <a:r>
-            <a:rPr lang="fr-FR" sz="4600" b="1" kern="1200" cap="small" dirty="0"/>
+            <a:rPr lang="fr-FR" sz="4100" b="1" kern="1200" cap="small" dirty="0"/>
             <a:t>Annexes</a:t>
           </a:r>
-          <a:endParaRPr lang="fr-FR" sz="4600" b="0" kern="1200" dirty="0"/>
+          <a:endParaRPr lang="fr-FR" sz="4100" b="0" kern="1200" dirty="0"/>
         </a:p>
       </dsp:txBody>
       <dsp:txXfrm>
-        <a:off x="615841" y="597176"/>
+        <a:off x="615841" y="291225"/>
         <a:ext cx="7929362" cy="630973"/>
       </dsp:txXfrm>
     </dsp:sp>
@@ -21657,7 +21871,7 @@
           <a:p>
             <a:fld id="{A6994B78-A156-4E76-BB28-39D7E36AE272}" type="datetimeFigureOut">
               <a:rPr lang="fr-FR" smtClean="0"/>
-              <a:t>28/11/2019</a:t>
+              <a:t>29/11/2019</a:t>
             </a:fld>
             <a:endParaRPr lang="fr-FR"/>
           </a:p>
@@ -22178,7 +22392,7 @@
           <a:p>
             <a:fld id="{4A2428F8-4951-4546-B4FA-7B0FACC74B80}" type="datetime1">
               <a:rPr lang="fr-FR" smtClean="0"/>
-              <a:t>28/11/2019</a:t>
+              <a:t>29/11/2019</a:t>
             </a:fld>
             <a:endParaRPr lang="fr-FR"/>
           </a:p>
@@ -22445,7 +22659,7 @@
           <a:p>
             <a:fld id="{ACB6019D-FF65-4B6D-88E7-E32520CD55FC}" type="datetime1">
               <a:rPr lang="fr-FR" smtClean="0"/>
-              <a:t>28/11/2019</a:t>
+              <a:t>29/11/2019</a:t>
             </a:fld>
             <a:endParaRPr lang="fr-FR"/>
           </a:p>
@@ -22676,7 +22890,7 @@
           <a:p>
             <a:fld id="{F801886C-9464-46E7-BC75-B4C59B337121}" type="datetime1">
               <a:rPr lang="fr-FR" smtClean="0"/>
-              <a:t>28/11/2019</a:t>
+              <a:t>29/11/2019</a:t>
             </a:fld>
             <a:endParaRPr lang="fr-FR"/>
           </a:p>
@@ -22986,7 +23200,7 @@
           <a:p>
             <a:fld id="{AB2972D2-6F14-4C24-9E0C-4FF7F34B2768}" type="datetime1">
               <a:rPr lang="fr-FR" smtClean="0"/>
-              <a:t>28/11/2019</a:t>
+              <a:t>29/11/2019</a:t>
             </a:fld>
             <a:endParaRPr lang="fr-FR"/>
           </a:p>
@@ -23459,7 +23673,7 @@
           <a:p>
             <a:fld id="{150DD647-851C-4A6E-99E4-412E2060441D}" type="datetime1">
               <a:rPr lang="fr-FR" smtClean="0"/>
-              <a:t>28/11/2019</a:t>
+              <a:t>29/11/2019</a:t>
             </a:fld>
             <a:endParaRPr lang="fr-FR"/>
           </a:p>
@@ -24006,7 +24220,7 @@
           <a:p>
             <a:fld id="{33781566-4F69-403C-9080-3BFEE2B37491}" type="datetime1">
               <a:rPr lang="fr-FR" smtClean="0"/>
-              <a:t>28/11/2019</a:t>
+              <a:t>29/11/2019</a:t>
             </a:fld>
             <a:endParaRPr lang="fr-FR"/>
           </a:p>
@@ -24780,7 +24994,7 @@
           <a:p>
             <a:fld id="{14D47B0C-B5AB-42EB-BB2D-F19425E95921}" type="datetime1">
               <a:rPr lang="fr-FR" smtClean="0"/>
-              <a:t>28/11/2019</a:t>
+              <a:t>29/11/2019</a:t>
             </a:fld>
             <a:endParaRPr lang="fr-FR"/>
           </a:p>
@@ -24955,7 +25169,7 @@
           <a:p>
             <a:fld id="{C573A1F9-098E-4818-B4BA-05597FCE7433}" type="datetime1">
               <a:rPr lang="fr-FR" smtClean="0"/>
-              <a:t>28/11/2019</a:t>
+              <a:t>29/11/2019</a:t>
             </a:fld>
             <a:endParaRPr lang="fr-FR"/>
           </a:p>
@@ -25178,7 +25392,7 @@
           <a:p>
             <a:fld id="{9B85617F-11C8-46B4-82FC-6C143D8E927D}" type="datetime1">
               <a:rPr lang="fr-FR" smtClean="0"/>
-              <a:t>28/11/2019</a:t>
+              <a:t>29/11/2019</a:t>
             </a:fld>
             <a:endParaRPr lang="fr-FR"/>
           </a:p>
@@ -25419,7 +25633,7 @@
           <a:p>
             <a:fld id="{21493104-0DD6-4188-A408-37748D818DBE}" type="datetime1">
               <a:rPr lang="fr-FR" smtClean="0"/>
-              <a:t>28/11/2019</a:t>
+              <a:t>29/11/2019</a:t>
             </a:fld>
             <a:endParaRPr lang="fr-FR"/>
           </a:p>
@@ -25599,7 +25813,7 @@
           <a:p>
             <a:fld id="{824ACC8D-CADA-4745-885B-C009075ACE07}" type="datetime1">
               <a:rPr lang="fr-FR" smtClean="0"/>
-              <a:t>28/11/2019</a:t>
+              <a:t>29/11/2019</a:t>
             </a:fld>
             <a:endParaRPr lang="fr-FR"/>
           </a:p>
@@ -25769,7 +25983,7 @@
           <a:p>
             <a:fld id="{2468CB63-00AE-4756-B792-32C885852036}" type="datetime1">
               <a:rPr lang="fr-FR" smtClean="0"/>
-              <a:t>28/11/2019</a:t>
+              <a:t>29/11/2019</a:t>
             </a:fld>
             <a:endParaRPr lang="fr-FR"/>
           </a:p>
@@ -26058,7 +26272,7 @@
           <a:p>
             <a:fld id="{F898AE11-0657-4D23-A8AC-E411F594EC7D}" type="datetime1">
               <a:rPr lang="fr-FR" smtClean="0"/>
-              <a:t>28/11/2019</a:t>
+              <a:t>29/11/2019</a:t>
             </a:fld>
             <a:endParaRPr lang="fr-FR"/>
           </a:p>
@@ -26300,7 +26514,7 @@
           <a:p>
             <a:fld id="{5F7B142A-F148-4ADB-A468-FE587DAD07D9}" type="datetime1">
               <a:rPr lang="fr-FR" smtClean="0"/>
-              <a:t>28/11/2019</a:t>
+              <a:t>29/11/2019</a:t>
             </a:fld>
             <a:endParaRPr lang="fr-FR"/>
           </a:p>
@@ -26679,7 +26893,7 @@
           <a:p>
             <a:fld id="{DF19706F-1691-421A-B634-B96F386F7B76}" type="datetime1">
               <a:rPr lang="fr-FR" smtClean="0"/>
-              <a:t>28/11/2019</a:t>
+              <a:t>29/11/2019</a:t>
             </a:fld>
             <a:endParaRPr lang="fr-FR"/>
           </a:p>
@@ -26797,7 +27011,7 @@
           <a:p>
             <a:fld id="{82E02EEA-4114-443B-89FA-6E832FF354CE}" type="datetime1">
               <a:rPr lang="fr-FR" smtClean="0"/>
-              <a:t>28/11/2019</a:t>
+              <a:t>29/11/2019</a:t>
             </a:fld>
             <a:endParaRPr lang="fr-FR"/>
           </a:p>
@@ -26892,7 +27106,7 @@
           <a:p>
             <a:fld id="{5BF41AA7-3BDA-4782-B3C5-401728461EBA}" type="datetime1">
               <a:rPr lang="fr-FR" smtClean="0"/>
-              <a:t>28/11/2019</a:t>
+              <a:t>29/11/2019</a:t>
             </a:fld>
             <a:endParaRPr lang="fr-FR"/>
           </a:p>
@@ -27141,7 +27355,7 @@
           <a:p>
             <a:fld id="{790D4B45-0ED5-401D-87BF-F27E5AD4E8F6}" type="datetime1">
               <a:rPr lang="fr-FR" smtClean="0"/>
-              <a:t>28/11/2019</a:t>
+              <a:t>29/11/2019</a:t>
             </a:fld>
             <a:endParaRPr lang="fr-FR"/>
           </a:p>
@@ -27398,7 +27612,7 @@
           <a:p>
             <a:fld id="{C4BA227D-3211-4923-B058-2465568DA97C}" type="datetime1">
               <a:rPr lang="fr-FR" smtClean="0"/>
-              <a:t>28/11/2019</a:t>
+              <a:t>29/11/2019</a:t>
             </a:fld>
             <a:endParaRPr lang="fr-FR"/>
           </a:p>
@@ -27655,7 +27869,7 @@
           <a:p>
             <a:fld id="{33EC2012-1BFF-4C92-91DA-ED5E44E2DAE6}" type="datetime1">
               <a:rPr lang="fr-FR" smtClean="0"/>
-              <a:t>28/11/2019</a:t>
+              <a:t>29/11/2019</a:t>
             </a:fld>
             <a:endParaRPr lang="fr-FR"/>
           </a:p>
@@ -27886,7 +28100,7 @@
           <a:p>
             <a:fld id="{36D54C82-D4A8-4BCC-BBE6-5333B0B84731}" type="datetime1">
               <a:rPr lang="fr-FR" smtClean="0"/>
-              <a:t>28/11/2019</a:t>
+              <a:t>29/11/2019</a:t>
             </a:fld>
             <a:endParaRPr lang="fr-FR"/>
           </a:p>
@@ -28196,7 +28410,7 @@
           <a:p>
             <a:fld id="{DDD00B7C-7A69-493A-8A97-AE08389BB3D5}" type="datetime1">
               <a:rPr lang="fr-FR" smtClean="0"/>
-              <a:t>28/11/2019</a:t>
+              <a:t>29/11/2019</a:t>
             </a:fld>
             <a:endParaRPr lang="fr-FR"/>
           </a:p>
@@ -28727,7 +28941,7 @@
           <a:p>
             <a:fld id="{10EA4304-F7B0-45DA-9970-108CC9362744}" type="datetime1">
               <a:rPr lang="fr-FR" smtClean="0"/>
-              <a:t>28/11/2019</a:t>
+              <a:t>29/11/2019</a:t>
             </a:fld>
             <a:endParaRPr lang="fr-FR"/>
           </a:p>
@@ -28968,7 +29182,7 @@
           <a:p>
             <a:fld id="{551B583F-2DDE-447D-8CBF-9525FA0FB806}" type="datetime1">
               <a:rPr lang="fr-FR" smtClean="0"/>
-              <a:t>28/11/2019</a:t>
+              <a:t>29/11/2019</a:t>
             </a:fld>
             <a:endParaRPr lang="fr-FR"/>
           </a:p>
@@ -29515,7 +29729,7 @@
           <a:p>
             <a:fld id="{F196D0C2-EC15-4914-BD1C-8DC6D93A7E06}" type="datetime1">
               <a:rPr lang="fr-FR" smtClean="0"/>
-              <a:t>28/11/2019</a:t>
+              <a:t>29/11/2019</a:t>
             </a:fld>
             <a:endParaRPr lang="fr-FR"/>
           </a:p>
@@ -30289,7 +30503,7 @@
           <a:p>
             <a:fld id="{B0F0F71C-CB2D-46DF-BBF5-45A6CF07943D}" type="datetime1">
               <a:rPr lang="fr-FR" smtClean="0"/>
-              <a:t>28/11/2019</a:t>
+              <a:t>29/11/2019</a:t>
             </a:fld>
             <a:endParaRPr lang="fr-FR"/>
           </a:p>
@@ -30464,7 +30678,7 @@
           <a:p>
             <a:fld id="{D8EE97A0-E3EB-454D-B57B-09208F6C2349}" type="datetime1">
               <a:rPr lang="fr-FR" smtClean="0"/>
-              <a:t>28/11/2019</a:t>
+              <a:t>29/11/2019</a:t>
             </a:fld>
             <a:endParaRPr lang="fr-FR"/>
           </a:p>
@@ -30687,7 +30901,7 @@
           <a:p>
             <a:fld id="{0C6102B9-41E8-4E57-8EA6-AB67D80E10AB}" type="datetime1">
               <a:rPr lang="fr-FR" smtClean="0"/>
-              <a:t>28/11/2019</a:t>
+              <a:t>29/11/2019</a:t>
             </a:fld>
             <a:endParaRPr lang="fr-FR"/>
           </a:p>
@@ -30929,7 +31143,7 @@
           <a:p>
             <a:fld id="{5EF8BD1A-0AB3-42BB-87D7-511BD450E973}" type="datetime1">
               <a:rPr lang="fr-FR" smtClean="0"/>
-              <a:t>28/11/2019</a:t>
+              <a:t>29/11/2019</a:t>
             </a:fld>
             <a:endParaRPr lang="fr-FR"/>
           </a:p>
@@ -31308,7 +31522,7 @@
           <a:p>
             <a:fld id="{F0ED20F9-E137-45C5-9CDB-EB23F7F61742}" type="datetime1">
               <a:rPr lang="fr-FR" smtClean="0"/>
-              <a:t>28/11/2019</a:t>
+              <a:t>29/11/2019</a:t>
             </a:fld>
             <a:endParaRPr lang="fr-FR"/>
           </a:p>
@@ -31426,7 +31640,7 @@
           <a:p>
             <a:fld id="{7F549FA9-5419-4577-ACA1-5FA8B1F430E1}" type="datetime1">
               <a:rPr lang="fr-FR" smtClean="0"/>
-              <a:t>28/11/2019</a:t>
+              <a:t>29/11/2019</a:t>
             </a:fld>
             <a:endParaRPr lang="fr-FR"/>
           </a:p>
@@ -31521,7 +31735,7 @@
           <a:p>
             <a:fld id="{B732A3B4-D77F-4011-84A4-1CE2C85060AA}" type="datetime1">
               <a:rPr lang="fr-FR" smtClean="0"/>
-              <a:t>28/11/2019</a:t>
+              <a:t>29/11/2019</a:t>
             </a:fld>
             <a:endParaRPr lang="fr-FR"/>
           </a:p>
@@ -31770,7 +31984,7 @@
           <a:p>
             <a:fld id="{AFD5C01D-38A9-4545-9F6C-D14ECEB1FB25}" type="datetime1">
               <a:rPr lang="fr-FR" smtClean="0"/>
-              <a:t>28/11/2019</a:t>
+              <a:t>29/11/2019</a:t>
             </a:fld>
             <a:endParaRPr lang="fr-FR"/>
           </a:p>
@@ -32027,7 +32241,7 @@
           <a:p>
             <a:fld id="{AD9F5F43-A7C8-4BE7-8EDD-3B94DD5ED3AC}" type="datetime1">
               <a:rPr lang="fr-FR" smtClean="0"/>
-              <a:t>28/11/2019</a:t>
+              <a:t>29/11/2019</a:t>
             </a:fld>
             <a:endParaRPr lang="fr-FR"/>
           </a:p>
@@ -32270,7 +32484,7 @@
           <a:p>
             <a:fld id="{C0D22650-866C-43F7-8C91-C810959EF2B7}" type="datetime1">
               <a:rPr lang="fr-FR" smtClean="0"/>
-              <a:t>28/11/2019</a:t>
+              <a:t>29/11/2019</a:t>
             </a:fld>
             <a:endParaRPr lang="fr-FR"/>
           </a:p>
@@ -32847,7 +33061,7 @@
           <a:p>
             <a:fld id="{C0D22650-866C-43F7-8C91-C810959EF2B7}" type="datetime1">
               <a:rPr lang="fr-FR" smtClean="0"/>
-              <a:t>28/11/2019</a:t>
+              <a:t>29/11/2019</a:t>
             </a:fld>
             <a:endParaRPr lang="fr-FR"/>
           </a:p>
@@ -35699,21 +35913,6 @@
               <a:t> model</a:t>
             </a:r>
           </a:p>
-          <a:p>
-            <a:pPr algn="ctr"/>
-            <a:r>
-              <a:rPr lang="fr-FR" dirty="0"/>
-              <a:t>(</a:t>
-            </a:r>
-            <a:r>
-              <a:rPr lang="fr-FR" dirty="0" err="1"/>
-              <a:t>logit</a:t>
-            </a:r>
-            <a:r>
-              <a:rPr lang="fr-FR" dirty="0"/>
-              <a:t>)</a:t>
-            </a:r>
-          </a:p>
         </p:txBody>
       </p:sp>
       <p:cxnSp>
@@ -38479,7 +38678,9 @@
             <a:avLst/>
           </a:prstGeom>
           <a:solidFill>
-            <a:schemeClr val="accent6"/>
+            <a:schemeClr val="accent3">
+              <a:lumMod val="75000"/>
+            </a:schemeClr>
           </a:solidFill>
           <a:ln>
             <a:solidFill>
@@ -48149,7 +48350,7 @@
           <p:nvPr>
             <p:extLst>
               <p:ext uri="{D42A27DB-BD31-4B8C-83A1-F6EECF244321}">
-                <p14:modId xmlns:p14="http://schemas.microsoft.com/office/powerpoint/2010/main" val="3170893794"/>
+                <p14:modId xmlns:p14="http://schemas.microsoft.com/office/powerpoint/2010/main" val="3564617455"/>
               </p:ext>
             </p:extLst>
           </p:nvPr>
@@ -49153,6 +49354,223 @@
 </p:sld>
 </file>
 
+<file path=ppt/slides/slide21.xml><?xml version="1.0" encoding="utf-8"?>
+<p:sld xmlns:a="http://schemas.openxmlformats.org/drawingml/2006/main" xmlns:r="http://schemas.openxmlformats.org/officeDocument/2006/relationships" xmlns:p="http://schemas.openxmlformats.org/presentationml/2006/main">
+  <p:cSld>
+    <p:spTree>
+      <p:nvGrpSpPr>
+        <p:cNvPr id="1" name=""/>
+        <p:cNvGrpSpPr/>
+        <p:nvPr/>
+      </p:nvGrpSpPr>
+      <p:grpSpPr>
+        <a:xfrm>
+          <a:off x="0" y="0"/>
+          <a:ext cx="0" cy="0"/>
+          <a:chOff x="0" y="0"/>
+          <a:chExt cx="0" cy="0"/>
+        </a:xfrm>
+      </p:grpSpPr>
+      <p:sp>
+        <p:nvSpPr>
+          <p:cNvPr id="4" name="Espace réservé du numéro de diapositive 3">
+            <a:extLst>
+              <a:ext uri="{FF2B5EF4-FFF2-40B4-BE49-F238E27FC236}">
+                <a16:creationId xmlns:a16="http://schemas.microsoft.com/office/drawing/2014/main" id="{E6FDC220-99E8-4D63-B9B6-FF8E08FAC65D}"/>
+              </a:ext>
+            </a:extLst>
+          </p:cNvPr>
+          <p:cNvSpPr>
+            <a:spLocks noGrp="1"/>
+          </p:cNvSpPr>
+          <p:nvPr>
+            <p:ph type="sldNum" sz="quarter" idx="12"/>
+          </p:nvPr>
+        </p:nvSpPr>
+        <p:spPr/>
+        <p:txBody>
+          <a:bodyPr/>
+          <a:lstStyle/>
+          <a:p>
+            <a:fld id="{22EBEF4F-4056-4A7E-9612-F3E8B502E28B}" type="slidenum">
+              <a:rPr lang="fr-FR" smtClean="0"/>
+              <a:t>21</a:t>
+            </a:fld>
+            <a:endParaRPr lang="fr-FR"/>
+          </a:p>
+        </p:txBody>
+      </p:sp>
+      <p:sp>
+        <p:nvSpPr>
+          <p:cNvPr id="7" name="Titre 1">
+            <a:extLst>
+              <a:ext uri="{FF2B5EF4-FFF2-40B4-BE49-F238E27FC236}">
+                <a16:creationId xmlns:a16="http://schemas.microsoft.com/office/drawing/2014/main" id="{BF41FD47-EEB0-48CC-8D8A-5B72D9263CAB}"/>
+              </a:ext>
+            </a:extLst>
+          </p:cNvPr>
+          <p:cNvSpPr txBox="1">
+            <a:spLocks/>
+          </p:cNvSpPr>
+          <p:nvPr/>
+        </p:nvSpPr>
+        <p:spPr>
+          <a:xfrm>
+            <a:off x="528919" y="704840"/>
+            <a:ext cx="10817831" cy="1041174"/>
+          </a:xfrm>
+          <a:prstGeom prst="rect">
+            <a:avLst/>
+          </a:prstGeom>
+        </p:spPr>
+        <p:txBody>
+          <a:bodyPr vert="horz" lIns="91440" tIns="45720" rIns="91440" bIns="45720" rtlCol="0" anchor="ctr">
+            <a:normAutofit fontScale="97500"/>
+          </a:bodyPr>
+          <a:lstStyle>
+            <a:lvl1pPr algn="r" defTabSz="914400" rtl="0" eaLnBrk="1" latinLnBrk="0" hangingPunct="1">
+              <a:lnSpc>
+                <a:spcPct val="90000"/>
+              </a:lnSpc>
+              <a:spcBef>
+                <a:spcPct val="0"/>
+              </a:spcBef>
+              <a:buNone/>
+              <a:defRPr sz="4000" kern="1200" cap="all" baseline="0">
+                <a:solidFill>
+                  <a:schemeClr val="tx1"/>
+                </a:solidFill>
+                <a:latin typeface="+mj-lt"/>
+                <a:ea typeface="+mj-ea"/>
+                <a:cs typeface="+mj-cs"/>
+              </a:defRPr>
+            </a:lvl1pPr>
+          </a:lstStyle>
+          <a:p>
+            <a:r>
+              <a:rPr lang="fr-FR" b="1" dirty="0"/>
+              <a:t>ANNEXE 3</a:t>
+            </a:r>
+            <a:br>
+              <a:rPr lang="fr-FR" b="1" dirty="0"/>
+            </a:br>
+            <a:r>
+              <a:rPr lang="fr-FR" sz="2700" dirty="0"/>
+              <a:t>MODELE SELECTIONNE</a:t>
+            </a:r>
+            <a:endParaRPr lang="fr-FR" dirty="0"/>
+          </a:p>
+        </p:txBody>
+      </p:sp>
+      <p:sp>
+        <p:nvSpPr>
+          <p:cNvPr id="11" name="Cube 10">
+            <a:extLst>
+              <a:ext uri="{FF2B5EF4-FFF2-40B4-BE49-F238E27FC236}">
+                <a16:creationId xmlns:a16="http://schemas.microsoft.com/office/drawing/2014/main" id="{D43AC8A9-1652-4B5F-84A5-CE4D844D82FC}"/>
+              </a:ext>
+            </a:extLst>
+          </p:cNvPr>
+          <p:cNvSpPr/>
+          <p:nvPr/>
+        </p:nvSpPr>
+        <p:spPr>
+          <a:xfrm>
+            <a:off x="327516" y="261818"/>
+            <a:ext cx="1049221" cy="1041174"/>
+          </a:xfrm>
+          <a:prstGeom prst="cube">
+            <a:avLst/>
+          </a:prstGeom>
+          <a:solidFill>
+            <a:schemeClr val="bg1"/>
+          </a:solidFill>
+          <a:ln w="44450">
+            <a:solidFill>
+              <a:schemeClr val="tx1"/>
+            </a:solidFill>
+          </a:ln>
+        </p:spPr>
+        <p:style>
+          <a:lnRef idx="2">
+            <a:schemeClr val="accent1">
+              <a:shade val="50000"/>
+            </a:schemeClr>
+          </a:lnRef>
+          <a:fillRef idx="1">
+            <a:schemeClr val="accent1"/>
+          </a:fillRef>
+          <a:effectRef idx="0">
+            <a:schemeClr val="accent1"/>
+          </a:effectRef>
+          <a:fontRef idx="minor">
+            <a:schemeClr val="lt1"/>
+          </a:fontRef>
+        </p:style>
+        <p:txBody>
+          <a:bodyPr rtlCol="0" anchor="ctr"/>
+          <a:lstStyle/>
+          <a:p>
+            <a:pPr algn="ctr"/>
+            <a:r>
+              <a:rPr lang="fr-FR" sz="4800" b="1" dirty="0">
+                <a:latin typeface="Times New Roman" panose="02020603050405020304" pitchFamily="18" charset="0"/>
+                <a:cs typeface="Times New Roman" panose="02020603050405020304" pitchFamily="18" charset="0"/>
+              </a:rPr>
+              <a:t>?</a:t>
+            </a:r>
+          </a:p>
+        </p:txBody>
+      </p:sp>
+      <p:pic>
+        <p:nvPicPr>
+          <p:cNvPr id="12" name="Picture 11">
+            <a:extLst>
+              <a:ext uri="{FF2B5EF4-FFF2-40B4-BE49-F238E27FC236}">
+                <a16:creationId xmlns:a16="http://schemas.microsoft.com/office/drawing/2014/main" id="{FDE98FCE-DE21-47BA-A75F-FDC93EC0C7A5}"/>
+              </a:ext>
+            </a:extLst>
+          </p:cNvPr>
+          <p:cNvPicPr>
+            <a:picLocks noChangeAspect="1"/>
+          </p:cNvPicPr>
+          <p:nvPr/>
+        </p:nvPicPr>
+        <p:blipFill>
+          <a:blip r:embed="rId2">
+            <a:extLst>
+              <a:ext uri="{28A0092B-C50C-407E-A947-70E740481C1C}">
+                <a14:useLocalDpi xmlns:a14="http://schemas.microsoft.com/office/drawing/2010/main" val="0"/>
+              </a:ext>
+            </a:extLst>
+          </a:blip>
+          <a:stretch>
+            <a:fillRect/>
+          </a:stretch>
+        </p:blipFill>
+        <p:spPr>
+          <a:xfrm>
+            <a:off x="1746607" y="1799714"/>
+            <a:ext cx="8583797" cy="4840902"/>
+          </a:xfrm>
+          <a:prstGeom prst="rect">
+            <a:avLst/>
+          </a:prstGeom>
+        </p:spPr>
+      </p:pic>
+    </p:spTree>
+    <p:extLst>
+      <p:ext uri="{BB962C8B-B14F-4D97-AF65-F5344CB8AC3E}">
+        <p14:creationId xmlns:p14="http://schemas.microsoft.com/office/powerpoint/2010/main" val="2841722851"/>
+      </p:ext>
+    </p:extLst>
+  </p:cSld>
+  <p:clrMapOvr>
+    <a:masterClrMapping/>
+  </p:clrMapOvr>
+</p:sld>
+</file>
+
 <file path=ppt/slides/slide3.xml><?xml version="1.0" encoding="utf-8"?>
 <p:sld xmlns:a="http://schemas.openxmlformats.org/drawingml/2006/main" xmlns:r="http://schemas.openxmlformats.org/officeDocument/2006/relationships" xmlns:p="http://schemas.openxmlformats.org/presentationml/2006/main">
   <p:cSld>
@@ -49768,7 +50186,7 @@
                   <a:srgbClr val="FFFF00"/>
                 </a:solidFill>
               </a:rPr>
-              <a:t>interprétation</a:t>
+              <a:t>interprétabilité</a:t>
             </a:r>
             <a:r>
               <a:rPr lang="fr-FR" sz="2400" dirty="0">
@@ -50492,6 +50910,59 @@
           </a:prstGeom>
         </p:spPr>
       </p:pic>
+      <p:sp>
+        <p:nvSpPr>
+          <p:cNvPr id="12" name="ZoneTexte 3">
+            <a:extLst>
+              <a:ext uri="{FF2B5EF4-FFF2-40B4-BE49-F238E27FC236}">
+                <a16:creationId xmlns:a16="http://schemas.microsoft.com/office/drawing/2014/main" id="{6D851787-4F77-4C23-B364-A92B588420BF}"/>
+              </a:ext>
+            </a:extLst>
+          </p:cNvPr>
+          <p:cNvSpPr txBox="1"/>
+          <p:nvPr/>
+        </p:nvSpPr>
+        <p:spPr>
+          <a:xfrm>
+            <a:off x="5706120" y="5956048"/>
+            <a:ext cx="6350491" cy="369332"/>
+          </a:xfrm>
+          <a:prstGeom prst="rect">
+            <a:avLst/>
+          </a:prstGeom>
+          <a:solidFill>
+            <a:schemeClr val="accent6">
+              <a:lumMod val="75000"/>
+              <a:alpha val="32000"/>
+            </a:schemeClr>
+          </a:solidFill>
+          <a:ln>
+            <a:solidFill>
+              <a:srgbClr val="0070C0"/>
+            </a:solidFill>
+          </a:ln>
+        </p:spPr>
+        <p:txBody>
+          <a:bodyPr wrap="square" rtlCol="0">
+            <a:spAutoFit/>
+          </a:bodyPr>
+          <a:lstStyle/>
+          <a:p>
+            <a:r>
+              <a:rPr lang="fr-FR" i="1" dirty="0"/>
+              <a:t>=&gt; Taille des données : </a:t>
+            </a:r>
+            <a:r>
+              <a:rPr lang="fr-FR" b="1" i="1" dirty="0">
+                <a:solidFill>
+                  <a:srgbClr val="FFFF00"/>
+                </a:solidFill>
+              </a:rPr>
+              <a:t>289’000 x 215</a:t>
+            </a:r>
+          </a:p>
+        </p:txBody>
+      </p:sp>
     </p:spTree>
     <p:extLst>
       <p:ext uri="{BB962C8B-B14F-4D97-AF65-F5344CB8AC3E}">
@@ -50922,10 +51393,10 @@
       </p:grpSpPr>
       <p:pic>
         <p:nvPicPr>
-          <p:cNvPr id="4" name="Image 3">
+          <p:cNvPr id="11" name="Image 10">
             <a:extLst>
               <a:ext uri="{FF2B5EF4-FFF2-40B4-BE49-F238E27FC236}">
-                <a16:creationId xmlns:a16="http://schemas.microsoft.com/office/drawing/2014/main" id="{8FDB3700-8155-4A6F-9C7A-9AD1A5D517C2}"/>
+                <a16:creationId xmlns:a16="http://schemas.microsoft.com/office/drawing/2014/main" id="{DA60B205-2B20-4D85-96DD-F15DBDA4A55A}"/>
               </a:ext>
             </a:extLst>
           </p:cNvPr>
@@ -50948,12 +51419,17 @@
         </p:blipFill>
         <p:spPr>
           <a:xfrm>
-            <a:off x="732083" y="1018903"/>
-            <a:ext cx="10826671" cy="2955618"/>
+            <a:off x="679076" y="1114162"/>
+            <a:ext cx="9995046" cy="2794041"/>
           </a:xfrm>
           <a:prstGeom prst="rect">
             <a:avLst/>
           </a:prstGeom>
+          <a:ln w="63500">
+            <a:solidFill>
+              <a:schemeClr val="bg1"/>
+            </a:solidFill>
+          </a:ln>
         </p:spPr>
       </p:pic>
       <p:sp>
@@ -51082,7 +51558,7 @@
         </p:blipFill>
         <p:spPr>
           <a:xfrm>
-            <a:off x="6844096" y="2419711"/>
+            <a:off x="6825429" y="2706038"/>
             <a:ext cx="5057785" cy="3342913"/>
           </a:xfrm>
           <a:prstGeom prst="rect">
@@ -51123,7 +51599,7 @@
         </p:blipFill>
         <p:spPr>
           <a:xfrm>
-            <a:off x="3494783" y="4058530"/>
+            <a:off x="3485450" y="3908203"/>
             <a:ext cx="3277359" cy="2731133"/>
           </a:xfrm>
           <a:prstGeom prst="rect">
@@ -51194,7 +51670,7 @@
         </p:blipFill>
         <p:spPr>
           <a:xfrm>
-            <a:off x="732084" y="4068804"/>
+            <a:off x="732084" y="3908203"/>
             <a:ext cx="2690746" cy="1514551"/>
           </a:xfrm>
           <a:prstGeom prst="rect">

</xml_diff>